<commit_message>
Update Presentacion Tecnica Broggi.pptx
</commit_message>
<xml_diff>
--- a/Documents/Presentacion Tecnica Broggi.pptx
+++ b/Documents/Presentacion Tecnica Broggi.pptx
@@ -1,48 +1,49 @@
 
 <file path=ppt/presentation.xml><?xml version="1.0" encoding="utf-8"?>
-<p:presentation xmlns:a="http://schemas.openxmlformats.org/drawingml/2006/main" xmlns:r="http://schemas.openxmlformats.org/officeDocument/2006/relationships" xmlns:mc="http://schemas.openxmlformats.org/markup-compatibility/2006" xmlns:mv="urn:schemas-microsoft-com:mac:vml" xmlns:p="http://schemas.openxmlformats.org/presentationml/2006/main" xmlns:c="http://schemas.openxmlformats.org/drawingml/2006/chart" xmlns:dgm="http://schemas.openxmlformats.org/drawingml/2006/diagram" xmlns:o="urn:schemas-microsoft-com:office:office" xmlns:v="urn:schemas-microsoft-com:vml" xmlns:pvml="urn:schemas-microsoft-com:office:powerpoint" xmlns:com="http://schemas.openxmlformats.org/drawingml/2006/compatibility" xmlns:p14="http://schemas.microsoft.com/office/powerpoint/2010/main" xmlns:p15="http://schemas.microsoft.com/office/powerpoint/2012/main" xmlns:ahyp="http://schemas.microsoft.com/office/drawing/2018/hyperlinkcolor" autoCompressPictures="0" embedTrueTypeFonts="1" strictFirstAndLastChars="0" saveSubsetFonts="1">
+<p:presentation xmlns:a="http://schemas.openxmlformats.org/drawingml/2006/main" xmlns:r="http://schemas.openxmlformats.org/officeDocument/2006/relationships" xmlns:p="http://schemas.openxmlformats.org/presentationml/2006/main" strictFirstAndLastChars="0" embedTrueTypeFonts="1" saveSubsetFonts="1" autoCompressPictures="0">
   <p:sldMasterIdLst>
-    <p:sldMasterId id="2147483659" r:id="rId4"/>
+    <p:sldMasterId id="2147483659" r:id="rId1"/>
   </p:sldMasterIdLst>
   <p:notesMasterIdLst>
-    <p:notesMasterId r:id="rId5"/>
+    <p:notesMasterId r:id="rId10"/>
   </p:notesMasterIdLst>
   <p:sldIdLst>
-    <p:sldId id="256" r:id="rId6"/>
-    <p:sldId id="257" r:id="rId7"/>
-    <p:sldId id="258" r:id="rId8"/>
-    <p:sldId id="259" r:id="rId9"/>
-    <p:sldId id="260" r:id="rId10"/>
-    <p:sldId id="261" r:id="rId11"/>
-    <p:sldId id="262" r:id="rId12"/>
+    <p:sldId id="256" r:id="rId2"/>
+    <p:sldId id="257" r:id="rId3"/>
+    <p:sldId id="258" r:id="rId4"/>
+    <p:sldId id="259" r:id="rId5"/>
+    <p:sldId id="260" r:id="rId6"/>
+    <p:sldId id="261" r:id="rId7"/>
+    <p:sldId id="263" r:id="rId8"/>
+    <p:sldId id="262" r:id="rId9"/>
   </p:sldIdLst>
-  <p:sldSz cy="5143500" cx="9144000"/>
+  <p:sldSz cx="9144000" cy="5143500" type="screen16x9"/>
   <p:notesSz cx="6858000" cy="9144000"/>
   <p:embeddedFontLst>
     <p:embeddedFont>
-      <p:font typeface="Roboto"/>
-      <p:regular r:id="rId13"/>
-      <p:bold r:id="rId14"/>
-      <p:italic r:id="rId15"/>
-      <p:boldItalic r:id="rId16"/>
+      <p:font typeface="Nunito" charset="0"/>
+      <p:regular r:id="rId11"/>
+      <p:bold r:id="rId12"/>
+      <p:italic r:id="rId13"/>
+      <p:boldItalic r:id="rId14"/>
     </p:embeddedFont>
     <p:embeddedFont>
-      <p:font typeface="Nunito"/>
-      <p:regular r:id="rId17"/>
-      <p:bold r:id="rId18"/>
-      <p:italic r:id="rId19"/>
-      <p:boldItalic r:id="rId20"/>
+      <p:font typeface="Merriweather" charset="0"/>
+      <p:regular r:id="rId15"/>
+      <p:bold r:id="rId16"/>
+      <p:italic r:id="rId17"/>
+      <p:boldItalic r:id="rId18"/>
     </p:embeddedFont>
     <p:embeddedFont>
-      <p:font typeface="Merriweather"/>
-      <p:regular r:id="rId21"/>
-      <p:bold r:id="rId22"/>
-      <p:italic r:id="rId23"/>
-      <p:boldItalic r:id="rId24"/>
+      <p:font typeface="Roboto" charset="0"/>
+      <p:regular r:id="rId19"/>
+      <p:bold r:id="rId20"/>
+      <p:italic r:id="rId21"/>
+      <p:boldItalic r:id="rId22"/>
     </p:embeddedFont>
   </p:embeddedFontLst>
   <p:defaultTextStyle>
-    <a:defPPr lvl="0" marR="0" rtl="0" algn="l">
+    <a:defPPr marR="0" lvl="0" algn="l" rtl="0">
       <a:lnSpc>
         <a:spcPct val="100000"/>
       </a:lnSpc>
@@ -53,7 +54,7 @@
         <a:spcPts val="0"/>
       </a:spcAft>
     </a:defPPr>
-    <a:lvl1pPr lvl="0" marR="0" rtl="0" algn="l">
+    <a:lvl1pPr marR="0" lvl="0" algn="l" rtl="0">
       <a:lnSpc>
         <a:spcPct val="100000"/>
       </a:lnSpc>
@@ -67,7 +68,7 @@
         <a:srgbClr val="000000"/>
       </a:buClr>
       <a:buFont typeface="Arial"/>
-      <a:defRPr b="0" i="0" sz="1400" u="none" cap="none" strike="noStrike">
+      <a:defRPr sz="1400" b="0" i="0" u="none" strike="noStrike" cap="none">
         <a:solidFill>
           <a:srgbClr val="000000"/>
         </a:solidFill>
@@ -77,7 +78,7 @@
         <a:sym typeface="Arial"/>
       </a:defRPr>
     </a:lvl1pPr>
-    <a:lvl2pPr lvl="1" marR="0" rtl="0" algn="l">
+    <a:lvl2pPr marR="0" lvl="1" algn="l" rtl="0">
       <a:lnSpc>
         <a:spcPct val="100000"/>
       </a:lnSpc>
@@ -91,7 +92,7 @@
         <a:srgbClr val="000000"/>
       </a:buClr>
       <a:buFont typeface="Arial"/>
-      <a:defRPr b="0" i="0" sz="1400" u="none" cap="none" strike="noStrike">
+      <a:defRPr sz="1400" b="0" i="0" u="none" strike="noStrike" cap="none">
         <a:solidFill>
           <a:srgbClr val="000000"/>
         </a:solidFill>
@@ -101,7 +102,7 @@
         <a:sym typeface="Arial"/>
       </a:defRPr>
     </a:lvl2pPr>
-    <a:lvl3pPr lvl="2" marR="0" rtl="0" algn="l">
+    <a:lvl3pPr marR="0" lvl="2" algn="l" rtl="0">
       <a:lnSpc>
         <a:spcPct val="100000"/>
       </a:lnSpc>
@@ -115,7 +116,7 @@
         <a:srgbClr val="000000"/>
       </a:buClr>
       <a:buFont typeface="Arial"/>
-      <a:defRPr b="0" i="0" sz="1400" u="none" cap="none" strike="noStrike">
+      <a:defRPr sz="1400" b="0" i="0" u="none" strike="noStrike" cap="none">
         <a:solidFill>
           <a:srgbClr val="000000"/>
         </a:solidFill>
@@ -125,7 +126,7 @@
         <a:sym typeface="Arial"/>
       </a:defRPr>
     </a:lvl3pPr>
-    <a:lvl4pPr lvl="3" marR="0" rtl="0" algn="l">
+    <a:lvl4pPr marR="0" lvl="3" algn="l" rtl="0">
       <a:lnSpc>
         <a:spcPct val="100000"/>
       </a:lnSpc>
@@ -139,7 +140,7 @@
         <a:srgbClr val="000000"/>
       </a:buClr>
       <a:buFont typeface="Arial"/>
-      <a:defRPr b="0" i="0" sz="1400" u="none" cap="none" strike="noStrike">
+      <a:defRPr sz="1400" b="0" i="0" u="none" strike="noStrike" cap="none">
         <a:solidFill>
           <a:srgbClr val="000000"/>
         </a:solidFill>
@@ -149,7 +150,7 @@
         <a:sym typeface="Arial"/>
       </a:defRPr>
     </a:lvl4pPr>
-    <a:lvl5pPr lvl="4" marR="0" rtl="0" algn="l">
+    <a:lvl5pPr marR="0" lvl="4" algn="l" rtl="0">
       <a:lnSpc>
         <a:spcPct val="100000"/>
       </a:lnSpc>
@@ -163,7 +164,7 @@
         <a:srgbClr val="000000"/>
       </a:buClr>
       <a:buFont typeface="Arial"/>
-      <a:defRPr b="0" i="0" sz="1400" u="none" cap="none" strike="noStrike">
+      <a:defRPr sz="1400" b="0" i="0" u="none" strike="noStrike" cap="none">
         <a:solidFill>
           <a:srgbClr val="000000"/>
         </a:solidFill>
@@ -173,7 +174,7 @@
         <a:sym typeface="Arial"/>
       </a:defRPr>
     </a:lvl5pPr>
-    <a:lvl6pPr lvl="5" marR="0" rtl="0" algn="l">
+    <a:lvl6pPr marR="0" lvl="5" algn="l" rtl="0">
       <a:lnSpc>
         <a:spcPct val="100000"/>
       </a:lnSpc>
@@ -187,7 +188,7 @@
         <a:srgbClr val="000000"/>
       </a:buClr>
       <a:buFont typeface="Arial"/>
-      <a:defRPr b="0" i="0" sz="1400" u="none" cap="none" strike="noStrike">
+      <a:defRPr sz="1400" b="0" i="0" u="none" strike="noStrike" cap="none">
         <a:solidFill>
           <a:srgbClr val="000000"/>
         </a:solidFill>
@@ -197,7 +198,7 @@
         <a:sym typeface="Arial"/>
       </a:defRPr>
     </a:lvl6pPr>
-    <a:lvl7pPr lvl="6" marR="0" rtl="0" algn="l">
+    <a:lvl7pPr marR="0" lvl="6" algn="l" rtl="0">
       <a:lnSpc>
         <a:spcPct val="100000"/>
       </a:lnSpc>
@@ -211,7 +212,7 @@
         <a:srgbClr val="000000"/>
       </a:buClr>
       <a:buFont typeface="Arial"/>
-      <a:defRPr b="0" i="0" sz="1400" u="none" cap="none" strike="noStrike">
+      <a:defRPr sz="1400" b="0" i="0" u="none" strike="noStrike" cap="none">
         <a:solidFill>
           <a:srgbClr val="000000"/>
         </a:solidFill>
@@ -221,7 +222,7 @@
         <a:sym typeface="Arial"/>
       </a:defRPr>
     </a:lvl7pPr>
-    <a:lvl8pPr lvl="7" marR="0" rtl="0" algn="l">
+    <a:lvl8pPr marR="0" lvl="7" algn="l" rtl="0">
       <a:lnSpc>
         <a:spcPct val="100000"/>
       </a:lnSpc>
@@ -235,7 +236,7 @@
         <a:srgbClr val="000000"/>
       </a:buClr>
       <a:buFont typeface="Arial"/>
-      <a:defRPr b="0" i="0" sz="1400" u="none" cap="none" strike="noStrike">
+      <a:defRPr sz="1400" b="0" i="0" u="none" strike="noStrike" cap="none">
         <a:solidFill>
           <a:srgbClr val="000000"/>
         </a:solidFill>
@@ -245,7 +246,7 @@
         <a:sym typeface="Arial"/>
       </a:defRPr>
     </a:lvl8pPr>
-    <a:lvl9pPr lvl="8" marR="0" rtl="0" algn="l">
+    <a:lvl9pPr marR="0" lvl="8" algn="l" rtl="0">
       <a:lnSpc>
         <a:spcPct val="100000"/>
       </a:lnSpc>
@@ -259,7 +260,7 @@
         <a:srgbClr val="000000"/>
       </a:buClr>
       <a:buFont typeface="Arial"/>
-      <a:defRPr b="0" i="0" sz="1400" u="none" cap="none" strike="noStrike">
+      <a:defRPr sz="1400" b="0" i="0" u="none" strike="noStrike" cap="none">
         <a:solidFill>
           <a:srgbClr val="000000"/>
         </a:solidFill>
@@ -272,7 +273,7 @@
   </p:defaultTextStyle>
   <p:extLst>
     <p:ext uri="{EFAFB233-063F-42B5-8137-9DF3F51BA10A}">
-      <p15:sldGuideLst>
+      <p15:sldGuideLst xmlns:ahyp="http://schemas.microsoft.com/office/drawing/2018/hyperlinkcolor" xmlns:p15="http://schemas.microsoft.com/office/powerpoint/2012/main" xmlns:p14="http://schemas.microsoft.com/office/powerpoint/2010/main" xmlns:com="http://schemas.openxmlformats.org/drawingml/2006/compatibility" xmlns:pvml="urn:schemas-microsoft-com:office:powerpoint" xmlns:v="urn:schemas-microsoft-com:vml" xmlns:o="urn:schemas-microsoft-com:office:office" xmlns:dgm="http://schemas.openxmlformats.org/drawingml/2006/diagram" xmlns:c="http://schemas.openxmlformats.org/drawingml/2006/chart" xmlns:mv="urn:schemas-microsoft-com:mac:vml" xmlns:mc="http://schemas.openxmlformats.org/markup-compatibility/2006" xmlns="">
         <p15:guide id="1" orient="horz" pos="1620">
           <p15:clr>
             <a:srgbClr val="A4A3A4"/>
@@ -290,11 +291,16 @@
 </file>
 
 <file path=ppt/notesMasters/notesMaster1.xml><?xml version="1.0" encoding="utf-8"?>
-<p:notesMaster xmlns:a="http://schemas.openxmlformats.org/drawingml/2006/main" xmlns:r="http://schemas.openxmlformats.org/officeDocument/2006/relationships" xmlns:mc="http://schemas.openxmlformats.org/markup-compatibility/2006" xmlns:mv="urn:schemas-microsoft-com:mac:vml" xmlns:p="http://schemas.openxmlformats.org/presentationml/2006/main" xmlns:c="http://schemas.openxmlformats.org/drawingml/2006/chart" xmlns:dgm="http://schemas.openxmlformats.org/drawingml/2006/diagram" xmlns:o="urn:schemas-microsoft-com:office:office" xmlns:v="urn:schemas-microsoft-com:vml" xmlns:pvml="urn:schemas-microsoft-com:office:powerpoint" xmlns:com="http://schemas.openxmlformats.org/drawingml/2006/compatibility" xmlns:p14="http://schemas.microsoft.com/office/powerpoint/2010/main" xmlns:p15="http://schemas.microsoft.com/office/powerpoint/2012/main" xmlns:ahyp="http://schemas.microsoft.com/office/drawing/2018/hyperlinkcolor">
+<p:notesMaster xmlns:a="http://schemas.openxmlformats.org/drawingml/2006/main" xmlns:r="http://schemas.openxmlformats.org/officeDocument/2006/relationships" xmlns:p="http://schemas.openxmlformats.org/presentationml/2006/main">
   <p:cSld>
+    <p:bg>
+      <p:bgRef idx="1001">
+        <a:schemeClr val="bg1"/>
+      </p:bgRef>
+    </p:bg>
     <p:spTree>
       <p:nvGrpSpPr>
-        <p:cNvPr id="2" name="Shape 2"/>
+        <p:cNvPr id="1" name="Shape 2"/>
         <p:cNvGrpSpPr/>
         <p:nvPr/>
       </p:nvGrpSpPr>
@@ -309,9 +315,11 @@
       <p:sp>
         <p:nvSpPr>
           <p:cNvPr id="3" name="Google Shape;3;n"/>
-          <p:cNvSpPr/>
+          <p:cNvSpPr>
+            <a:spLocks noGrp="1" noRot="1" noChangeAspect="1"/>
+          </p:cNvSpPr>
           <p:nvPr>
-            <p:ph idx="2" type="sldImg"/>
+            <p:ph type="sldImg" idx="2"/>
           </p:nvPr>
         </p:nvSpPr>
         <p:spPr>
@@ -320,9 +328,13 @@
             <a:ext cx="6096075" cy="3429000"/>
           </a:xfrm>
           <a:custGeom>
-            <a:rect b="b" l="l" r="r" t="t"/>
+            <a:avLst/>
+            <a:gdLst/>
+            <a:ahLst/>
+            <a:cxnLst/>
+            <a:rect l="l" t="t" r="r" b="b"/>
             <a:pathLst>
-              <a:path extrusionOk="0" h="120000" w="120000">
+              <a:path w="120000" h="120000" extrusionOk="0">
                 <a:moveTo>
                   <a:pt x="0" y="0"/>
                 </a:moveTo>
@@ -340,23 +352,25 @@
             </a:pathLst>
           </a:custGeom>
           <a:noFill/>
-          <a:ln cap="flat" cmpd="sng" w="9525">
+          <a:ln w="9525" cap="flat" cmpd="sng">
             <a:solidFill>
               <a:srgbClr val="000000"/>
             </a:solidFill>
             <a:prstDash val="solid"/>
             <a:round/>
-            <a:headEnd len="sm" w="sm" type="none"/>
-            <a:tailEnd len="sm" w="sm" type="none"/>
+            <a:headEnd type="none" w="sm" len="sm"/>
+            <a:tailEnd type="none" w="sm" len="sm"/>
           </a:ln>
         </p:spPr>
       </p:sp>
       <p:sp>
         <p:nvSpPr>
           <p:cNvPr id="4" name="Google Shape;4;n"/>
-          <p:cNvSpPr txBox="1"/>
+          <p:cNvSpPr txBox="1">
+            <a:spLocks noGrp="1"/>
+          </p:cNvSpPr>
           <p:nvPr>
-            <p:ph idx="1" type="body"/>
+            <p:ph type="body" idx="1"/>
           </p:nvPr>
         </p:nvSpPr>
         <p:spPr>
@@ -373,11 +387,11 @@
           </a:ln>
         </p:spPr>
         <p:txBody>
-          <a:bodyPr anchorCtr="0" anchor="t" bIns="91425" lIns="91425" spcFirstLastPara="1" rIns="91425" wrap="square" tIns="91425">
+          <a:bodyPr spcFirstLastPara="1" wrap="square" lIns="91425" tIns="91425" rIns="91425" bIns="91425" anchor="t" anchorCtr="0">
             <a:noAutofit/>
           </a:bodyPr>
           <a:lstStyle>
-            <a:lvl1pPr indent="-298450" lvl="0" marL="457200">
+            <a:lvl1pPr marL="457200" lvl="0" indent="-298450">
               <a:spcBef>
                 <a:spcPts val="0"/>
               </a:spcBef>
@@ -388,7 +402,7 @@
               <a:buChar char="●"/>
               <a:defRPr sz="1100"/>
             </a:lvl1pPr>
-            <a:lvl2pPr indent="-298450" lvl="1" marL="914400">
+            <a:lvl2pPr marL="914400" lvl="1" indent="-298450">
               <a:spcBef>
                 <a:spcPts val="0"/>
               </a:spcBef>
@@ -399,7 +413,7 @@
               <a:buChar char="○"/>
               <a:defRPr sz="1100"/>
             </a:lvl2pPr>
-            <a:lvl3pPr indent="-298450" lvl="2" marL="1371600">
+            <a:lvl3pPr marL="1371600" lvl="2" indent="-298450">
               <a:spcBef>
                 <a:spcPts val="0"/>
               </a:spcBef>
@@ -410,7 +424,7 @@
               <a:buChar char="■"/>
               <a:defRPr sz="1100"/>
             </a:lvl3pPr>
-            <a:lvl4pPr indent="-298450" lvl="3" marL="1828800">
+            <a:lvl4pPr marL="1828800" lvl="3" indent="-298450">
               <a:spcBef>
                 <a:spcPts val="0"/>
               </a:spcBef>
@@ -421,7 +435,7 @@
               <a:buChar char="●"/>
               <a:defRPr sz="1100"/>
             </a:lvl4pPr>
-            <a:lvl5pPr indent="-298450" lvl="4" marL="2286000">
+            <a:lvl5pPr marL="2286000" lvl="4" indent="-298450">
               <a:spcBef>
                 <a:spcPts val="0"/>
               </a:spcBef>
@@ -432,7 +446,7 @@
               <a:buChar char="○"/>
               <a:defRPr sz="1100"/>
             </a:lvl5pPr>
-            <a:lvl6pPr indent="-298450" lvl="5" marL="2743200">
+            <a:lvl6pPr marL="2743200" lvl="5" indent="-298450">
               <a:spcBef>
                 <a:spcPts val="0"/>
               </a:spcBef>
@@ -443,7 +457,7 @@
               <a:buChar char="■"/>
               <a:defRPr sz="1100"/>
             </a:lvl6pPr>
-            <a:lvl7pPr indent="-298450" lvl="6" marL="3200400">
+            <a:lvl7pPr marL="3200400" lvl="6" indent="-298450">
               <a:spcBef>
                 <a:spcPts val="0"/>
               </a:spcBef>
@@ -454,7 +468,7 @@
               <a:buChar char="●"/>
               <a:defRPr sz="1100"/>
             </a:lvl7pPr>
-            <a:lvl8pPr indent="-298450" lvl="7" marL="3657600">
+            <a:lvl8pPr marL="3657600" lvl="7" indent="-298450">
               <a:spcBef>
                 <a:spcPts val="0"/>
               </a:spcBef>
@@ -465,7 +479,7 @@
               <a:buChar char="○"/>
               <a:defRPr sz="1100"/>
             </a:lvl8pPr>
-            <a:lvl9pPr indent="-298450" lvl="8" marL="4114800">
+            <a:lvl9pPr marL="4114800" lvl="8" indent="-298450">
               <a:spcBef>
                 <a:spcPts val="0"/>
               </a:spcBef>
@@ -477,14 +491,21 @@
               <a:defRPr sz="1100"/>
             </a:lvl9pPr>
           </a:lstStyle>
-          <a:p/>
+          <a:p>
+            <a:endParaRPr/>
+          </a:p>
         </p:txBody>
       </p:sp>
     </p:spTree>
+    <p:extLst>
+      <p:ext uri="{BB962C8B-B14F-4D97-AF65-F5344CB8AC3E}">
+        <p14:creationId xmlns:p14="http://schemas.microsoft.com/office/powerpoint/2010/main" val="3389520396"/>
+      </p:ext>
+    </p:extLst>
   </p:cSld>
-  <p:clrMap accent1="accent1" accent2="accent2" accent3="accent3" accent4="accent4" accent5="accent5" accent6="accent6" bg1="lt1" bg2="dk2" tx1="dk1" tx2="lt2" folHlink="folHlink" hlink="hlink"/>
+  <p:clrMap bg1="lt1" tx1="dk1" bg2="dk2" tx2="lt2" accent1="accent1" accent2="accent2" accent3="accent3" accent4="accent4" accent5="accent5" accent6="accent6" hlink="hlink" folHlink="folHlink"/>
   <p:notesStyle>
-    <a:defPPr lvl="0" marR="0" rtl="0" algn="l">
+    <a:defPPr marR="0" lvl="0" algn="l" rtl="0">
       <a:lnSpc>
         <a:spcPct val="100000"/>
       </a:lnSpc>
@@ -495,7 +516,7 @@
         <a:spcPts val="0"/>
       </a:spcAft>
     </a:defPPr>
-    <a:lvl1pPr lvl="0" marR="0" rtl="0" algn="l">
+    <a:lvl1pPr marR="0" lvl="0" algn="l" rtl="0">
       <a:lnSpc>
         <a:spcPct val="100000"/>
       </a:lnSpc>
@@ -509,7 +530,7 @@
         <a:srgbClr val="000000"/>
       </a:buClr>
       <a:buFont typeface="Arial"/>
-      <a:defRPr b="0" i="0" sz="1400" u="none" cap="none" strike="noStrike">
+      <a:defRPr sz="1400" b="0" i="0" u="none" strike="noStrike" cap="none">
         <a:solidFill>
           <a:srgbClr val="000000"/>
         </a:solidFill>
@@ -519,7 +540,7 @@
         <a:sym typeface="Arial"/>
       </a:defRPr>
     </a:lvl1pPr>
-    <a:lvl2pPr lvl="1" marR="0" rtl="0" algn="l">
+    <a:lvl2pPr marR="0" lvl="1" algn="l" rtl="0">
       <a:lnSpc>
         <a:spcPct val="100000"/>
       </a:lnSpc>
@@ -533,7 +554,7 @@
         <a:srgbClr val="000000"/>
       </a:buClr>
       <a:buFont typeface="Arial"/>
-      <a:defRPr b="0" i="0" sz="1400" u="none" cap="none" strike="noStrike">
+      <a:defRPr sz="1400" b="0" i="0" u="none" strike="noStrike" cap="none">
         <a:solidFill>
           <a:srgbClr val="000000"/>
         </a:solidFill>
@@ -543,7 +564,7 @@
         <a:sym typeface="Arial"/>
       </a:defRPr>
     </a:lvl2pPr>
-    <a:lvl3pPr lvl="2" marR="0" rtl="0" algn="l">
+    <a:lvl3pPr marR="0" lvl="2" algn="l" rtl="0">
       <a:lnSpc>
         <a:spcPct val="100000"/>
       </a:lnSpc>
@@ -557,7 +578,7 @@
         <a:srgbClr val="000000"/>
       </a:buClr>
       <a:buFont typeface="Arial"/>
-      <a:defRPr b="0" i="0" sz="1400" u="none" cap="none" strike="noStrike">
+      <a:defRPr sz="1400" b="0" i="0" u="none" strike="noStrike" cap="none">
         <a:solidFill>
           <a:srgbClr val="000000"/>
         </a:solidFill>
@@ -567,7 +588,7 @@
         <a:sym typeface="Arial"/>
       </a:defRPr>
     </a:lvl3pPr>
-    <a:lvl4pPr lvl="3" marR="0" rtl="0" algn="l">
+    <a:lvl4pPr marR="0" lvl="3" algn="l" rtl="0">
       <a:lnSpc>
         <a:spcPct val="100000"/>
       </a:lnSpc>
@@ -581,7 +602,7 @@
         <a:srgbClr val="000000"/>
       </a:buClr>
       <a:buFont typeface="Arial"/>
-      <a:defRPr b="0" i="0" sz="1400" u="none" cap="none" strike="noStrike">
+      <a:defRPr sz="1400" b="0" i="0" u="none" strike="noStrike" cap="none">
         <a:solidFill>
           <a:srgbClr val="000000"/>
         </a:solidFill>
@@ -591,7 +612,7 @@
         <a:sym typeface="Arial"/>
       </a:defRPr>
     </a:lvl4pPr>
-    <a:lvl5pPr lvl="4" marR="0" rtl="0" algn="l">
+    <a:lvl5pPr marR="0" lvl="4" algn="l" rtl="0">
       <a:lnSpc>
         <a:spcPct val="100000"/>
       </a:lnSpc>
@@ -605,7 +626,7 @@
         <a:srgbClr val="000000"/>
       </a:buClr>
       <a:buFont typeface="Arial"/>
-      <a:defRPr b="0" i="0" sz="1400" u="none" cap="none" strike="noStrike">
+      <a:defRPr sz="1400" b="0" i="0" u="none" strike="noStrike" cap="none">
         <a:solidFill>
           <a:srgbClr val="000000"/>
         </a:solidFill>
@@ -615,7 +636,7 @@
         <a:sym typeface="Arial"/>
       </a:defRPr>
     </a:lvl5pPr>
-    <a:lvl6pPr lvl="5" marR="0" rtl="0" algn="l">
+    <a:lvl6pPr marR="0" lvl="5" algn="l" rtl="0">
       <a:lnSpc>
         <a:spcPct val="100000"/>
       </a:lnSpc>
@@ -629,7 +650,7 @@
         <a:srgbClr val="000000"/>
       </a:buClr>
       <a:buFont typeface="Arial"/>
-      <a:defRPr b="0" i="0" sz="1400" u="none" cap="none" strike="noStrike">
+      <a:defRPr sz="1400" b="0" i="0" u="none" strike="noStrike" cap="none">
         <a:solidFill>
           <a:srgbClr val="000000"/>
         </a:solidFill>
@@ -639,7 +660,7 @@
         <a:sym typeface="Arial"/>
       </a:defRPr>
     </a:lvl6pPr>
-    <a:lvl7pPr lvl="6" marR="0" rtl="0" algn="l">
+    <a:lvl7pPr marR="0" lvl="6" algn="l" rtl="0">
       <a:lnSpc>
         <a:spcPct val="100000"/>
       </a:lnSpc>
@@ -653,7 +674,7 @@
         <a:srgbClr val="000000"/>
       </a:buClr>
       <a:buFont typeface="Arial"/>
-      <a:defRPr b="0" i="0" sz="1400" u="none" cap="none" strike="noStrike">
+      <a:defRPr sz="1400" b="0" i="0" u="none" strike="noStrike" cap="none">
         <a:solidFill>
           <a:srgbClr val="000000"/>
         </a:solidFill>
@@ -663,7 +684,7 @@
         <a:sym typeface="Arial"/>
       </a:defRPr>
     </a:lvl7pPr>
-    <a:lvl8pPr lvl="7" marR="0" rtl="0" algn="l">
+    <a:lvl8pPr marR="0" lvl="7" algn="l" rtl="0">
       <a:lnSpc>
         <a:spcPct val="100000"/>
       </a:lnSpc>
@@ -677,7 +698,7 @@
         <a:srgbClr val="000000"/>
       </a:buClr>
       <a:buFont typeface="Arial"/>
-      <a:defRPr b="0" i="0" sz="1400" u="none" cap="none" strike="noStrike">
+      <a:defRPr sz="1400" b="0" i="0" u="none" strike="noStrike" cap="none">
         <a:solidFill>
           <a:srgbClr val="000000"/>
         </a:solidFill>
@@ -687,7 +708,7 @@
         <a:sym typeface="Arial"/>
       </a:defRPr>
     </a:lvl8pPr>
-    <a:lvl9pPr lvl="8" marR="0" rtl="0" algn="l">
+    <a:lvl9pPr marR="0" lvl="8" algn="l" rtl="0">
       <a:lnSpc>
         <a:spcPct val="100000"/>
       </a:lnSpc>
@@ -701,7 +722,7 @@
         <a:srgbClr val="000000"/>
       </a:buClr>
       <a:buFont typeface="Arial"/>
-      <a:defRPr b="0" i="0" sz="1400" u="none" cap="none" strike="noStrike">
+      <a:defRPr sz="1400" b="0" i="0" u="none" strike="noStrike" cap="none">
         <a:solidFill>
           <a:srgbClr val="000000"/>
         </a:solidFill>
@@ -716,11 +737,11 @@
 </file>
 
 <file path=ppt/notesSlides/notesSlide1.xml><?xml version="1.0" encoding="utf-8"?>
-<p:notes xmlns:a="http://schemas.openxmlformats.org/drawingml/2006/main" xmlns:r="http://schemas.openxmlformats.org/officeDocument/2006/relationships" xmlns:mc="http://schemas.openxmlformats.org/markup-compatibility/2006" xmlns:mv="urn:schemas-microsoft-com:mac:vml" xmlns:p="http://schemas.openxmlformats.org/presentationml/2006/main" xmlns:c="http://schemas.openxmlformats.org/drawingml/2006/chart" xmlns:dgm="http://schemas.openxmlformats.org/drawingml/2006/diagram" xmlns:o="urn:schemas-microsoft-com:office:office" xmlns:v="urn:schemas-microsoft-com:vml" xmlns:pvml="urn:schemas-microsoft-com:office:powerpoint" xmlns:com="http://schemas.openxmlformats.org/drawingml/2006/compatibility" xmlns:p14="http://schemas.microsoft.com/office/powerpoint/2010/main" xmlns:p15="http://schemas.microsoft.com/office/powerpoint/2012/main" xmlns:ahyp="http://schemas.microsoft.com/office/drawing/2018/hyperlinkcolor" showMasterPhAnim="0" showMasterSp="0">
+<p:notes xmlns:a="http://schemas.openxmlformats.org/drawingml/2006/main" xmlns:r="http://schemas.openxmlformats.org/officeDocument/2006/relationships" xmlns:p="http://schemas.openxmlformats.org/presentationml/2006/main" showMasterSp="0" showMasterPhAnim="0">
   <p:cSld>
     <p:spTree>
       <p:nvGrpSpPr>
-        <p:cNvPr id="60" name="Shape 60"/>
+        <p:cNvPr id="1" name="Shape 60"/>
         <p:cNvGrpSpPr/>
         <p:nvPr/>
       </p:nvGrpSpPr>
@@ -735,9 +756,11 @@
       <p:sp>
         <p:nvSpPr>
           <p:cNvPr id="61" name="Google Shape;61;p:notes"/>
-          <p:cNvSpPr/>
+          <p:cNvSpPr>
+            <a:spLocks noGrp="1" noRot="1" noChangeAspect="1"/>
+          </p:cNvSpPr>
           <p:nvPr>
-            <p:ph idx="2" type="sldImg"/>
+            <p:ph type="sldImg" idx="2"/>
           </p:nvPr>
         </p:nvSpPr>
         <p:spPr>
@@ -746,9 +769,13 @@
             <a:ext cx="6096075" cy="3429000"/>
           </a:xfrm>
           <a:custGeom>
-            <a:rect b="b" l="l" r="r" t="t"/>
+            <a:avLst/>
+            <a:gdLst/>
+            <a:ahLst/>
+            <a:cxnLst/>
+            <a:rect l="l" t="t" r="r" b="b"/>
             <a:pathLst>
-              <a:path extrusionOk="0" h="120000" w="120000">
+              <a:path w="120000" h="120000" extrusionOk="0">
                 <a:moveTo>
                   <a:pt x="0" y="0"/>
                 </a:moveTo>
@@ -770,9 +797,11 @@
       <p:sp>
         <p:nvSpPr>
           <p:cNvPr id="62" name="Google Shape;62;p:notes"/>
-          <p:cNvSpPr txBox="1"/>
+          <p:cNvSpPr txBox="1">
+            <a:spLocks noGrp="1"/>
+          </p:cNvSpPr>
           <p:nvPr>
-            <p:ph idx="1" type="body"/>
+            <p:ph type="body" idx="1"/>
           </p:nvPr>
         </p:nvSpPr>
         <p:spPr>
@@ -785,12 +814,12 @@
           </a:prstGeom>
         </p:spPr>
         <p:txBody>
-          <a:bodyPr anchorCtr="0" anchor="t" bIns="91425" lIns="91425" spcFirstLastPara="1" rIns="91425" wrap="square" tIns="91425">
+          <a:bodyPr spcFirstLastPara="1" wrap="square" lIns="91425" tIns="91425" rIns="91425" bIns="91425" anchor="t" anchorCtr="0">
             <a:noAutofit/>
           </a:bodyPr>
           <a:lstStyle/>
           <a:p>
-            <a:pPr indent="0" lvl="0" marL="0" rtl="0" algn="l">
+            <a:pPr marL="0" lvl="0" indent="0" algn="l" rtl="0">
               <a:spcBef>
                 <a:spcPts val="0"/>
               </a:spcBef>
@@ -799,9 +828,6 @@
               </a:spcAft>
               <a:buNone/>
             </a:pPr>
-            <a:r>
-              <a:t/>
-            </a:r>
             <a:endParaRPr/>
           </a:p>
         </p:txBody>
@@ -815,11 +841,11 @@
 </file>
 
 <file path=ppt/notesSlides/notesSlide2.xml><?xml version="1.0" encoding="utf-8"?>
-<p:notes xmlns:a="http://schemas.openxmlformats.org/drawingml/2006/main" xmlns:r="http://schemas.openxmlformats.org/officeDocument/2006/relationships" xmlns:mc="http://schemas.openxmlformats.org/markup-compatibility/2006" xmlns:mv="urn:schemas-microsoft-com:mac:vml" xmlns:p="http://schemas.openxmlformats.org/presentationml/2006/main" xmlns:c="http://schemas.openxmlformats.org/drawingml/2006/chart" xmlns:dgm="http://schemas.openxmlformats.org/drawingml/2006/diagram" xmlns:o="urn:schemas-microsoft-com:office:office" xmlns:v="urn:schemas-microsoft-com:vml" xmlns:pvml="urn:schemas-microsoft-com:office:powerpoint" xmlns:com="http://schemas.openxmlformats.org/drawingml/2006/compatibility" xmlns:p14="http://schemas.microsoft.com/office/powerpoint/2010/main" xmlns:p15="http://schemas.microsoft.com/office/powerpoint/2012/main" xmlns:ahyp="http://schemas.microsoft.com/office/drawing/2018/hyperlinkcolor" showMasterPhAnim="0" showMasterSp="0">
+<p:notes xmlns:a="http://schemas.openxmlformats.org/drawingml/2006/main" xmlns:r="http://schemas.openxmlformats.org/officeDocument/2006/relationships" xmlns:p="http://schemas.openxmlformats.org/presentationml/2006/main" showMasterSp="0" showMasterPhAnim="0">
   <p:cSld>
     <p:spTree>
       <p:nvGrpSpPr>
-        <p:cNvPr id="68" name="Shape 68"/>
+        <p:cNvPr id="1" name="Shape 68"/>
         <p:cNvGrpSpPr/>
         <p:nvPr/>
       </p:nvGrpSpPr>
@@ -834,20 +860,26 @@
       <p:sp>
         <p:nvSpPr>
           <p:cNvPr id="69" name="Google Shape;69;gd26a40583a_0_61:notes"/>
-          <p:cNvSpPr/>
+          <p:cNvSpPr>
+            <a:spLocks noGrp="1" noRot="1" noChangeAspect="1"/>
+          </p:cNvSpPr>
           <p:nvPr>
-            <p:ph idx="2" type="sldImg"/>
+            <p:ph type="sldImg" idx="2"/>
           </p:nvPr>
         </p:nvSpPr>
         <p:spPr>
           <a:xfrm>
-            <a:off x="381300" y="685800"/>
+            <a:off x="381000" y="685800"/>
             <a:ext cx="6096000" cy="3429000"/>
           </a:xfrm>
           <a:custGeom>
-            <a:rect b="b" l="l" r="r" t="t"/>
+            <a:avLst/>
+            <a:gdLst/>
+            <a:ahLst/>
+            <a:cxnLst/>
+            <a:rect l="l" t="t" r="r" b="b"/>
             <a:pathLst>
-              <a:path extrusionOk="0" h="120000" w="120000">
+              <a:path w="120000" h="120000" extrusionOk="0">
                 <a:moveTo>
                   <a:pt x="0" y="0"/>
                 </a:moveTo>
@@ -869,9 +901,11 @@
       <p:sp>
         <p:nvSpPr>
           <p:cNvPr id="70" name="Google Shape;70;gd26a40583a_0_61:notes"/>
-          <p:cNvSpPr txBox="1"/>
+          <p:cNvSpPr txBox="1">
+            <a:spLocks noGrp="1"/>
+          </p:cNvSpPr>
           <p:nvPr>
-            <p:ph idx="1" type="body"/>
+            <p:ph type="body" idx="1"/>
           </p:nvPr>
         </p:nvSpPr>
         <p:spPr>
@@ -884,12 +918,12 @@
           </a:prstGeom>
         </p:spPr>
         <p:txBody>
-          <a:bodyPr anchorCtr="0" anchor="t" bIns="91425" lIns="91425" spcFirstLastPara="1" rIns="91425" wrap="square" tIns="91425">
+          <a:bodyPr spcFirstLastPara="1" wrap="square" lIns="91425" tIns="91425" rIns="91425" bIns="91425" anchor="t" anchorCtr="0">
             <a:noAutofit/>
           </a:bodyPr>
           <a:lstStyle/>
           <a:p>
-            <a:pPr indent="0" lvl="0" marL="0" rtl="0" algn="l">
+            <a:pPr marL="0" lvl="0" indent="0" algn="l" rtl="0">
               <a:spcBef>
                 <a:spcPts val="0"/>
               </a:spcBef>
@@ -898,9 +932,6 @@
               </a:spcAft>
               <a:buNone/>
             </a:pPr>
-            <a:r>
-              <a:t/>
-            </a:r>
             <a:endParaRPr/>
           </a:p>
         </p:txBody>
@@ -914,11 +945,11 @@
 </file>
 
 <file path=ppt/notesSlides/notesSlide3.xml><?xml version="1.0" encoding="utf-8"?>
-<p:notes xmlns:a="http://schemas.openxmlformats.org/drawingml/2006/main" xmlns:r="http://schemas.openxmlformats.org/officeDocument/2006/relationships" xmlns:mc="http://schemas.openxmlformats.org/markup-compatibility/2006" xmlns:mv="urn:schemas-microsoft-com:mac:vml" xmlns:p="http://schemas.openxmlformats.org/presentationml/2006/main" xmlns:c="http://schemas.openxmlformats.org/drawingml/2006/chart" xmlns:dgm="http://schemas.openxmlformats.org/drawingml/2006/diagram" xmlns:o="urn:schemas-microsoft-com:office:office" xmlns:v="urn:schemas-microsoft-com:vml" xmlns:pvml="urn:schemas-microsoft-com:office:powerpoint" xmlns:com="http://schemas.openxmlformats.org/drawingml/2006/compatibility" xmlns:p14="http://schemas.microsoft.com/office/powerpoint/2010/main" xmlns:p15="http://schemas.microsoft.com/office/powerpoint/2012/main" xmlns:ahyp="http://schemas.microsoft.com/office/drawing/2018/hyperlinkcolor" showMasterPhAnim="0" showMasterSp="0">
+<p:notes xmlns:a="http://schemas.openxmlformats.org/drawingml/2006/main" xmlns:r="http://schemas.openxmlformats.org/officeDocument/2006/relationships" xmlns:p="http://schemas.openxmlformats.org/presentationml/2006/main" showMasterSp="0" showMasterPhAnim="0">
   <p:cSld>
     <p:spTree>
       <p:nvGrpSpPr>
-        <p:cNvPr id="76" name="Shape 76"/>
+        <p:cNvPr id="1" name="Shape 76"/>
         <p:cNvGrpSpPr/>
         <p:nvPr/>
       </p:nvGrpSpPr>
@@ -933,9 +964,11 @@
       <p:sp>
         <p:nvSpPr>
           <p:cNvPr id="77" name="Google Shape;77;gd26a40583a_0_80:notes"/>
-          <p:cNvSpPr/>
+          <p:cNvSpPr>
+            <a:spLocks noGrp="1" noRot="1" noChangeAspect="1"/>
+          </p:cNvSpPr>
           <p:nvPr>
-            <p:ph idx="2" type="sldImg"/>
+            <p:ph type="sldImg" idx="2"/>
           </p:nvPr>
         </p:nvSpPr>
         <p:spPr>
@@ -944,9 +977,13 @@
             <a:ext cx="6096000" cy="3429000"/>
           </a:xfrm>
           <a:custGeom>
-            <a:rect b="b" l="l" r="r" t="t"/>
+            <a:avLst/>
+            <a:gdLst/>
+            <a:ahLst/>
+            <a:cxnLst/>
+            <a:rect l="l" t="t" r="r" b="b"/>
             <a:pathLst>
-              <a:path extrusionOk="0" h="120000" w="120000">
+              <a:path w="120000" h="120000" extrusionOk="0">
                 <a:moveTo>
                   <a:pt x="0" y="0"/>
                 </a:moveTo>
@@ -968,9 +1005,11 @@
       <p:sp>
         <p:nvSpPr>
           <p:cNvPr id="78" name="Google Shape;78;gd26a40583a_0_80:notes"/>
-          <p:cNvSpPr txBox="1"/>
+          <p:cNvSpPr txBox="1">
+            <a:spLocks noGrp="1"/>
+          </p:cNvSpPr>
           <p:nvPr>
-            <p:ph idx="1" type="body"/>
+            <p:ph type="body" idx="1"/>
           </p:nvPr>
         </p:nvSpPr>
         <p:spPr>
@@ -983,12 +1022,12 @@
           </a:prstGeom>
         </p:spPr>
         <p:txBody>
-          <a:bodyPr anchorCtr="0" anchor="t" bIns="91425" lIns="91425" spcFirstLastPara="1" rIns="91425" wrap="square" tIns="91425">
+          <a:bodyPr spcFirstLastPara="1" wrap="square" lIns="91425" tIns="91425" rIns="91425" bIns="91425" anchor="t" anchorCtr="0">
             <a:noAutofit/>
           </a:bodyPr>
           <a:lstStyle/>
           <a:p>
-            <a:pPr indent="0" lvl="0" marL="0" rtl="0" algn="l">
+            <a:pPr marL="0" lvl="0" indent="0" algn="l" rtl="0">
               <a:spcBef>
                 <a:spcPts val="0"/>
               </a:spcBef>
@@ -997,9 +1036,6 @@
               </a:spcAft>
               <a:buNone/>
             </a:pPr>
-            <a:r>
-              <a:t/>
-            </a:r>
             <a:endParaRPr/>
           </a:p>
         </p:txBody>
@@ -1013,11 +1049,11 @@
 </file>
 
 <file path=ppt/notesSlides/notesSlide4.xml><?xml version="1.0" encoding="utf-8"?>
-<p:notes xmlns:a="http://schemas.openxmlformats.org/drawingml/2006/main" xmlns:r="http://schemas.openxmlformats.org/officeDocument/2006/relationships" xmlns:mc="http://schemas.openxmlformats.org/markup-compatibility/2006" xmlns:mv="urn:schemas-microsoft-com:mac:vml" xmlns:p="http://schemas.openxmlformats.org/presentationml/2006/main" xmlns:c="http://schemas.openxmlformats.org/drawingml/2006/chart" xmlns:dgm="http://schemas.openxmlformats.org/drawingml/2006/diagram" xmlns:o="urn:schemas-microsoft-com:office:office" xmlns:v="urn:schemas-microsoft-com:vml" xmlns:pvml="urn:schemas-microsoft-com:office:powerpoint" xmlns:com="http://schemas.openxmlformats.org/drawingml/2006/compatibility" xmlns:p14="http://schemas.microsoft.com/office/powerpoint/2010/main" xmlns:p15="http://schemas.microsoft.com/office/powerpoint/2012/main" xmlns:ahyp="http://schemas.microsoft.com/office/drawing/2018/hyperlinkcolor" showMasterPhAnim="0" showMasterSp="0">
+<p:notes xmlns:a="http://schemas.openxmlformats.org/drawingml/2006/main" xmlns:r="http://schemas.openxmlformats.org/officeDocument/2006/relationships" xmlns:p="http://schemas.openxmlformats.org/presentationml/2006/main" showMasterSp="0" showMasterPhAnim="0">
   <p:cSld>
     <p:spTree>
       <p:nvGrpSpPr>
-        <p:cNvPr id="89" name="Shape 89"/>
+        <p:cNvPr id="1" name="Shape 89"/>
         <p:cNvGrpSpPr/>
         <p:nvPr/>
       </p:nvGrpSpPr>
@@ -1032,9 +1068,11 @@
       <p:sp>
         <p:nvSpPr>
           <p:cNvPr id="90" name="Google Shape;90;gd26a40583a_0_88:notes"/>
-          <p:cNvSpPr/>
+          <p:cNvSpPr>
+            <a:spLocks noGrp="1" noRot="1" noChangeAspect="1"/>
+          </p:cNvSpPr>
           <p:nvPr>
-            <p:ph idx="2" type="sldImg"/>
+            <p:ph type="sldImg" idx="2"/>
           </p:nvPr>
         </p:nvSpPr>
         <p:spPr>
@@ -1043,9 +1081,13 @@
             <a:ext cx="6096000" cy="3429000"/>
           </a:xfrm>
           <a:custGeom>
-            <a:rect b="b" l="l" r="r" t="t"/>
+            <a:avLst/>
+            <a:gdLst/>
+            <a:ahLst/>
+            <a:cxnLst/>
+            <a:rect l="l" t="t" r="r" b="b"/>
             <a:pathLst>
-              <a:path extrusionOk="0" h="120000" w="120000">
+              <a:path w="120000" h="120000" extrusionOk="0">
                 <a:moveTo>
                   <a:pt x="0" y="0"/>
                 </a:moveTo>
@@ -1067,9 +1109,11 @@
       <p:sp>
         <p:nvSpPr>
           <p:cNvPr id="91" name="Google Shape;91;gd26a40583a_0_88:notes"/>
-          <p:cNvSpPr txBox="1"/>
+          <p:cNvSpPr txBox="1">
+            <a:spLocks noGrp="1"/>
+          </p:cNvSpPr>
           <p:nvPr>
-            <p:ph idx="1" type="body"/>
+            <p:ph type="body" idx="1"/>
           </p:nvPr>
         </p:nvSpPr>
         <p:spPr>
@@ -1082,12 +1126,12 @@
           </a:prstGeom>
         </p:spPr>
         <p:txBody>
-          <a:bodyPr anchorCtr="0" anchor="t" bIns="91425" lIns="91425" spcFirstLastPara="1" rIns="91425" wrap="square" tIns="91425">
+          <a:bodyPr spcFirstLastPara="1" wrap="square" lIns="91425" tIns="91425" rIns="91425" bIns="91425" anchor="t" anchorCtr="0">
             <a:noAutofit/>
           </a:bodyPr>
           <a:lstStyle/>
           <a:p>
-            <a:pPr indent="0" lvl="0" marL="0" rtl="0" algn="l">
+            <a:pPr marL="0" lvl="0" indent="0" algn="l" rtl="0">
               <a:spcBef>
                 <a:spcPts val="0"/>
               </a:spcBef>
@@ -1096,9 +1140,6 @@
               </a:spcAft>
               <a:buNone/>
             </a:pPr>
-            <a:r>
-              <a:t/>
-            </a:r>
             <a:endParaRPr/>
           </a:p>
         </p:txBody>
@@ -1112,11 +1153,11 @@
 </file>
 
 <file path=ppt/notesSlides/notesSlide5.xml><?xml version="1.0" encoding="utf-8"?>
-<p:notes xmlns:a="http://schemas.openxmlformats.org/drawingml/2006/main" xmlns:r="http://schemas.openxmlformats.org/officeDocument/2006/relationships" xmlns:mc="http://schemas.openxmlformats.org/markup-compatibility/2006" xmlns:mv="urn:schemas-microsoft-com:mac:vml" xmlns:p="http://schemas.openxmlformats.org/presentationml/2006/main" xmlns:c="http://schemas.openxmlformats.org/drawingml/2006/chart" xmlns:dgm="http://schemas.openxmlformats.org/drawingml/2006/diagram" xmlns:o="urn:schemas-microsoft-com:office:office" xmlns:v="urn:schemas-microsoft-com:vml" xmlns:pvml="urn:schemas-microsoft-com:office:powerpoint" xmlns:com="http://schemas.openxmlformats.org/drawingml/2006/compatibility" xmlns:p14="http://schemas.microsoft.com/office/powerpoint/2010/main" xmlns:p15="http://schemas.microsoft.com/office/powerpoint/2012/main" xmlns:ahyp="http://schemas.microsoft.com/office/drawing/2018/hyperlinkcolor" showMasterPhAnim="0" showMasterSp="0">
+<p:notes xmlns:a="http://schemas.openxmlformats.org/drawingml/2006/main" xmlns:r="http://schemas.openxmlformats.org/officeDocument/2006/relationships" xmlns:p="http://schemas.openxmlformats.org/presentationml/2006/main" showMasterSp="0" showMasterPhAnim="0">
   <p:cSld>
     <p:spTree>
       <p:nvGrpSpPr>
-        <p:cNvPr id="96" name="Shape 96"/>
+        <p:cNvPr id="1" name="Shape 96"/>
         <p:cNvGrpSpPr/>
         <p:nvPr/>
       </p:nvGrpSpPr>
@@ -1131,9 +1172,11 @@
       <p:sp>
         <p:nvSpPr>
           <p:cNvPr id="97" name="Google Shape;97;gd26a40583a_0_95:notes"/>
-          <p:cNvSpPr/>
+          <p:cNvSpPr>
+            <a:spLocks noGrp="1" noRot="1" noChangeAspect="1"/>
+          </p:cNvSpPr>
           <p:nvPr>
-            <p:ph idx="2" type="sldImg"/>
+            <p:ph type="sldImg" idx="2"/>
           </p:nvPr>
         </p:nvSpPr>
         <p:spPr>
@@ -1142,9 +1185,13 @@
             <a:ext cx="6096000" cy="3429000"/>
           </a:xfrm>
           <a:custGeom>
-            <a:rect b="b" l="l" r="r" t="t"/>
+            <a:avLst/>
+            <a:gdLst/>
+            <a:ahLst/>
+            <a:cxnLst/>
+            <a:rect l="l" t="t" r="r" b="b"/>
             <a:pathLst>
-              <a:path extrusionOk="0" h="120000" w="120000">
+              <a:path w="120000" h="120000" extrusionOk="0">
                 <a:moveTo>
                   <a:pt x="0" y="0"/>
                 </a:moveTo>
@@ -1166,9 +1213,11 @@
       <p:sp>
         <p:nvSpPr>
           <p:cNvPr id="98" name="Google Shape;98;gd26a40583a_0_95:notes"/>
-          <p:cNvSpPr txBox="1"/>
+          <p:cNvSpPr txBox="1">
+            <a:spLocks noGrp="1"/>
+          </p:cNvSpPr>
           <p:nvPr>
-            <p:ph idx="1" type="body"/>
+            <p:ph type="body" idx="1"/>
           </p:nvPr>
         </p:nvSpPr>
         <p:spPr>
@@ -1181,12 +1230,12 @@
           </a:prstGeom>
         </p:spPr>
         <p:txBody>
-          <a:bodyPr anchorCtr="0" anchor="t" bIns="91425" lIns="91425" spcFirstLastPara="1" rIns="91425" wrap="square" tIns="91425">
+          <a:bodyPr spcFirstLastPara="1" wrap="square" lIns="91425" tIns="91425" rIns="91425" bIns="91425" anchor="t" anchorCtr="0">
             <a:noAutofit/>
           </a:bodyPr>
           <a:lstStyle/>
           <a:p>
-            <a:pPr indent="0" lvl="0" marL="0" rtl="0" algn="l">
+            <a:pPr marL="0" lvl="0" indent="0" algn="l" rtl="0">
               <a:spcBef>
                 <a:spcPts val="0"/>
               </a:spcBef>
@@ -1195,9 +1244,6 @@
               </a:spcAft>
               <a:buNone/>
             </a:pPr>
-            <a:r>
-              <a:t/>
-            </a:r>
             <a:endParaRPr/>
           </a:p>
         </p:txBody>
@@ -1211,11 +1257,11 @@
 </file>
 
 <file path=ppt/notesSlides/notesSlide6.xml><?xml version="1.0" encoding="utf-8"?>
-<p:notes xmlns:a="http://schemas.openxmlformats.org/drawingml/2006/main" xmlns:r="http://schemas.openxmlformats.org/officeDocument/2006/relationships" xmlns:mc="http://schemas.openxmlformats.org/markup-compatibility/2006" xmlns:mv="urn:schemas-microsoft-com:mac:vml" xmlns:p="http://schemas.openxmlformats.org/presentationml/2006/main" xmlns:c="http://schemas.openxmlformats.org/drawingml/2006/chart" xmlns:dgm="http://schemas.openxmlformats.org/drawingml/2006/diagram" xmlns:o="urn:schemas-microsoft-com:office:office" xmlns:v="urn:schemas-microsoft-com:vml" xmlns:pvml="urn:schemas-microsoft-com:office:powerpoint" xmlns:com="http://schemas.openxmlformats.org/drawingml/2006/compatibility" xmlns:p14="http://schemas.microsoft.com/office/powerpoint/2010/main" xmlns:p15="http://schemas.microsoft.com/office/powerpoint/2012/main" xmlns:ahyp="http://schemas.microsoft.com/office/drawing/2018/hyperlinkcolor" showMasterPhAnim="0" showMasterSp="0">
+<p:notes xmlns:a="http://schemas.openxmlformats.org/drawingml/2006/main" xmlns:r="http://schemas.openxmlformats.org/officeDocument/2006/relationships" xmlns:p="http://schemas.openxmlformats.org/presentationml/2006/main" showMasterSp="0" showMasterPhAnim="0">
   <p:cSld>
     <p:spTree>
       <p:nvGrpSpPr>
-        <p:cNvPr id="103" name="Shape 103"/>
+        <p:cNvPr id="1" name="Shape 103"/>
         <p:cNvGrpSpPr/>
         <p:nvPr/>
       </p:nvGrpSpPr>
@@ -1230,9 +1276,11 @@
       <p:sp>
         <p:nvSpPr>
           <p:cNvPr id="104" name="Google Shape;104;gd26a40583a_0_115:notes"/>
-          <p:cNvSpPr/>
+          <p:cNvSpPr>
+            <a:spLocks noGrp="1" noRot="1" noChangeAspect="1"/>
+          </p:cNvSpPr>
           <p:nvPr>
-            <p:ph idx="2" type="sldImg"/>
+            <p:ph type="sldImg" idx="2"/>
           </p:nvPr>
         </p:nvSpPr>
         <p:spPr>
@@ -1241,9 +1289,13 @@
             <a:ext cx="6096000" cy="3429000"/>
           </a:xfrm>
           <a:custGeom>
-            <a:rect b="b" l="l" r="r" t="t"/>
+            <a:avLst/>
+            <a:gdLst/>
+            <a:ahLst/>
+            <a:cxnLst/>
+            <a:rect l="l" t="t" r="r" b="b"/>
             <a:pathLst>
-              <a:path extrusionOk="0" h="120000" w="120000">
+              <a:path w="120000" h="120000" extrusionOk="0">
                 <a:moveTo>
                   <a:pt x="0" y="0"/>
                 </a:moveTo>
@@ -1265,9 +1317,11 @@
       <p:sp>
         <p:nvSpPr>
           <p:cNvPr id="105" name="Google Shape;105;gd26a40583a_0_115:notes"/>
-          <p:cNvSpPr txBox="1"/>
+          <p:cNvSpPr txBox="1">
+            <a:spLocks noGrp="1"/>
+          </p:cNvSpPr>
           <p:nvPr>
-            <p:ph idx="1" type="body"/>
+            <p:ph type="body" idx="1"/>
           </p:nvPr>
         </p:nvSpPr>
         <p:spPr>
@@ -1280,12 +1334,12 @@
           </a:prstGeom>
         </p:spPr>
         <p:txBody>
-          <a:bodyPr anchorCtr="0" anchor="t" bIns="91425" lIns="91425" spcFirstLastPara="1" rIns="91425" wrap="square" tIns="91425">
+          <a:bodyPr spcFirstLastPara="1" wrap="square" lIns="91425" tIns="91425" rIns="91425" bIns="91425" anchor="t" anchorCtr="0">
             <a:noAutofit/>
           </a:bodyPr>
           <a:lstStyle/>
           <a:p>
-            <a:pPr indent="0" lvl="0" marL="0" rtl="0" algn="l">
+            <a:pPr marL="0" lvl="0" indent="0" algn="l" rtl="0">
               <a:spcBef>
                 <a:spcPts val="0"/>
               </a:spcBef>
@@ -1294,9 +1348,6 @@
               </a:spcAft>
               <a:buNone/>
             </a:pPr>
-            <a:r>
-              <a:t/>
-            </a:r>
             <a:endParaRPr/>
           </a:p>
         </p:txBody>
@@ -1310,11 +1361,11 @@
 </file>
 
 <file path=ppt/notesSlides/notesSlide7.xml><?xml version="1.0" encoding="utf-8"?>
-<p:notes xmlns:a="http://schemas.openxmlformats.org/drawingml/2006/main" xmlns:r="http://schemas.openxmlformats.org/officeDocument/2006/relationships" xmlns:mc="http://schemas.openxmlformats.org/markup-compatibility/2006" xmlns:mv="urn:schemas-microsoft-com:mac:vml" xmlns:p="http://schemas.openxmlformats.org/presentationml/2006/main" xmlns:c="http://schemas.openxmlformats.org/drawingml/2006/chart" xmlns:dgm="http://schemas.openxmlformats.org/drawingml/2006/diagram" xmlns:o="urn:schemas-microsoft-com:office:office" xmlns:v="urn:schemas-microsoft-com:vml" xmlns:pvml="urn:schemas-microsoft-com:office:powerpoint" xmlns:com="http://schemas.openxmlformats.org/drawingml/2006/compatibility" xmlns:p14="http://schemas.microsoft.com/office/powerpoint/2010/main" xmlns:p15="http://schemas.microsoft.com/office/powerpoint/2012/main" xmlns:ahyp="http://schemas.microsoft.com/office/drawing/2018/hyperlinkcolor" showMasterPhAnim="0" showMasterSp="0">
+<p:notes xmlns:a="http://schemas.openxmlformats.org/drawingml/2006/main" xmlns:r="http://schemas.openxmlformats.org/officeDocument/2006/relationships" xmlns:p="http://schemas.openxmlformats.org/presentationml/2006/main" showMasterSp="0" showMasterPhAnim="0">
   <p:cSld>
     <p:spTree>
       <p:nvGrpSpPr>
-        <p:cNvPr id="110" name="Shape 110"/>
+        <p:cNvPr id="1" name="Shape 110"/>
         <p:cNvGrpSpPr/>
         <p:nvPr/>
       </p:nvGrpSpPr>
@@ -1329,9 +1380,11 @@
       <p:sp>
         <p:nvSpPr>
           <p:cNvPr id="111" name="Google Shape;111;gd26a40583a_0_103:notes"/>
-          <p:cNvSpPr/>
+          <p:cNvSpPr>
+            <a:spLocks noGrp="1" noRot="1" noChangeAspect="1"/>
+          </p:cNvSpPr>
           <p:nvPr>
-            <p:ph idx="2" type="sldImg"/>
+            <p:ph type="sldImg" idx="2"/>
           </p:nvPr>
         </p:nvSpPr>
         <p:spPr>
@@ -1340,9 +1393,13 @@
             <a:ext cx="6096000" cy="3429000"/>
           </a:xfrm>
           <a:custGeom>
-            <a:rect b="b" l="l" r="r" t="t"/>
+            <a:avLst/>
+            <a:gdLst/>
+            <a:ahLst/>
+            <a:cxnLst/>
+            <a:rect l="l" t="t" r="r" b="b"/>
             <a:pathLst>
-              <a:path extrusionOk="0" h="120000" w="120000">
+              <a:path w="120000" h="120000" extrusionOk="0">
                 <a:moveTo>
                   <a:pt x="0" y="0"/>
                 </a:moveTo>
@@ -1364,9 +1421,11 @@
       <p:sp>
         <p:nvSpPr>
           <p:cNvPr id="112" name="Google Shape;112;gd26a40583a_0_103:notes"/>
-          <p:cNvSpPr txBox="1"/>
+          <p:cNvSpPr txBox="1">
+            <a:spLocks noGrp="1"/>
+          </p:cNvSpPr>
           <p:nvPr>
-            <p:ph idx="1" type="body"/>
+            <p:ph type="body" idx="1"/>
           </p:nvPr>
         </p:nvSpPr>
         <p:spPr>
@@ -1379,12 +1438,12 @@
           </a:prstGeom>
         </p:spPr>
         <p:txBody>
-          <a:bodyPr anchorCtr="0" anchor="t" bIns="91425" lIns="91425" spcFirstLastPara="1" rIns="91425" wrap="square" tIns="91425">
+          <a:bodyPr spcFirstLastPara="1" wrap="square" lIns="91425" tIns="91425" rIns="91425" bIns="91425" anchor="t" anchorCtr="0">
             <a:noAutofit/>
           </a:bodyPr>
           <a:lstStyle/>
           <a:p>
-            <a:pPr indent="0" lvl="0" marL="0" rtl="0" algn="l">
+            <a:pPr marL="0" lvl="0" indent="0" algn="l" rtl="0">
               <a:spcBef>
                 <a:spcPts val="0"/>
               </a:spcBef>
@@ -1393,9 +1452,6 @@
               </a:spcAft>
               <a:buNone/>
             </a:pPr>
-            <a:r>
-              <a:t/>
-            </a:r>
             <a:endParaRPr/>
           </a:p>
         </p:txBody>
@@ -1409,18 +1465,19 @@
 </file>
 
 <file path=ppt/slideLayouts/slideLayout1.xml><?xml version="1.0" encoding="utf-8"?>
-<p:sldLayout xmlns:a="http://schemas.openxmlformats.org/drawingml/2006/main" xmlns:r="http://schemas.openxmlformats.org/officeDocument/2006/relationships" xmlns:mc="http://schemas.openxmlformats.org/markup-compatibility/2006" xmlns:mv="urn:schemas-microsoft-com:mac:vml" xmlns:p="http://schemas.openxmlformats.org/presentationml/2006/main" xmlns:c="http://schemas.openxmlformats.org/drawingml/2006/chart" xmlns:dgm="http://schemas.openxmlformats.org/drawingml/2006/diagram" xmlns:o="urn:schemas-microsoft-com:office:office" xmlns:v="urn:schemas-microsoft-com:vml" xmlns:pvml="urn:schemas-microsoft-com:office:powerpoint" xmlns:com="http://schemas.openxmlformats.org/drawingml/2006/compatibility" xmlns:p14="http://schemas.microsoft.com/office/powerpoint/2010/main" xmlns:p15="http://schemas.microsoft.com/office/powerpoint/2012/main" xmlns:ahyp="http://schemas.microsoft.com/office/drawing/2018/hyperlinkcolor" matchingName="Title slide" type="title">
+<p:sldLayout xmlns:a="http://schemas.openxmlformats.org/drawingml/2006/main" xmlns:r="http://schemas.openxmlformats.org/officeDocument/2006/relationships" xmlns:p="http://schemas.openxmlformats.org/presentationml/2006/main" matchingName="Title slide" type="title">
   <p:cSld name="TITLE">
     <p:bg>
       <p:bgPr>
         <a:solidFill>
           <a:schemeClr val="dk1"/>
         </a:solidFill>
+        <a:effectLst/>
       </p:bgPr>
     </p:bg>
     <p:spTree>
       <p:nvGrpSpPr>
-        <p:cNvPr id="9" name="Shape 9"/>
+        <p:cNvPr id="1" name="Shape 9"/>
         <p:cNvGrpSpPr/>
         <p:nvPr/>
       </p:nvGrpSpPr>
@@ -1444,9 +1501,13 @@
             <a:ext cx="9144250" cy="4398100"/>
           </a:xfrm>
           <a:custGeom>
-            <a:rect b="b" l="l" r="r" t="t"/>
+            <a:avLst/>
+            <a:gdLst/>
+            <a:ahLst/>
+            <a:cxnLst/>
+            <a:rect l="l" t="t" r="r" b="b"/>
             <a:pathLst>
-              <a:path extrusionOk="0" h="175924" w="365770">
+              <a:path w="365770" h="175924" extrusionOk="0">
                 <a:moveTo>
                   <a:pt x="0" y="0"/>
                 </a:moveTo>
@@ -1474,7 +1535,9 @@
       <p:sp>
         <p:nvSpPr>
           <p:cNvPr id="11" name="Google Shape;11;p2"/>
-          <p:cNvSpPr txBox="1"/>
+          <p:cNvSpPr txBox="1">
+            <a:spLocks noGrp="1"/>
+          </p:cNvSpPr>
           <p:nvPr>
             <p:ph type="ctrTitle"/>
           </p:nvPr>
@@ -1489,7 +1552,7 @@
           </a:prstGeom>
         </p:spPr>
         <p:txBody>
-          <a:bodyPr anchorCtr="0" anchor="t" bIns="91425" lIns="91425" spcFirstLastPara="1" rIns="91425" wrap="square" tIns="91425">
+          <a:bodyPr spcFirstLastPara="1" wrap="square" lIns="91425" tIns="91425" rIns="91425" bIns="91425" anchor="t" anchorCtr="0">
             <a:normAutofit/>
           </a:bodyPr>
           <a:lstStyle>
@@ -1593,15 +1656,19 @@
               <a:defRPr sz="3600"/>
             </a:lvl9pPr>
           </a:lstStyle>
-          <a:p/>
+          <a:p>
+            <a:endParaRPr/>
+          </a:p>
         </p:txBody>
       </p:sp>
       <p:sp>
         <p:nvSpPr>
           <p:cNvPr id="12" name="Google Shape;12;p2"/>
-          <p:cNvSpPr txBox="1"/>
+          <p:cNvSpPr txBox="1">
+            <a:spLocks noGrp="1"/>
+          </p:cNvSpPr>
           <p:nvPr>
-            <p:ph idx="1" type="subTitle"/>
+            <p:ph type="subTitle" idx="1"/>
           </p:nvPr>
         </p:nvSpPr>
         <p:spPr>
@@ -1614,7 +1681,7 @@
           </a:prstGeom>
         </p:spPr>
         <p:txBody>
-          <a:bodyPr anchorCtr="0" anchor="t" bIns="91425" lIns="91425" spcFirstLastPara="1" rIns="91425" wrap="square" tIns="91425">
+          <a:bodyPr spcFirstLastPara="1" wrap="square" lIns="91425" tIns="91425" rIns="91425" bIns="91425" anchor="t" anchorCtr="0">
             <a:normAutofit/>
           </a:bodyPr>
           <a:lstStyle>
@@ -1808,15 +1875,19 @@
               </a:defRPr>
             </a:lvl9pPr>
           </a:lstStyle>
-          <a:p/>
+          <a:p>
+            <a:endParaRPr/>
+          </a:p>
         </p:txBody>
       </p:sp>
       <p:sp>
         <p:nvSpPr>
           <p:cNvPr id="13" name="Google Shape;13;p2"/>
-          <p:cNvSpPr txBox="1"/>
+          <p:cNvSpPr txBox="1">
+            <a:spLocks noGrp="1"/>
+          </p:cNvSpPr>
           <p:nvPr>
-            <p:ph idx="12" type="sldNum"/>
+            <p:ph type="sldNum" idx="12"/>
           </p:nvPr>
         </p:nvSpPr>
         <p:spPr>
@@ -1829,7 +1900,7 @@
           </a:prstGeom>
         </p:spPr>
         <p:txBody>
-          <a:bodyPr anchorCtr="0" anchor="ctr" bIns="91425" lIns="91425" spcFirstLastPara="1" rIns="91425" wrap="square" tIns="91425">
+          <a:bodyPr spcFirstLastPara="1" wrap="square" lIns="91425" tIns="91425" rIns="91425" bIns="91425" anchor="ctr" anchorCtr="0">
             <a:normAutofit/>
           </a:bodyPr>
           <a:lstStyle>
@@ -1907,7 +1978,7 @@
             </a:lvl9pPr>
           </a:lstStyle>
           <a:p>
-            <a:pPr indent="0" lvl="0" marL="0" rtl="0" algn="r">
+            <a:pPr marL="0" lvl="0" indent="0" algn="r" rtl="0">
               <a:spcBef>
                 <a:spcPts val="0"/>
               </a:spcBef>
@@ -1918,7 +1989,7 @@
             </a:pPr>
             <a:fld id="{00000000-1234-1234-1234-123412341234}" type="slidenum">
               <a:rPr lang="es"/>
-              <a:t>‹#›</a:t>
+              <a:t>‹Nº›</a:t>
             </a:fld>
             <a:endParaRPr/>
           </a:p>
@@ -1933,18 +2004,19 @@
 </file>
 
 <file path=ppt/slideLayouts/slideLayout10.xml><?xml version="1.0" encoding="utf-8"?>
-<p:sldLayout xmlns:a="http://schemas.openxmlformats.org/drawingml/2006/main" xmlns:r="http://schemas.openxmlformats.org/officeDocument/2006/relationships" xmlns:mc="http://schemas.openxmlformats.org/markup-compatibility/2006" xmlns:mv="urn:schemas-microsoft-com:mac:vml" xmlns:p="http://schemas.openxmlformats.org/presentationml/2006/main" xmlns:c="http://schemas.openxmlformats.org/drawingml/2006/chart" xmlns:dgm="http://schemas.openxmlformats.org/drawingml/2006/diagram" xmlns:o="urn:schemas-microsoft-com:office:office" xmlns:v="urn:schemas-microsoft-com:vml" xmlns:pvml="urn:schemas-microsoft-com:office:powerpoint" xmlns:com="http://schemas.openxmlformats.org/drawingml/2006/compatibility" xmlns:p14="http://schemas.microsoft.com/office/powerpoint/2010/main" xmlns:p15="http://schemas.microsoft.com/office/powerpoint/2012/main" xmlns:ahyp="http://schemas.microsoft.com/office/drawing/2018/hyperlinkcolor" matchingName="Big number">
+<p:sldLayout xmlns:a="http://schemas.openxmlformats.org/drawingml/2006/main" xmlns:r="http://schemas.openxmlformats.org/officeDocument/2006/relationships" xmlns:p="http://schemas.openxmlformats.org/presentationml/2006/main" matchingName="Big number">
   <p:cSld name="BIG_NUMBER">
     <p:bg>
       <p:bgPr>
         <a:solidFill>
           <a:schemeClr val="dk1"/>
         </a:solidFill>
+        <a:effectLst/>
       </p:bgPr>
     </p:bg>
     <p:spTree>
       <p:nvGrpSpPr>
-        <p:cNvPr id="54" name="Shape 54"/>
+        <p:cNvPr id="1" name="Shape 54"/>
         <p:cNvGrpSpPr/>
         <p:nvPr/>
       </p:nvGrpSpPr>
@@ -1959,9 +2031,11 @@
       <p:sp>
         <p:nvSpPr>
           <p:cNvPr id="55" name="Google Shape;55;p11"/>
-          <p:cNvSpPr txBox="1"/>
+          <p:cNvSpPr txBox="1">
+            <a:spLocks noGrp="1"/>
+          </p:cNvSpPr>
           <p:nvPr>
-            <p:ph hasCustomPrompt="1" type="title"/>
+            <p:ph type="title" hasCustomPrompt="1"/>
           </p:nvPr>
         </p:nvSpPr>
         <p:spPr>
@@ -1974,7 +2048,7 @@
           </a:prstGeom>
         </p:spPr>
         <p:txBody>
-          <a:bodyPr anchorCtr="0" anchor="b" bIns="91425" lIns="91425" spcFirstLastPara="1" rIns="91425" wrap="square" tIns="91425">
+          <a:bodyPr spcFirstLastPara="1" wrap="square" lIns="91425" tIns="91425" rIns="91425" bIns="91425" anchor="b" anchorCtr="0">
             <a:normAutofit/>
           </a:bodyPr>
           <a:lstStyle>
@@ -2151,9 +2225,11 @@
       <p:sp>
         <p:nvSpPr>
           <p:cNvPr id="56" name="Google Shape;56;p11"/>
-          <p:cNvSpPr txBox="1"/>
+          <p:cNvSpPr txBox="1">
+            <a:spLocks noGrp="1"/>
+          </p:cNvSpPr>
           <p:nvPr>
-            <p:ph idx="1" type="body"/>
+            <p:ph type="body" idx="1"/>
           </p:nvPr>
         </p:nvSpPr>
         <p:spPr>
@@ -2166,11 +2242,11 @@
           </a:prstGeom>
         </p:spPr>
         <p:txBody>
-          <a:bodyPr anchorCtr="0" anchor="t" bIns="91425" lIns="91425" spcFirstLastPara="1" rIns="91425" wrap="square" tIns="91425">
+          <a:bodyPr spcFirstLastPara="1" wrap="square" lIns="91425" tIns="91425" rIns="91425" bIns="91425" anchor="t" anchorCtr="0">
             <a:normAutofit/>
           </a:bodyPr>
           <a:lstStyle>
-            <a:lvl1pPr indent="-311150" lvl="0" marL="457200">
+            <a:lvl1pPr marL="457200" lvl="0" indent="-311150">
               <a:spcBef>
                 <a:spcPts val="0"/>
               </a:spcBef>
@@ -2188,7 +2264,7 @@
                 </a:solidFill>
               </a:defRPr>
             </a:lvl1pPr>
-            <a:lvl2pPr indent="-298450" lvl="1" marL="914400">
+            <a:lvl2pPr marL="914400" lvl="1" indent="-298450">
               <a:spcBef>
                 <a:spcPts val="0"/>
               </a:spcBef>
@@ -2206,7 +2282,7 @@
                 </a:solidFill>
               </a:defRPr>
             </a:lvl2pPr>
-            <a:lvl3pPr indent="-298450" lvl="2" marL="1371600">
+            <a:lvl3pPr marL="1371600" lvl="2" indent="-298450">
               <a:spcBef>
                 <a:spcPts val="0"/>
               </a:spcBef>
@@ -2224,7 +2300,7 @@
                 </a:solidFill>
               </a:defRPr>
             </a:lvl3pPr>
-            <a:lvl4pPr indent="-298450" lvl="3" marL="1828800">
+            <a:lvl4pPr marL="1828800" lvl="3" indent="-298450">
               <a:spcBef>
                 <a:spcPts val="0"/>
               </a:spcBef>
@@ -2242,7 +2318,7 @@
                 </a:solidFill>
               </a:defRPr>
             </a:lvl4pPr>
-            <a:lvl5pPr indent="-298450" lvl="4" marL="2286000">
+            <a:lvl5pPr marL="2286000" lvl="4" indent="-298450">
               <a:spcBef>
                 <a:spcPts val="0"/>
               </a:spcBef>
@@ -2260,7 +2336,7 @@
                 </a:solidFill>
               </a:defRPr>
             </a:lvl5pPr>
-            <a:lvl6pPr indent="-298450" lvl="5" marL="2743200">
+            <a:lvl6pPr marL="2743200" lvl="5" indent="-298450">
               <a:spcBef>
                 <a:spcPts val="0"/>
               </a:spcBef>
@@ -2278,7 +2354,7 @@
                 </a:solidFill>
               </a:defRPr>
             </a:lvl6pPr>
-            <a:lvl7pPr indent="-298450" lvl="6" marL="3200400">
+            <a:lvl7pPr marL="3200400" lvl="6" indent="-298450">
               <a:spcBef>
                 <a:spcPts val="0"/>
               </a:spcBef>
@@ -2296,7 +2372,7 @@
                 </a:solidFill>
               </a:defRPr>
             </a:lvl7pPr>
-            <a:lvl8pPr indent="-298450" lvl="7" marL="3657600">
+            <a:lvl8pPr marL="3657600" lvl="7" indent="-298450">
               <a:spcBef>
                 <a:spcPts val="0"/>
               </a:spcBef>
@@ -2314,7 +2390,7 @@
                 </a:solidFill>
               </a:defRPr>
             </a:lvl8pPr>
-            <a:lvl9pPr indent="-298450" lvl="8" marL="4114800">
+            <a:lvl9pPr marL="4114800" lvl="8" indent="-298450">
               <a:spcBef>
                 <a:spcPts val="0"/>
               </a:spcBef>
@@ -2333,15 +2409,19 @@
               </a:defRPr>
             </a:lvl9pPr>
           </a:lstStyle>
-          <a:p/>
+          <a:p>
+            <a:endParaRPr/>
+          </a:p>
         </p:txBody>
       </p:sp>
       <p:sp>
         <p:nvSpPr>
           <p:cNvPr id="57" name="Google Shape;57;p11"/>
-          <p:cNvSpPr txBox="1"/>
+          <p:cNvSpPr txBox="1">
+            <a:spLocks noGrp="1"/>
+          </p:cNvSpPr>
           <p:nvPr>
-            <p:ph idx="12" type="sldNum"/>
+            <p:ph type="sldNum" idx="12"/>
           </p:nvPr>
         </p:nvSpPr>
         <p:spPr>
@@ -2354,7 +2434,7 @@
           </a:prstGeom>
         </p:spPr>
         <p:txBody>
-          <a:bodyPr anchorCtr="0" anchor="ctr" bIns="91425" lIns="91425" spcFirstLastPara="1" rIns="91425" wrap="square" tIns="91425">
+          <a:bodyPr spcFirstLastPara="1" wrap="square" lIns="91425" tIns="91425" rIns="91425" bIns="91425" anchor="ctr" anchorCtr="0">
             <a:normAutofit/>
           </a:bodyPr>
           <a:lstStyle>
@@ -2432,7 +2512,7 @@
             </a:lvl9pPr>
           </a:lstStyle>
           <a:p>
-            <a:pPr indent="0" lvl="0" marL="0" rtl="0" algn="r">
+            <a:pPr marL="0" lvl="0" indent="0" algn="r" rtl="0">
               <a:spcBef>
                 <a:spcPts val="0"/>
               </a:spcBef>
@@ -2443,7 +2523,7 @@
             </a:pPr>
             <a:fld id="{00000000-1234-1234-1234-123412341234}" type="slidenum">
               <a:rPr lang="es"/>
-              <a:t>‹#›</a:t>
+              <a:t>‹Nº›</a:t>
             </a:fld>
             <a:endParaRPr/>
           </a:p>
@@ -2458,11 +2538,11 @@
 </file>
 
 <file path=ppt/slideLayouts/slideLayout11.xml><?xml version="1.0" encoding="utf-8"?>
-<p:sldLayout xmlns:a="http://schemas.openxmlformats.org/drawingml/2006/main" xmlns:r="http://schemas.openxmlformats.org/officeDocument/2006/relationships" xmlns:mc="http://schemas.openxmlformats.org/markup-compatibility/2006" xmlns:mv="urn:schemas-microsoft-com:mac:vml" xmlns:p="http://schemas.openxmlformats.org/presentationml/2006/main" xmlns:c="http://schemas.openxmlformats.org/drawingml/2006/chart" xmlns:dgm="http://schemas.openxmlformats.org/drawingml/2006/diagram" xmlns:o="urn:schemas-microsoft-com:office:office" xmlns:v="urn:schemas-microsoft-com:vml" xmlns:pvml="urn:schemas-microsoft-com:office:powerpoint" xmlns:com="http://schemas.openxmlformats.org/drawingml/2006/compatibility" xmlns:p14="http://schemas.microsoft.com/office/powerpoint/2010/main" xmlns:p15="http://schemas.microsoft.com/office/powerpoint/2012/main" xmlns:ahyp="http://schemas.microsoft.com/office/drawing/2018/hyperlinkcolor" matchingName="Blank" type="blank">
+<p:sldLayout xmlns:a="http://schemas.openxmlformats.org/drawingml/2006/main" xmlns:r="http://schemas.openxmlformats.org/officeDocument/2006/relationships" xmlns:p="http://schemas.openxmlformats.org/presentationml/2006/main" matchingName="Blank" type="blank">
   <p:cSld name="BLANK">
     <p:spTree>
       <p:nvGrpSpPr>
-        <p:cNvPr id="58" name="Shape 58"/>
+        <p:cNvPr id="1" name="Shape 58"/>
         <p:cNvGrpSpPr/>
         <p:nvPr/>
       </p:nvGrpSpPr>
@@ -2477,9 +2557,11 @@
       <p:sp>
         <p:nvSpPr>
           <p:cNvPr id="59" name="Google Shape;59;p12"/>
-          <p:cNvSpPr txBox="1"/>
+          <p:cNvSpPr txBox="1">
+            <a:spLocks noGrp="1"/>
+          </p:cNvSpPr>
           <p:nvPr>
-            <p:ph idx="12" type="sldNum"/>
+            <p:ph type="sldNum" idx="12"/>
           </p:nvPr>
         </p:nvSpPr>
         <p:spPr>
@@ -2492,7 +2574,7 @@
           </a:prstGeom>
         </p:spPr>
         <p:txBody>
-          <a:bodyPr anchorCtr="0" anchor="ctr" bIns="91425" lIns="91425" spcFirstLastPara="1" rIns="91425" wrap="square" tIns="91425">
+          <a:bodyPr spcFirstLastPara="1" wrap="square" lIns="91425" tIns="91425" rIns="91425" bIns="91425" anchor="ctr" anchorCtr="0">
             <a:normAutofit/>
           </a:bodyPr>
           <a:lstStyle>
@@ -2534,7 +2616,7 @@
             </a:lvl9pPr>
           </a:lstStyle>
           <a:p>
-            <a:pPr indent="0" lvl="0" marL="0" rtl="0" algn="r">
+            <a:pPr marL="0" lvl="0" indent="0" algn="r" rtl="0">
               <a:spcBef>
                 <a:spcPts val="0"/>
               </a:spcBef>
@@ -2545,7 +2627,7 @@
             </a:pPr>
             <a:fld id="{00000000-1234-1234-1234-123412341234}" type="slidenum">
               <a:rPr lang="es"/>
-              <a:t>‹#›</a:t>
+              <a:t>‹Nº›</a:t>
             </a:fld>
             <a:endParaRPr/>
           </a:p>
@@ -2560,18 +2642,19 @@
 </file>
 
 <file path=ppt/slideLayouts/slideLayout2.xml><?xml version="1.0" encoding="utf-8"?>
-<p:sldLayout xmlns:a="http://schemas.openxmlformats.org/drawingml/2006/main" xmlns:r="http://schemas.openxmlformats.org/officeDocument/2006/relationships" xmlns:mc="http://schemas.openxmlformats.org/markup-compatibility/2006" xmlns:mv="urn:schemas-microsoft-com:mac:vml" xmlns:p="http://schemas.openxmlformats.org/presentationml/2006/main" xmlns:c="http://schemas.openxmlformats.org/drawingml/2006/chart" xmlns:dgm="http://schemas.openxmlformats.org/drawingml/2006/diagram" xmlns:o="urn:schemas-microsoft-com:office:office" xmlns:v="urn:schemas-microsoft-com:vml" xmlns:pvml="urn:schemas-microsoft-com:office:powerpoint" xmlns:com="http://schemas.openxmlformats.org/drawingml/2006/compatibility" xmlns:p14="http://schemas.microsoft.com/office/powerpoint/2010/main" xmlns:p15="http://schemas.microsoft.com/office/powerpoint/2012/main" xmlns:ahyp="http://schemas.microsoft.com/office/drawing/2018/hyperlinkcolor" matchingName="Section header" type="secHead">
+<p:sldLayout xmlns:a="http://schemas.openxmlformats.org/drawingml/2006/main" xmlns:r="http://schemas.openxmlformats.org/officeDocument/2006/relationships" xmlns:p="http://schemas.openxmlformats.org/presentationml/2006/main" matchingName="Section header" type="secHead">
   <p:cSld name="SECTION_HEADER">
     <p:bg>
       <p:bgPr>
         <a:solidFill>
           <a:schemeClr val="accent3"/>
         </a:solidFill>
+        <a:effectLst/>
       </p:bgPr>
     </p:bg>
     <p:spTree>
       <p:nvGrpSpPr>
-        <p:cNvPr id="14" name="Shape 14"/>
+        <p:cNvPr id="1" name="Shape 14"/>
         <p:cNvGrpSpPr/>
         <p:nvPr/>
       </p:nvGrpSpPr>
@@ -2595,9 +2678,13 @@
             <a:ext cx="9144250" cy="4398100"/>
           </a:xfrm>
           <a:custGeom>
-            <a:rect b="b" l="l" r="r" t="t"/>
+            <a:avLst/>
+            <a:gdLst/>
+            <a:ahLst/>
+            <a:cxnLst/>
+            <a:rect l="l" t="t" r="r" b="b"/>
             <a:pathLst>
-              <a:path extrusionOk="0" h="175924" w="365770">
+              <a:path w="365770" h="175924" extrusionOk="0">
                 <a:moveTo>
                   <a:pt x="0" y="0"/>
                 </a:moveTo>
@@ -2634,9 +2721,13 @@
             <a:ext cx="9144250" cy="4398100"/>
           </a:xfrm>
           <a:custGeom>
-            <a:rect b="b" l="l" r="r" t="t"/>
+            <a:avLst/>
+            <a:gdLst/>
+            <a:ahLst/>
+            <a:cxnLst/>
+            <a:rect l="l" t="t" r="r" b="b"/>
             <a:pathLst>
-              <a:path extrusionOk="0" h="175924" w="365770">
+              <a:path w="365770" h="175924" extrusionOk="0">
                 <a:moveTo>
                   <a:pt x="0" y="0"/>
                 </a:moveTo>
@@ -2664,7 +2755,9 @@
       <p:sp>
         <p:nvSpPr>
           <p:cNvPr id="17" name="Google Shape;17;p3"/>
-          <p:cNvSpPr txBox="1"/>
+          <p:cNvSpPr txBox="1">
+            <a:spLocks noGrp="1"/>
+          </p:cNvSpPr>
           <p:nvPr>
             <p:ph type="title"/>
           </p:nvPr>
@@ -2679,7 +2772,7 @@
           </a:prstGeom>
         </p:spPr>
         <p:txBody>
-          <a:bodyPr anchorCtr="0" anchor="t" bIns="91425" lIns="91425" spcFirstLastPara="1" rIns="91425" wrap="square" tIns="91425">
+          <a:bodyPr spcFirstLastPara="1" wrap="square" lIns="91425" tIns="91425" rIns="91425" bIns="91425" anchor="t" anchorCtr="0">
             <a:normAutofit/>
           </a:bodyPr>
           <a:lstStyle>
@@ -2783,15 +2876,19 @@
               <a:defRPr sz="3600"/>
             </a:lvl9pPr>
           </a:lstStyle>
-          <a:p/>
+          <a:p>
+            <a:endParaRPr/>
+          </a:p>
         </p:txBody>
       </p:sp>
       <p:sp>
         <p:nvSpPr>
           <p:cNvPr id="18" name="Google Shape;18;p3"/>
-          <p:cNvSpPr txBox="1"/>
+          <p:cNvSpPr txBox="1">
+            <a:spLocks noGrp="1"/>
+          </p:cNvSpPr>
           <p:nvPr>
-            <p:ph idx="12" type="sldNum"/>
+            <p:ph type="sldNum" idx="12"/>
           </p:nvPr>
         </p:nvSpPr>
         <p:spPr>
@@ -2804,7 +2901,7 @@
           </a:prstGeom>
         </p:spPr>
         <p:txBody>
-          <a:bodyPr anchorCtr="0" anchor="ctr" bIns="91425" lIns="91425" spcFirstLastPara="1" rIns="91425" wrap="square" tIns="91425">
+          <a:bodyPr spcFirstLastPara="1" wrap="square" lIns="91425" tIns="91425" rIns="91425" bIns="91425" anchor="ctr" anchorCtr="0">
             <a:normAutofit/>
           </a:bodyPr>
           <a:lstStyle>
@@ -2882,7 +2979,7 @@
             </a:lvl9pPr>
           </a:lstStyle>
           <a:p>
-            <a:pPr indent="0" lvl="0" marL="0" rtl="0" algn="r">
+            <a:pPr marL="0" lvl="0" indent="0" algn="r" rtl="0">
               <a:spcBef>
                 <a:spcPts val="0"/>
               </a:spcBef>
@@ -2893,7 +2990,7 @@
             </a:pPr>
             <a:fld id="{00000000-1234-1234-1234-123412341234}" type="slidenum">
               <a:rPr lang="es"/>
-              <a:t>‹#›</a:t>
+              <a:t>‹Nº›</a:t>
             </a:fld>
             <a:endParaRPr/>
           </a:p>
@@ -2908,11 +3005,11 @@
 </file>
 
 <file path=ppt/slideLayouts/slideLayout3.xml><?xml version="1.0" encoding="utf-8"?>
-<p:sldLayout xmlns:a="http://schemas.openxmlformats.org/drawingml/2006/main" xmlns:r="http://schemas.openxmlformats.org/officeDocument/2006/relationships" xmlns:mc="http://schemas.openxmlformats.org/markup-compatibility/2006" xmlns:mv="urn:schemas-microsoft-com:mac:vml" xmlns:p="http://schemas.openxmlformats.org/presentationml/2006/main" xmlns:c="http://schemas.openxmlformats.org/drawingml/2006/chart" xmlns:dgm="http://schemas.openxmlformats.org/drawingml/2006/diagram" xmlns:o="urn:schemas-microsoft-com:office:office" xmlns:v="urn:schemas-microsoft-com:vml" xmlns:pvml="urn:schemas-microsoft-com:office:powerpoint" xmlns:com="http://schemas.openxmlformats.org/drawingml/2006/compatibility" xmlns:p14="http://schemas.microsoft.com/office/powerpoint/2010/main" xmlns:p15="http://schemas.microsoft.com/office/powerpoint/2012/main" xmlns:ahyp="http://schemas.microsoft.com/office/drawing/2018/hyperlinkcolor" matchingName="Title and body" type="tx">
+<p:sldLayout xmlns:a="http://schemas.openxmlformats.org/drawingml/2006/main" xmlns:r="http://schemas.openxmlformats.org/officeDocument/2006/relationships" xmlns:p="http://schemas.openxmlformats.org/presentationml/2006/main" matchingName="Title and body" type="tx">
   <p:cSld name="TITLE_AND_BODY">
     <p:spTree>
       <p:nvGrpSpPr>
-        <p:cNvPr id="19" name="Shape 19"/>
+        <p:cNvPr id="1" name="Shape 19"/>
         <p:cNvGrpSpPr/>
         <p:nvPr/>
       </p:nvGrpSpPr>
@@ -2946,12 +3043,12 @@
           </a:ln>
         </p:spPr>
         <p:txBody>
-          <a:bodyPr anchorCtr="0" anchor="ctr" bIns="91425" lIns="91425" spcFirstLastPara="1" rIns="91425" wrap="square" tIns="91425">
+          <a:bodyPr spcFirstLastPara="1" wrap="square" lIns="91425" tIns="91425" rIns="91425" bIns="91425" anchor="ctr" anchorCtr="0">
             <a:noAutofit/>
           </a:bodyPr>
           <a:lstStyle/>
           <a:p>
-            <a:pPr indent="0" lvl="0" marL="0" rtl="0" algn="l">
+            <a:pPr marL="0" lvl="0" indent="0" algn="l" rtl="0">
               <a:spcBef>
                 <a:spcPts val="0"/>
               </a:spcBef>
@@ -2960,9 +3057,6 @@
               </a:spcAft>
               <a:buNone/>
             </a:pPr>
-            <a:r>
-              <a:t/>
-            </a:r>
             <a:endParaRPr/>
           </a:p>
         </p:txBody>
@@ -2979,9 +3073,13 @@
             <a:ext cx="4313625" cy="4399375"/>
           </a:xfrm>
           <a:custGeom>
-            <a:rect b="b" l="l" r="r" t="t"/>
+            <a:avLst/>
+            <a:gdLst/>
+            <a:ahLst/>
+            <a:cxnLst/>
+            <a:rect l="l" t="t" r="r" b="b"/>
             <a:pathLst>
-              <a:path extrusionOk="0" h="175975" w="172545">
+              <a:path w="172545" h="175975" extrusionOk="0">
                 <a:moveTo>
                   <a:pt x="0" y="157"/>
                 </a:moveTo>
@@ -3018,9 +3116,13 @@
             <a:ext cx="4316900" cy="4395600"/>
           </a:xfrm>
           <a:custGeom>
-            <a:rect b="b" l="l" r="r" t="t"/>
+            <a:avLst/>
+            <a:gdLst/>
+            <a:ahLst/>
+            <a:cxnLst/>
+            <a:rect l="l" t="t" r="r" b="b"/>
             <a:pathLst>
-              <a:path extrusionOk="0" h="175824" w="172676">
+              <a:path w="172676" h="175824" extrusionOk="0">
                 <a:moveTo>
                   <a:pt x="0" y="6"/>
                 </a:moveTo>
@@ -3048,7 +3150,9 @@
       <p:sp>
         <p:nvSpPr>
           <p:cNvPr id="23" name="Google Shape;23;p4"/>
-          <p:cNvSpPr txBox="1"/>
+          <p:cNvSpPr txBox="1">
+            <a:spLocks noGrp="1"/>
+          </p:cNvSpPr>
           <p:nvPr>
             <p:ph type="title"/>
           </p:nvPr>
@@ -3063,7 +3167,7 @@
           </a:prstGeom>
         </p:spPr>
         <p:txBody>
-          <a:bodyPr anchorCtr="0" anchor="t" bIns="91425" lIns="91425" spcFirstLastPara="1" rIns="91425" wrap="square" tIns="91425">
+          <a:bodyPr spcFirstLastPara="1" wrap="square" lIns="91425" tIns="91425" rIns="91425" bIns="91425" anchor="t" anchorCtr="0">
             <a:normAutofit/>
           </a:bodyPr>
           <a:lstStyle>
@@ -3230,15 +3334,19 @@
               </a:defRPr>
             </a:lvl9pPr>
           </a:lstStyle>
-          <a:p/>
+          <a:p>
+            <a:endParaRPr/>
+          </a:p>
         </p:txBody>
       </p:sp>
       <p:sp>
         <p:nvSpPr>
           <p:cNvPr id="24" name="Google Shape;24;p4"/>
-          <p:cNvSpPr txBox="1"/>
+          <p:cNvSpPr txBox="1">
+            <a:spLocks noGrp="1"/>
+          </p:cNvSpPr>
           <p:nvPr>
-            <p:ph idx="1" type="body"/>
+            <p:ph type="body" idx="1"/>
           </p:nvPr>
         </p:nvSpPr>
         <p:spPr>
@@ -3251,11 +3359,11 @@
           </a:prstGeom>
         </p:spPr>
         <p:txBody>
-          <a:bodyPr anchorCtr="0" anchor="t" bIns="91425" lIns="91425" spcFirstLastPara="1" rIns="91425" wrap="square" tIns="91425">
+          <a:bodyPr spcFirstLastPara="1" wrap="square" lIns="91425" tIns="91425" rIns="91425" bIns="91425" anchor="t" anchorCtr="0">
             <a:normAutofit/>
           </a:bodyPr>
           <a:lstStyle>
-            <a:lvl1pPr indent="-311150" lvl="0" marL="457200">
+            <a:lvl1pPr marL="457200" lvl="0" indent="-311150">
               <a:spcBef>
                 <a:spcPts val="0"/>
               </a:spcBef>
@@ -3266,7 +3374,7 @@
               <a:buChar char="●"/>
               <a:defRPr/>
             </a:lvl1pPr>
-            <a:lvl2pPr indent="-298450" lvl="1" marL="914400">
+            <a:lvl2pPr marL="914400" lvl="1" indent="-298450">
               <a:spcBef>
                 <a:spcPts val="0"/>
               </a:spcBef>
@@ -3277,7 +3385,7 @@
               <a:buChar char="○"/>
               <a:defRPr/>
             </a:lvl2pPr>
-            <a:lvl3pPr indent="-298450" lvl="2" marL="1371600">
+            <a:lvl3pPr marL="1371600" lvl="2" indent="-298450">
               <a:spcBef>
                 <a:spcPts val="0"/>
               </a:spcBef>
@@ -3288,7 +3396,7 @@
               <a:buChar char="■"/>
               <a:defRPr/>
             </a:lvl3pPr>
-            <a:lvl4pPr indent="-298450" lvl="3" marL="1828800">
+            <a:lvl4pPr marL="1828800" lvl="3" indent="-298450">
               <a:spcBef>
                 <a:spcPts val="0"/>
               </a:spcBef>
@@ -3299,7 +3407,7 @@
               <a:buChar char="●"/>
               <a:defRPr/>
             </a:lvl4pPr>
-            <a:lvl5pPr indent="-298450" lvl="4" marL="2286000">
+            <a:lvl5pPr marL="2286000" lvl="4" indent="-298450">
               <a:spcBef>
                 <a:spcPts val="0"/>
               </a:spcBef>
@@ -3310,7 +3418,7 @@
               <a:buChar char="○"/>
               <a:defRPr/>
             </a:lvl5pPr>
-            <a:lvl6pPr indent="-298450" lvl="5" marL="2743200">
+            <a:lvl6pPr marL="2743200" lvl="5" indent="-298450">
               <a:spcBef>
                 <a:spcPts val="0"/>
               </a:spcBef>
@@ -3321,7 +3429,7 @@
               <a:buChar char="■"/>
               <a:defRPr/>
             </a:lvl6pPr>
-            <a:lvl7pPr indent="-298450" lvl="6" marL="3200400">
+            <a:lvl7pPr marL="3200400" lvl="6" indent="-298450">
               <a:spcBef>
                 <a:spcPts val="0"/>
               </a:spcBef>
@@ -3332,7 +3440,7 @@
               <a:buChar char="●"/>
               <a:defRPr/>
             </a:lvl7pPr>
-            <a:lvl8pPr indent="-298450" lvl="7" marL="3657600">
+            <a:lvl8pPr marL="3657600" lvl="7" indent="-298450">
               <a:spcBef>
                 <a:spcPts val="0"/>
               </a:spcBef>
@@ -3343,7 +3451,7 @@
               <a:buChar char="○"/>
               <a:defRPr/>
             </a:lvl8pPr>
-            <a:lvl9pPr indent="-298450" lvl="8" marL="4114800">
+            <a:lvl9pPr marL="4114800" lvl="8" indent="-298450">
               <a:spcBef>
                 <a:spcPts val="0"/>
               </a:spcBef>
@@ -3355,15 +3463,19 @@
               <a:defRPr/>
             </a:lvl9pPr>
           </a:lstStyle>
-          <a:p/>
+          <a:p>
+            <a:endParaRPr/>
+          </a:p>
         </p:txBody>
       </p:sp>
       <p:sp>
         <p:nvSpPr>
           <p:cNvPr id="25" name="Google Shape;25;p4"/>
-          <p:cNvSpPr txBox="1"/>
+          <p:cNvSpPr txBox="1">
+            <a:spLocks noGrp="1"/>
+          </p:cNvSpPr>
           <p:nvPr>
-            <p:ph idx="12" type="sldNum"/>
+            <p:ph type="sldNum" idx="12"/>
           </p:nvPr>
         </p:nvSpPr>
         <p:spPr>
@@ -3376,7 +3488,7 @@
           </a:prstGeom>
         </p:spPr>
         <p:txBody>
-          <a:bodyPr anchorCtr="0" anchor="ctr" bIns="91425" lIns="91425" spcFirstLastPara="1" rIns="91425" wrap="square" tIns="91425">
+          <a:bodyPr spcFirstLastPara="1" wrap="square" lIns="91425" tIns="91425" rIns="91425" bIns="91425" anchor="ctr" anchorCtr="0">
             <a:normAutofit/>
           </a:bodyPr>
           <a:lstStyle>
@@ -3418,7 +3530,7 @@
             </a:lvl9pPr>
           </a:lstStyle>
           <a:p>
-            <a:pPr indent="0" lvl="0" marL="0" rtl="0" algn="r">
+            <a:pPr marL="0" lvl="0" indent="0" algn="r" rtl="0">
               <a:spcBef>
                 <a:spcPts val="0"/>
               </a:spcBef>
@@ -3429,7 +3541,7 @@
             </a:pPr>
             <a:fld id="{00000000-1234-1234-1234-123412341234}" type="slidenum">
               <a:rPr lang="es"/>
-              <a:t>‹#›</a:t>
+              <a:t>‹Nº›</a:t>
             </a:fld>
             <a:endParaRPr/>
           </a:p>
@@ -3444,11 +3556,11 @@
 </file>
 
 <file path=ppt/slideLayouts/slideLayout4.xml><?xml version="1.0" encoding="utf-8"?>
-<p:sldLayout xmlns:a="http://schemas.openxmlformats.org/drawingml/2006/main" xmlns:r="http://schemas.openxmlformats.org/officeDocument/2006/relationships" xmlns:mc="http://schemas.openxmlformats.org/markup-compatibility/2006" xmlns:mv="urn:schemas-microsoft-com:mac:vml" xmlns:p="http://schemas.openxmlformats.org/presentationml/2006/main" xmlns:c="http://schemas.openxmlformats.org/drawingml/2006/chart" xmlns:dgm="http://schemas.openxmlformats.org/drawingml/2006/diagram" xmlns:o="urn:schemas-microsoft-com:office:office" xmlns:v="urn:schemas-microsoft-com:vml" xmlns:pvml="urn:schemas-microsoft-com:office:powerpoint" xmlns:com="http://schemas.openxmlformats.org/drawingml/2006/compatibility" xmlns:p14="http://schemas.microsoft.com/office/powerpoint/2010/main" xmlns:p15="http://schemas.microsoft.com/office/powerpoint/2012/main" xmlns:ahyp="http://schemas.microsoft.com/office/drawing/2018/hyperlinkcolor" matchingName="Title and two columns" type="twoColTx">
+<p:sldLayout xmlns:a="http://schemas.openxmlformats.org/drawingml/2006/main" xmlns:r="http://schemas.openxmlformats.org/officeDocument/2006/relationships" xmlns:p="http://schemas.openxmlformats.org/presentationml/2006/main" matchingName="Title and two columns" type="twoColTx">
   <p:cSld name="TITLE_AND_TWO_COLUMNS">
     <p:spTree>
       <p:nvGrpSpPr>
-        <p:cNvPr id="26" name="Shape 26"/>
+        <p:cNvPr id="1" name="Shape 26"/>
         <p:cNvGrpSpPr/>
         <p:nvPr/>
       </p:nvGrpSpPr>
@@ -3482,12 +3594,12 @@
           </a:ln>
         </p:spPr>
         <p:txBody>
-          <a:bodyPr anchorCtr="0" anchor="ctr" bIns="91425" lIns="91425" spcFirstLastPara="1" rIns="91425" wrap="square" tIns="91425">
+          <a:bodyPr spcFirstLastPara="1" wrap="square" lIns="91425" tIns="91425" rIns="91425" bIns="91425" anchor="ctr" anchorCtr="0">
             <a:noAutofit/>
           </a:bodyPr>
           <a:lstStyle/>
           <a:p>
-            <a:pPr indent="0" lvl="0" marL="0" rtl="0" algn="l">
+            <a:pPr marL="0" lvl="0" indent="0" algn="l" rtl="0">
               <a:spcBef>
                 <a:spcPts val="0"/>
               </a:spcBef>
@@ -3496,9 +3608,6 @@
               </a:spcAft>
               <a:buNone/>
             </a:pPr>
-            <a:r>
-              <a:t/>
-            </a:r>
             <a:endParaRPr/>
           </a:p>
         </p:txBody>
@@ -3506,7 +3615,9 @@
       <p:sp>
         <p:nvSpPr>
           <p:cNvPr id="28" name="Google Shape;28;p5"/>
-          <p:cNvSpPr txBox="1"/>
+          <p:cNvSpPr txBox="1">
+            <a:spLocks noGrp="1"/>
+          </p:cNvSpPr>
           <p:nvPr>
             <p:ph type="title"/>
           </p:nvPr>
@@ -3521,7 +3632,7 @@
           </a:prstGeom>
         </p:spPr>
         <p:txBody>
-          <a:bodyPr anchorCtr="0" anchor="t" bIns="91425" lIns="91425" spcFirstLastPara="1" rIns="91425" wrap="square" tIns="91425">
+          <a:bodyPr spcFirstLastPara="1" wrap="square" lIns="91425" tIns="91425" rIns="91425" bIns="91425" anchor="t" anchorCtr="0">
             <a:normAutofit/>
           </a:bodyPr>
           <a:lstStyle>
@@ -3688,15 +3799,19 @@
               </a:defRPr>
             </a:lvl9pPr>
           </a:lstStyle>
-          <a:p/>
+          <a:p>
+            <a:endParaRPr/>
+          </a:p>
         </p:txBody>
       </p:sp>
       <p:sp>
         <p:nvSpPr>
           <p:cNvPr id="29" name="Google Shape;29;p5"/>
-          <p:cNvSpPr txBox="1"/>
+          <p:cNvSpPr txBox="1">
+            <a:spLocks noGrp="1"/>
+          </p:cNvSpPr>
           <p:nvPr>
-            <p:ph idx="1" type="body"/>
+            <p:ph type="body" idx="1"/>
           </p:nvPr>
         </p:nvSpPr>
         <p:spPr>
@@ -3709,11 +3824,11 @@
           </a:prstGeom>
         </p:spPr>
         <p:txBody>
-          <a:bodyPr anchorCtr="0" anchor="t" bIns="91425" lIns="91425" spcFirstLastPara="1" rIns="91425" wrap="square" tIns="91425">
+          <a:bodyPr spcFirstLastPara="1" wrap="square" lIns="91425" tIns="91425" rIns="91425" bIns="91425" anchor="t" anchorCtr="0">
             <a:normAutofit/>
           </a:bodyPr>
           <a:lstStyle>
-            <a:lvl1pPr indent="-311150" lvl="0" marL="457200">
+            <a:lvl1pPr marL="457200" lvl="0" indent="-311150">
               <a:spcBef>
                 <a:spcPts val="0"/>
               </a:spcBef>
@@ -3724,7 +3839,7 @@
               <a:buChar char="●"/>
               <a:defRPr/>
             </a:lvl1pPr>
-            <a:lvl2pPr indent="-298450" lvl="1" marL="914400">
+            <a:lvl2pPr marL="914400" lvl="1" indent="-298450">
               <a:spcBef>
                 <a:spcPts val="0"/>
               </a:spcBef>
@@ -3735,7 +3850,7 @@
               <a:buChar char="○"/>
               <a:defRPr/>
             </a:lvl2pPr>
-            <a:lvl3pPr indent="-298450" lvl="2" marL="1371600">
+            <a:lvl3pPr marL="1371600" lvl="2" indent="-298450">
               <a:spcBef>
                 <a:spcPts val="0"/>
               </a:spcBef>
@@ -3746,7 +3861,7 @@
               <a:buChar char="■"/>
               <a:defRPr/>
             </a:lvl3pPr>
-            <a:lvl4pPr indent="-298450" lvl="3" marL="1828800">
+            <a:lvl4pPr marL="1828800" lvl="3" indent="-298450">
               <a:spcBef>
                 <a:spcPts val="0"/>
               </a:spcBef>
@@ -3757,7 +3872,7 @@
               <a:buChar char="●"/>
               <a:defRPr/>
             </a:lvl4pPr>
-            <a:lvl5pPr indent="-298450" lvl="4" marL="2286000">
+            <a:lvl5pPr marL="2286000" lvl="4" indent="-298450">
               <a:spcBef>
                 <a:spcPts val="0"/>
               </a:spcBef>
@@ -3768,7 +3883,7 @@
               <a:buChar char="○"/>
               <a:defRPr/>
             </a:lvl5pPr>
-            <a:lvl6pPr indent="-298450" lvl="5" marL="2743200">
+            <a:lvl6pPr marL="2743200" lvl="5" indent="-298450">
               <a:spcBef>
                 <a:spcPts val="0"/>
               </a:spcBef>
@@ -3779,7 +3894,7 @@
               <a:buChar char="■"/>
               <a:defRPr/>
             </a:lvl6pPr>
-            <a:lvl7pPr indent="-298450" lvl="6" marL="3200400">
+            <a:lvl7pPr marL="3200400" lvl="6" indent="-298450">
               <a:spcBef>
                 <a:spcPts val="0"/>
               </a:spcBef>
@@ -3790,7 +3905,7 @@
               <a:buChar char="●"/>
               <a:defRPr/>
             </a:lvl7pPr>
-            <a:lvl8pPr indent="-298450" lvl="7" marL="3657600">
+            <a:lvl8pPr marL="3657600" lvl="7" indent="-298450">
               <a:spcBef>
                 <a:spcPts val="0"/>
               </a:spcBef>
@@ -3801,7 +3916,7 @@
               <a:buChar char="○"/>
               <a:defRPr/>
             </a:lvl8pPr>
-            <a:lvl9pPr indent="-298450" lvl="8" marL="4114800">
+            <a:lvl9pPr marL="4114800" lvl="8" indent="-298450">
               <a:spcBef>
                 <a:spcPts val="0"/>
               </a:spcBef>
@@ -3813,15 +3928,19 @@
               <a:defRPr/>
             </a:lvl9pPr>
           </a:lstStyle>
-          <a:p/>
+          <a:p>
+            <a:endParaRPr/>
+          </a:p>
         </p:txBody>
       </p:sp>
       <p:sp>
         <p:nvSpPr>
           <p:cNvPr id="30" name="Google Shape;30;p5"/>
-          <p:cNvSpPr txBox="1"/>
+          <p:cNvSpPr txBox="1">
+            <a:spLocks noGrp="1"/>
+          </p:cNvSpPr>
           <p:nvPr>
-            <p:ph idx="2" type="body"/>
+            <p:ph type="body" idx="2"/>
           </p:nvPr>
         </p:nvSpPr>
         <p:spPr>
@@ -3834,11 +3953,11 @@
           </a:prstGeom>
         </p:spPr>
         <p:txBody>
-          <a:bodyPr anchorCtr="0" anchor="t" bIns="91425" lIns="91425" spcFirstLastPara="1" rIns="91425" wrap="square" tIns="91425">
+          <a:bodyPr spcFirstLastPara="1" wrap="square" lIns="91425" tIns="91425" rIns="91425" bIns="91425" anchor="t" anchorCtr="0">
             <a:normAutofit/>
           </a:bodyPr>
           <a:lstStyle>
-            <a:lvl1pPr indent="-311150" lvl="0" marL="457200">
+            <a:lvl1pPr marL="457200" lvl="0" indent="-311150">
               <a:spcBef>
                 <a:spcPts val="0"/>
               </a:spcBef>
@@ -3849,7 +3968,7 @@
               <a:buChar char="●"/>
               <a:defRPr/>
             </a:lvl1pPr>
-            <a:lvl2pPr indent="-298450" lvl="1" marL="914400">
+            <a:lvl2pPr marL="914400" lvl="1" indent="-298450">
               <a:spcBef>
                 <a:spcPts val="0"/>
               </a:spcBef>
@@ -3860,7 +3979,7 @@
               <a:buChar char="○"/>
               <a:defRPr/>
             </a:lvl2pPr>
-            <a:lvl3pPr indent="-298450" lvl="2" marL="1371600">
+            <a:lvl3pPr marL="1371600" lvl="2" indent="-298450">
               <a:spcBef>
                 <a:spcPts val="0"/>
               </a:spcBef>
@@ -3871,7 +3990,7 @@
               <a:buChar char="■"/>
               <a:defRPr/>
             </a:lvl3pPr>
-            <a:lvl4pPr indent="-298450" lvl="3" marL="1828800">
+            <a:lvl4pPr marL="1828800" lvl="3" indent="-298450">
               <a:spcBef>
                 <a:spcPts val="0"/>
               </a:spcBef>
@@ -3882,7 +4001,7 @@
               <a:buChar char="●"/>
               <a:defRPr/>
             </a:lvl4pPr>
-            <a:lvl5pPr indent="-298450" lvl="4" marL="2286000">
+            <a:lvl5pPr marL="2286000" lvl="4" indent="-298450">
               <a:spcBef>
                 <a:spcPts val="0"/>
               </a:spcBef>
@@ -3893,7 +4012,7 @@
               <a:buChar char="○"/>
               <a:defRPr/>
             </a:lvl5pPr>
-            <a:lvl6pPr indent="-298450" lvl="5" marL="2743200">
+            <a:lvl6pPr marL="2743200" lvl="5" indent="-298450">
               <a:spcBef>
                 <a:spcPts val="0"/>
               </a:spcBef>
@@ -3904,7 +4023,7 @@
               <a:buChar char="■"/>
               <a:defRPr/>
             </a:lvl6pPr>
-            <a:lvl7pPr indent="-298450" lvl="6" marL="3200400">
+            <a:lvl7pPr marL="3200400" lvl="6" indent="-298450">
               <a:spcBef>
                 <a:spcPts val="0"/>
               </a:spcBef>
@@ -3915,7 +4034,7 @@
               <a:buChar char="●"/>
               <a:defRPr/>
             </a:lvl7pPr>
-            <a:lvl8pPr indent="-298450" lvl="7" marL="3657600">
+            <a:lvl8pPr marL="3657600" lvl="7" indent="-298450">
               <a:spcBef>
                 <a:spcPts val="0"/>
               </a:spcBef>
@@ -3926,7 +4045,7 @@
               <a:buChar char="○"/>
               <a:defRPr/>
             </a:lvl8pPr>
-            <a:lvl9pPr indent="-298450" lvl="8" marL="4114800">
+            <a:lvl9pPr marL="4114800" lvl="8" indent="-298450">
               <a:spcBef>
                 <a:spcPts val="0"/>
               </a:spcBef>
@@ -3938,15 +4057,19 @@
               <a:defRPr/>
             </a:lvl9pPr>
           </a:lstStyle>
-          <a:p/>
+          <a:p>
+            <a:endParaRPr/>
+          </a:p>
         </p:txBody>
       </p:sp>
       <p:sp>
         <p:nvSpPr>
           <p:cNvPr id="31" name="Google Shape;31;p5"/>
-          <p:cNvSpPr txBox="1"/>
+          <p:cNvSpPr txBox="1">
+            <a:spLocks noGrp="1"/>
+          </p:cNvSpPr>
           <p:nvPr>
-            <p:ph idx="12" type="sldNum"/>
+            <p:ph type="sldNum" idx="12"/>
           </p:nvPr>
         </p:nvSpPr>
         <p:spPr>
@@ -3959,7 +4082,7 @@
           </a:prstGeom>
         </p:spPr>
         <p:txBody>
-          <a:bodyPr anchorCtr="0" anchor="ctr" bIns="91425" lIns="91425" spcFirstLastPara="1" rIns="91425" wrap="square" tIns="91425">
+          <a:bodyPr spcFirstLastPara="1" wrap="square" lIns="91425" tIns="91425" rIns="91425" bIns="91425" anchor="ctr" anchorCtr="0">
             <a:normAutofit/>
           </a:bodyPr>
           <a:lstStyle>
@@ -4001,7 +4124,7 @@
             </a:lvl9pPr>
           </a:lstStyle>
           <a:p>
-            <a:pPr indent="0" lvl="0" marL="0" rtl="0" algn="r">
+            <a:pPr marL="0" lvl="0" indent="0" algn="r" rtl="0">
               <a:spcBef>
                 <a:spcPts val="0"/>
               </a:spcBef>
@@ -4012,7 +4135,7 @@
             </a:pPr>
             <a:fld id="{00000000-1234-1234-1234-123412341234}" type="slidenum">
               <a:rPr lang="es"/>
-              <a:t>‹#›</a:t>
+              <a:t>‹Nº›</a:t>
             </a:fld>
             <a:endParaRPr/>
           </a:p>
@@ -4027,11 +4150,11 @@
 </file>
 
 <file path=ppt/slideLayouts/slideLayout5.xml><?xml version="1.0" encoding="utf-8"?>
-<p:sldLayout xmlns:a="http://schemas.openxmlformats.org/drawingml/2006/main" xmlns:r="http://schemas.openxmlformats.org/officeDocument/2006/relationships" xmlns:mc="http://schemas.openxmlformats.org/markup-compatibility/2006" xmlns:mv="urn:schemas-microsoft-com:mac:vml" xmlns:p="http://schemas.openxmlformats.org/presentationml/2006/main" xmlns:c="http://schemas.openxmlformats.org/drawingml/2006/chart" xmlns:dgm="http://schemas.openxmlformats.org/drawingml/2006/diagram" xmlns:o="urn:schemas-microsoft-com:office:office" xmlns:v="urn:schemas-microsoft-com:vml" xmlns:pvml="urn:schemas-microsoft-com:office:powerpoint" xmlns:com="http://schemas.openxmlformats.org/drawingml/2006/compatibility" xmlns:p14="http://schemas.microsoft.com/office/powerpoint/2010/main" xmlns:p15="http://schemas.microsoft.com/office/powerpoint/2012/main" xmlns:ahyp="http://schemas.microsoft.com/office/drawing/2018/hyperlinkcolor" matchingName="Title only" type="titleOnly">
+<p:sldLayout xmlns:a="http://schemas.openxmlformats.org/drawingml/2006/main" xmlns:r="http://schemas.openxmlformats.org/officeDocument/2006/relationships" xmlns:p="http://schemas.openxmlformats.org/presentationml/2006/main" matchingName="Title only" type="titleOnly">
   <p:cSld name="TITLE_ONLY">
     <p:spTree>
       <p:nvGrpSpPr>
-        <p:cNvPr id="32" name="Shape 32"/>
+        <p:cNvPr id="1" name="Shape 32"/>
         <p:cNvGrpSpPr/>
         <p:nvPr/>
       </p:nvGrpSpPr>
@@ -4065,12 +4188,12 @@
           </a:ln>
         </p:spPr>
         <p:txBody>
-          <a:bodyPr anchorCtr="0" anchor="ctr" bIns="91425" lIns="91425" spcFirstLastPara="1" rIns="91425" wrap="square" tIns="91425">
+          <a:bodyPr spcFirstLastPara="1" wrap="square" lIns="91425" tIns="91425" rIns="91425" bIns="91425" anchor="ctr" anchorCtr="0">
             <a:noAutofit/>
           </a:bodyPr>
           <a:lstStyle/>
           <a:p>
-            <a:pPr indent="0" lvl="0" marL="0" rtl="0" algn="l">
+            <a:pPr marL="0" lvl="0" indent="0" algn="l" rtl="0">
               <a:spcBef>
                 <a:spcPts val="0"/>
               </a:spcBef>
@@ -4079,9 +4202,6 @@
               </a:spcAft>
               <a:buNone/>
             </a:pPr>
-            <a:r>
-              <a:t/>
-            </a:r>
             <a:endParaRPr/>
           </a:p>
         </p:txBody>
@@ -4089,7 +4209,9 @@
       <p:sp>
         <p:nvSpPr>
           <p:cNvPr id="34" name="Google Shape;34;p6"/>
-          <p:cNvSpPr txBox="1"/>
+          <p:cNvSpPr txBox="1">
+            <a:spLocks noGrp="1"/>
+          </p:cNvSpPr>
           <p:nvPr>
             <p:ph type="title"/>
           </p:nvPr>
@@ -4104,7 +4226,7 @@
           </a:prstGeom>
         </p:spPr>
         <p:txBody>
-          <a:bodyPr anchorCtr="0" anchor="t" bIns="91425" lIns="91425" spcFirstLastPara="1" rIns="91425" wrap="square" tIns="91425">
+          <a:bodyPr spcFirstLastPara="1" wrap="square" lIns="91425" tIns="91425" rIns="91425" bIns="91425" anchor="t" anchorCtr="0">
             <a:normAutofit/>
           </a:bodyPr>
           <a:lstStyle>
@@ -4271,15 +4393,19 @@
               </a:defRPr>
             </a:lvl9pPr>
           </a:lstStyle>
-          <a:p/>
+          <a:p>
+            <a:endParaRPr/>
+          </a:p>
         </p:txBody>
       </p:sp>
       <p:sp>
         <p:nvSpPr>
           <p:cNvPr id="35" name="Google Shape;35;p6"/>
-          <p:cNvSpPr txBox="1"/>
+          <p:cNvSpPr txBox="1">
+            <a:spLocks noGrp="1"/>
+          </p:cNvSpPr>
           <p:nvPr>
-            <p:ph idx="12" type="sldNum"/>
+            <p:ph type="sldNum" idx="12"/>
           </p:nvPr>
         </p:nvSpPr>
         <p:spPr>
@@ -4292,7 +4418,7 @@
           </a:prstGeom>
         </p:spPr>
         <p:txBody>
-          <a:bodyPr anchorCtr="0" anchor="ctr" bIns="91425" lIns="91425" spcFirstLastPara="1" rIns="91425" wrap="square" tIns="91425">
+          <a:bodyPr spcFirstLastPara="1" wrap="square" lIns="91425" tIns="91425" rIns="91425" bIns="91425" anchor="ctr" anchorCtr="0">
             <a:normAutofit/>
           </a:bodyPr>
           <a:lstStyle>
@@ -4334,7 +4460,7 @@
             </a:lvl9pPr>
           </a:lstStyle>
           <a:p>
-            <a:pPr indent="0" lvl="0" marL="0" rtl="0" algn="r">
+            <a:pPr marL="0" lvl="0" indent="0" algn="r" rtl="0">
               <a:spcBef>
                 <a:spcPts val="0"/>
               </a:spcBef>
@@ -4345,7 +4471,7 @@
             </a:pPr>
             <a:fld id="{00000000-1234-1234-1234-123412341234}" type="slidenum">
               <a:rPr lang="es"/>
-              <a:t>‹#›</a:t>
+              <a:t>‹Nº›</a:t>
             </a:fld>
             <a:endParaRPr/>
           </a:p>
@@ -4360,11 +4486,11 @@
 </file>
 
 <file path=ppt/slideLayouts/slideLayout6.xml><?xml version="1.0" encoding="utf-8"?>
-<p:sldLayout xmlns:a="http://schemas.openxmlformats.org/drawingml/2006/main" xmlns:r="http://schemas.openxmlformats.org/officeDocument/2006/relationships" xmlns:mc="http://schemas.openxmlformats.org/markup-compatibility/2006" xmlns:mv="urn:schemas-microsoft-com:mac:vml" xmlns:p="http://schemas.openxmlformats.org/presentationml/2006/main" xmlns:c="http://schemas.openxmlformats.org/drawingml/2006/chart" xmlns:dgm="http://schemas.openxmlformats.org/drawingml/2006/diagram" xmlns:o="urn:schemas-microsoft-com:office:office" xmlns:v="urn:schemas-microsoft-com:vml" xmlns:pvml="urn:schemas-microsoft-com:office:powerpoint" xmlns:com="http://schemas.openxmlformats.org/drawingml/2006/compatibility" xmlns:p14="http://schemas.microsoft.com/office/powerpoint/2010/main" xmlns:p15="http://schemas.microsoft.com/office/powerpoint/2012/main" xmlns:ahyp="http://schemas.microsoft.com/office/drawing/2018/hyperlinkcolor" matchingName="One column text">
+<p:sldLayout xmlns:a="http://schemas.openxmlformats.org/drawingml/2006/main" xmlns:r="http://schemas.openxmlformats.org/officeDocument/2006/relationships" xmlns:p="http://schemas.openxmlformats.org/presentationml/2006/main" matchingName="One column text">
   <p:cSld name="ONE_COLUMN_TEXT">
     <p:spTree>
       <p:nvGrpSpPr>
-        <p:cNvPr id="36" name="Shape 36"/>
+        <p:cNvPr id="1" name="Shape 36"/>
         <p:cNvGrpSpPr/>
         <p:nvPr/>
       </p:nvGrpSpPr>
@@ -4398,12 +4524,12 @@
           </a:ln>
         </p:spPr>
         <p:txBody>
-          <a:bodyPr anchorCtr="0" anchor="ctr" bIns="91425" lIns="91425" spcFirstLastPara="1" rIns="91425" wrap="square" tIns="91425">
+          <a:bodyPr spcFirstLastPara="1" wrap="square" lIns="91425" tIns="91425" rIns="91425" bIns="91425" anchor="ctr" anchorCtr="0">
             <a:noAutofit/>
           </a:bodyPr>
           <a:lstStyle/>
           <a:p>
-            <a:pPr indent="0" lvl="0" marL="0" rtl="0" algn="l">
+            <a:pPr marL="0" lvl="0" indent="0" algn="l" rtl="0">
               <a:spcBef>
                 <a:spcPts val="0"/>
               </a:spcBef>
@@ -4412,9 +4538,6 @@
               </a:spcAft>
               <a:buNone/>
             </a:pPr>
-            <a:r>
-              <a:t/>
-            </a:r>
             <a:endParaRPr/>
           </a:p>
         </p:txBody>
@@ -4422,7 +4545,9 @@
       <p:sp>
         <p:nvSpPr>
           <p:cNvPr id="38" name="Google Shape;38;p7"/>
-          <p:cNvSpPr txBox="1"/>
+          <p:cNvSpPr txBox="1">
+            <a:spLocks noGrp="1"/>
+          </p:cNvSpPr>
           <p:nvPr>
             <p:ph type="title"/>
           </p:nvPr>
@@ -4437,7 +4562,7 @@
           </a:prstGeom>
         </p:spPr>
         <p:txBody>
-          <a:bodyPr anchorCtr="0" anchor="t" bIns="91425" lIns="91425" spcFirstLastPara="1" rIns="91425" wrap="square" tIns="91425">
+          <a:bodyPr spcFirstLastPara="1" wrap="square" lIns="91425" tIns="91425" rIns="91425" bIns="91425" anchor="t" anchorCtr="0">
             <a:normAutofit/>
           </a:bodyPr>
           <a:lstStyle>
@@ -4604,15 +4729,19 @@
               </a:defRPr>
             </a:lvl9pPr>
           </a:lstStyle>
-          <a:p/>
+          <a:p>
+            <a:endParaRPr/>
+          </a:p>
         </p:txBody>
       </p:sp>
       <p:sp>
         <p:nvSpPr>
           <p:cNvPr id="39" name="Google Shape;39;p7"/>
-          <p:cNvSpPr txBox="1"/>
+          <p:cNvSpPr txBox="1">
+            <a:spLocks noGrp="1"/>
+          </p:cNvSpPr>
           <p:nvPr>
-            <p:ph idx="1" type="body"/>
+            <p:ph type="body" idx="1"/>
           </p:nvPr>
         </p:nvSpPr>
         <p:spPr>
@@ -4625,11 +4754,11 @@
           </a:prstGeom>
         </p:spPr>
         <p:txBody>
-          <a:bodyPr anchorCtr="0" anchor="t" bIns="91425" lIns="91425" spcFirstLastPara="1" rIns="91425" wrap="square" tIns="91425">
+          <a:bodyPr spcFirstLastPara="1" wrap="square" lIns="91425" tIns="91425" rIns="91425" bIns="91425" anchor="t" anchorCtr="0">
             <a:normAutofit/>
           </a:bodyPr>
           <a:lstStyle>
-            <a:lvl1pPr indent="-311150" lvl="0" marL="457200">
+            <a:lvl1pPr marL="457200" lvl="0" indent="-311150">
               <a:spcBef>
                 <a:spcPts val="0"/>
               </a:spcBef>
@@ -4647,7 +4776,7 @@
                 </a:solidFill>
               </a:defRPr>
             </a:lvl1pPr>
-            <a:lvl2pPr indent="-298450" lvl="1" marL="914400">
+            <a:lvl2pPr marL="914400" lvl="1" indent="-298450">
               <a:spcBef>
                 <a:spcPts val="0"/>
               </a:spcBef>
@@ -4665,7 +4794,7 @@
                 </a:solidFill>
               </a:defRPr>
             </a:lvl2pPr>
-            <a:lvl3pPr indent="-298450" lvl="2" marL="1371600">
+            <a:lvl3pPr marL="1371600" lvl="2" indent="-298450">
               <a:spcBef>
                 <a:spcPts val="0"/>
               </a:spcBef>
@@ -4683,7 +4812,7 @@
                 </a:solidFill>
               </a:defRPr>
             </a:lvl3pPr>
-            <a:lvl4pPr indent="-298450" lvl="3" marL="1828800">
+            <a:lvl4pPr marL="1828800" lvl="3" indent="-298450">
               <a:spcBef>
                 <a:spcPts val="0"/>
               </a:spcBef>
@@ -4701,7 +4830,7 @@
                 </a:solidFill>
               </a:defRPr>
             </a:lvl4pPr>
-            <a:lvl5pPr indent="-298450" lvl="4" marL="2286000">
+            <a:lvl5pPr marL="2286000" lvl="4" indent="-298450">
               <a:spcBef>
                 <a:spcPts val="0"/>
               </a:spcBef>
@@ -4719,7 +4848,7 @@
                 </a:solidFill>
               </a:defRPr>
             </a:lvl5pPr>
-            <a:lvl6pPr indent="-298450" lvl="5" marL="2743200">
+            <a:lvl6pPr marL="2743200" lvl="5" indent="-298450">
               <a:spcBef>
                 <a:spcPts val="0"/>
               </a:spcBef>
@@ -4737,7 +4866,7 @@
                 </a:solidFill>
               </a:defRPr>
             </a:lvl6pPr>
-            <a:lvl7pPr indent="-298450" lvl="6" marL="3200400">
+            <a:lvl7pPr marL="3200400" lvl="6" indent="-298450">
               <a:spcBef>
                 <a:spcPts val="0"/>
               </a:spcBef>
@@ -4755,7 +4884,7 @@
                 </a:solidFill>
               </a:defRPr>
             </a:lvl7pPr>
-            <a:lvl8pPr indent="-298450" lvl="7" marL="3657600">
+            <a:lvl8pPr marL="3657600" lvl="7" indent="-298450">
               <a:spcBef>
                 <a:spcPts val="0"/>
               </a:spcBef>
@@ -4773,7 +4902,7 @@
                 </a:solidFill>
               </a:defRPr>
             </a:lvl8pPr>
-            <a:lvl9pPr indent="-298450" lvl="8" marL="4114800">
+            <a:lvl9pPr marL="4114800" lvl="8" indent="-298450">
               <a:spcBef>
                 <a:spcPts val="0"/>
               </a:spcBef>
@@ -4792,15 +4921,19 @@
               </a:defRPr>
             </a:lvl9pPr>
           </a:lstStyle>
-          <a:p/>
+          <a:p>
+            <a:endParaRPr/>
+          </a:p>
         </p:txBody>
       </p:sp>
       <p:sp>
         <p:nvSpPr>
           <p:cNvPr id="40" name="Google Shape;40;p7"/>
-          <p:cNvSpPr txBox="1"/>
+          <p:cNvSpPr txBox="1">
+            <a:spLocks noGrp="1"/>
+          </p:cNvSpPr>
           <p:nvPr>
-            <p:ph idx="12" type="sldNum"/>
+            <p:ph type="sldNum" idx="12"/>
           </p:nvPr>
         </p:nvSpPr>
         <p:spPr>
@@ -4813,7 +4946,7 @@
           </a:prstGeom>
         </p:spPr>
         <p:txBody>
-          <a:bodyPr anchorCtr="0" anchor="ctr" bIns="91425" lIns="91425" spcFirstLastPara="1" rIns="91425" wrap="square" tIns="91425">
+          <a:bodyPr spcFirstLastPara="1" wrap="square" lIns="91425" tIns="91425" rIns="91425" bIns="91425" anchor="ctr" anchorCtr="0">
             <a:normAutofit/>
           </a:bodyPr>
           <a:lstStyle>
@@ -4855,7 +4988,7 @@
             </a:lvl9pPr>
           </a:lstStyle>
           <a:p>
-            <a:pPr indent="0" lvl="0" marL="0" rtl="0" algn="r">
+            <a:pPr marL="0" lvl="0" indent="0" algn="r" rtl="0">
               <a:spcBef>
                 <a:spcPts val="0"/>
               </a:spcBef>
@@ -4866,7 +4999,7 @@
             </a:pPr>
             <a:fld id="{00000000-1234-1234-1234-123412341234}" type="slidenum">
               <a:rPr lang="es"/>
-              <a:t>‹#›</a:t>
+              <a:t>‹Nº›</a:t>
             </a:fld>
             <a:endParaRPr/>
           </a:p>
@@ -4881,18 +5014,19 @@
 </file>
 
 <file path=ppt/slideLayouts/slideLayout7.xml><?xml version="1.0" encoding="utf-8"?>
-<p:sldLayout xmlns:a="http://schemas.openxmlformats.org/drawingml/2006/main" xmlns:r="http://schemas.openxmlformats.org/officeDocument/2006/relationships" xmlns:mc="http://schemas.openxmlformats.org/markup-compatibility/2006" xmlns:mv="urn:schemas-microsoft-com:mac:vml" xmlns:p="http://schemas.openxmlformats.org/presentationml/2006/main" xmlns:c="http://schemas.openxmlformats.org/drawingml/2006/chart" xmlns:dgm="http://schemas.openxmlformats.org/drawingml/2006/diagram" xmlns:o="urn:schemas-microsoft-com:office:office" xmlns:v="urn:schemas-microsoft-com:vml" xmlns:pvml="urn:schemas-microsoft-com:office:powerpoint" xmlns:com="http://schemas.openxmlformats.org/drawingml/2006/compatibility" xmlns:p14="http://schemas.microsoft.com/office/powerpoint/2010/main" xmlns:p15="http://schemas.microsoft.com/office/powerpoint/2012/main" xmlns:ahyp="http://schemas.microsoft.com/office/drawing/2018/hyperlinkcolor" matchingName="Main point">
+<p:sldLayout xmlns:a="http://schemas.openxmlformats.org/drawingml/2006/main" xmlns:r="http://schemas.openxmlformats.org/officeDocument/2006/relationships" xmlns:p="http://schemas.openxmlformats.org/presentationml/2006/main" matchingName="Main point">
   <p:cSld name="MAIN_POINT">
     <p:bg>
       <p:bgPr>
         <a:solidFill>
           <a:schemeClr val="accent3"/>
         </a:solidFill>
+        <a:effectLst/>
       </p:bgPr>
     </p:bg>
     <p:spTree>
       <p:nvGrpSpPr>
-        <p:cNvPr id="41" name="Shape 41"/>
+        <p:cNvPr id="1" name="Shape 41"/>
         <p:cNvGrpSpPr/>
         <p:nvPr/>
       </p:nvGrpSpPr>
@@ -4907,7 +5041,9 @@
       <p:sp>
         <p:nvSpPr>
           <p:cNvPr id="42" name="Google Shape;42;p8"/>
-          <p:cNvSpPr txBox="1"/>
+          <p:cNvSpPr txBox="1">
+            <a:spLocks noGrp="1"/>
+          </p:cNvSpPr>
           <p:nvPr>
             <p:ph type="title"/>
           </p:nvPr>
@@ -4922,7 +5058,7 @@
           </a:prstGeom>
         </p:spPr>
         <p:txBody>
-          <a:bodyPr anchorCtr="0" anchor="ctr" bIns="91425" lIns="91425" spcFirstLastPara="1" rIns="91425" wrap="square" tIns="91425">
+          <a:bodyPr spcFirstLastPara="1" wrap="square" lIns="91425" tIns="91425" rIns="91425" bIns="91425" anchor="ctr" anchorCtr="0">
             <a:normAutofit/>
           </a:bodyPr>
           <a:lstStyle>
@@ -5026,15 +5162,19 @@
               <a:defRPr sz="3600"/>
             </a:lvl9pPr>
           </a:lstStyle>
-          <a:p/>
+          <a:p>
+            <a:endParaRPr/>
+          </a:p>
         </p:txBody>
       </p:sp>
       <p:sp>
         <p:nvSpPr>
           <p:cNvPr id="43" name="Google Shape;43;p8"/>
-          <p:cNvSpPr txBox="1"/>
+          <p:cNvSpPr txBox="1">
+            <a:spLocks noGrp="1"/>
+          </p:cNvSpPr>
           <p:nvPr>
-            <p:ph idx="12" type="sldNum"/>
+            <p:ph type="sldNum" idx="12"/>
           </p:nvPr>
         </p:nvSpPr>
         <p:spPr>
@@ -5047,7 +5187,7 @@
           </a:prstGeom>
         </p:spPr>
         <p:txBody>
-          <a:bodyPr anchorCtr="0" anchor="ctr" bIns="91425" lIns="91425" spcFirstLastPara="1" rIns="91425" wrap="square" tIns="91425">
+          <a:bodyPr spcFirstLastPara="1" wrap="square" lIns="91425" tIns="91425" rIns="91425" bIns="91425" anchor="ctr" anchorCtr="0">
             <a:normAutofit/>
           </a:bodyPr>
           <a:lstStyle>
@@ -5125,7 +5265,7 @@
             </a:lvl9pPr>
           </a:lstStyle>
           <a:p>
-            <a:pPr indent="0" lvl="0" marL="0" rtl="0" algn="r">
+            <a:pPr marL="0" lvl="0" indent="0" algn="r" rtl="0">
               <a:spcBef>
                 <a:spcPts val="0"/>
               </a:spcBef>
@@ -5136,7 +5276,7 @@
             </a:pPr>
             <a:fld id="{00000000-1234-1234-1234-123412341234}" type="slidenum">
               <a:rPr lang="es"/>
-              <a:t>‹#›</a:t>
+              <a:t>‹Nº›</a:t>
             </a:fld>
             <a:endParaRPr/>
           </a:p>
@@ -5151,11 +5291,11 @@
 </file>
 
 <file path=ppt/slideLayouts/slideLayout8.xml><?xml version="1.0" encoding="utf-8"?>
-<p:sldLayout xmlns:a="http://schemas.openxmlformats.org/drawingml/2006/main" xmlns:r="http://schemas.openxmlformats.org/officeDocument/2006/relationships" xmlns:mc="http://schemas.openxmlformats.org/markup-compatibility/2006" xmlns:mv="urn:schemas-microsoft-com:mac:vml" xmlns:p="http://schemas.openxmlformats.org/presentationml/2006/main" xmlns:c="http://schemas.openxmlformats.org/drawingml/2006/chart" xmlns:dgm="http://schemas.openxmlformats.org/drawingml/2006/diagram" xmlns:o="urn:schemas-microsoft-com:office:office" xmlns:v="urn:schemas-microsoft-com:vml" xmlns:pvml="urn:schemas-microsoft-com:office:powerpoint" xmlns:com="http://schemas.openxmlformats.org/drawingml/2006/compatibility" xmlns:p14="http://schemas.microsoft.com/office/powerpoint/2010/main" xmlns:p15="http://schemas.microsoft.com/office/powerpoint/2012/main" xmlns:ahyp="http://schemas.microsoft.com/office/drawing/2018/hyperlinkcolor" matchingName="Section title and description">
+<p:sldLayout xmlns:a="http://schemas.openxmlformats.org/drawingml/2006/main" xmlns:r="http://schemas.openxmlformats.org/officeDocument/2006/relationships" xmlns:p="http://schemas.openxmlformats.org/presentationml/2006/main" matchingName="Section title and description">
   <p:cSld name="SECTION_TITLE_AND_DESCRIPTION">
     <p:spTree>
       <p:nvGrpSpPr>
-        <p:cNvPr id="44" name="Shape 44"/>
+        <p:cNvPr id="1" name="Shape 44"/>
         <p:cNvGrpSpPr/>
         <p:nvPr/>
       </p:nvGrpSpPr>
@@ -5189,12 +5329,12 @@
           </a:ln>
         </p:spPr>
         <p:txBody>
-          <a:bodyPr anchorCtr="0" anchor="ctr" bIns="91425" lIns="91425" spcFirstLastPara="1" rIns="91425" wrap="square" tIns="91425">
+          <a:bodyPr spcFirstLastPara="1" wrap="square" lIns="91425" tIns="91425" rIns="91425" bIns="91425" anchor="ctr" anchorCtr="0">
             <a:noAutofit/>
           </a:bodyPr>
           <a:lstStyle/>
           <a:p>
-            <a:pPr indent="0" lvl="0" marL="0" rtl="0" algn="l">
+            <a:pPr marL="0" lvl="0" indent="0" algn="l" rtl="0">
               <a:spcBef>
                 <a:spcPts val="0"/>
               </a:spcBef>
@@ -5203,9 +5343,6 @@
               </a:spcAft>
               <a:buNone/>
             </a:pPr>
-            <a:r>
-              <a:t/>
-            </a:r>
             <a:endParaRPr/>
           </a:p>
         </p:txBody>
@@ -5213,7 +5350,9 @@
       <p:sp>
         <p:nvSpPr>
           <p:cNvPr id="46" name="Google Shape;46;p9"/>
-          <p:cNvSpPr txBox="1"/>
+          <p:cNvSpPr txBox="1">
+            <a:spLocks noGrp="1"/>
+          </p:cNvSpPr>
           <p:nvPr>
             <p:ph type="title"/>
           </p:nvPr>
@@ -5228,7 +5367,7 @@
           </a:prstGeom>
         </p:spPr>
         <p:txBody>
-          <a:bodyPr anchorCtr="0" anchor="t" bIns="91425" lIns="91425" spcFirstLastPara="1" rIns="91425" wrap="square" tIns="91425">
+          <a:bodyPr spcFirstLastPara="1" wrap="square" lIns="91425" tIns="91425" rIns="91425" bIns="91425" anchor="t" anchorCtr="0">
             <a:normAutofit/>
           </a:bodyPr>
           <a:lstStyle>
@@ -5395,15 +5534,19 @@
               </a:defRPr>
             </a:lvl9pPr>
           </a:lstStyle>
-          <a:p/>
+          <a:p>
+            <a:endParaRPr/>
+          </a:p>
         </p:txBody>
       </p:sp>
       <p:sp>
         <p:nvSpPr>
           <p:cNvPr id="47" name="Google Shape;47;p9"/>
-          <p:cNvSpPr txBox="1"/>
+          <p:cNvSpPr txBox="1">
+            <a:spLocks noGrp="1"/>
+          </p:cNvSpPr>
           <p:nvPr>
-            <p:ph idx="1" type="subTitle"/>
+            <p:ph type="subTitle" idx="1"/>
           </p:nvPr>
         </p:nvSpPr>
         <p:spPr>
@@ -5416,7 +5559,7 @@
           </a:prstGeom>
         </p:spPr>
         <p:txBody>
-          <a:bodyPr anchorCtr="0" anchor="t" bIns="91425" lIns="91425" spcFirstLastPara="1" rIns="91425" wrap="square" tIns="91425">
+          <a:bodyPr spcFirstLastPara="1" wrap="square" lIns="91425" tIns="91425" rIns="91425" bIns="91425" anchor="t" anchorCtr="0">
             <a:normAutofit/>
           </a:bodyPr>
           <a:lstStyle>
@@ -5610,15 +5753,19 @@
               </a:defRPr>
             </a:lvl9pPr>
           </a:lstStyle>
-          <a:p/>
+          <a:p>
+            <a:endParaRPr/>
+          </a:p>
         </p:txBody>
       </p:sp>
       <p:sp>
         <p:nvSpPr>
           <p:cNvPr id="48" name="Google Shape;48;p9"/>
-          <p:cNvSpPr txBox="1"/>
+          <p:cNvSpPr txBox="1">
+            <a:spLocks noGrp="1"/>
+          </p:cNvSpPr>
           <p:nvPr>
-            <p:ph idx="2" type="body"/>
+            <p:ph type="body" idx="2"/>
           </p:nvPr>
         </p:nvSpPr>
         <p:spPr>
@@ -5631,11 +5778,11 @@
           </a:prstGeom>
         </p:spPr>
         <p:txBody>
-          <a:bodyPr anchorCtr="0" anchor="t" bIns="91425" lIns="91425" spcFirstLastPara="1" rIns="91425" wrap="square" tIns="91425">
+          <a:bodyPr spcFirstLastPara="1" wrap="square" lIns="91425" tIns="91425" rIns="91425" bIns="91425" anchor="t" anchorCtr="0">
             <a:normAutofit/>
           </a:bodyPr>
           <a:lstStyle>
-            <a:lvl1pPr indent="-311150" lvl="0" marL="457200">
+            <a:lvl1pPr marL="457200" lvl="0" indent="-311150">
               <a:spcBef>
                 <a:spcPts val="0"/>
               </a:spcBef>
@@ -5646,7 +5793,7 @@
               <a:buChar char="●"/>
               <a:defRPr/>
             </a:lvl1pPr>
-            <a:lvl2pPr indent="-298450" lvl="1" marL="914400">
+            <a:lvl2pPr marL="914400" lvl="1" indent="-298450">
               <a:spcBef>
                 <a:spcPts val="0"/>
               </a:spcBef>
@@ -5657,7 +5804,7 @@
               <a:buChar char="○"/>
               <a:defRPr/>
             </a:lvl2pPr>
-            <a:lvl3pPr indent="-298450" lvl="2" marL="1371600">
+            <a:lvl3pPr marL="1371600" lvl="2" indent="-298450">
               <a:spcBef>
                 <a:spcPts val="0"/>
               </a:spcBef>
@@ -5668,7 +5815,7 @@
               <a:buChar char="■"/>
               <a:defRPr/>
             </a:lvl3pPr>
-            <a:lvl4pPr indent="-298450" lvl="3" marL="1828800">
+            <a:lvl4pPr marL="1828800" lvl="3" indent="-298450">
               <a:spcBef>
                 <a:spcPts val="0"/>
               </a:spcBef>
@@ -5679,7 +5826,7 @@
               <a:buChar char="●"/>
               <a:defRPr/>
             </a:lvl4pPr>
-            <a:lvl5pPr indent="-298450" lvl="4" marL="2286000">
+            <a:lvl5pPr marL="2286000" lvl="4" indent="-298450">
               <a:spcBef>
                 <a:spcPts val="0"/>
               </a:spcBef>
@@ -5690,7 +5837,7 @@
               <a:buChar char="○"/>
               <a:defRPr/>
             </a:lvl5pPr>
-            <a:lvl6pPr indent="-298450" lvl="5" marL="2743200">
+            <a:lvl6pPr marL="2743200" lvl="5" indent="-298450">
               <a:spcBef>
                 <a:spcPts val="0"/>
               </a:spcBef>
@@ -5701,7 +5848,7 @@
               <a:buChar char="■"/>
               <a:defRPr/>
             </a:lvl6pPr>
-            <a:lvl7pPr indent="-298450" lvl="6" marL="3200400">
+            <a:lvl7pPr marL="3200400" lvl="6" indent="-298450">
               <a:spcBef>
                 <a:spcPts val="0"/>
               </a:spcBef>
@@ -5712,7 +5859,7 @@
               <a:buChar char="●"/>
               <a:defRPr/>
             </a:lvl7pPr>
-            <a:lvl8pPr indent="-298450" lvl="7" marL="3657600">
+            <a:lvl8pPr marL="3657600" lvl="7" indent="-298450">
               <a:spcBef>
                 <a:spcPts val="0"/>
               </a:spcBef>
@@ -5723,7 +5870,7 @@
               <a:buChar char="○"/>
               <a:defRPr/>
             </a:lvl8pPr>
-            <a:lvl9pPr indent="-298450" lvl="8" marL="4114800">
+            <a:lvl9pPr marL="4114800" lvl="8" indent="-298450">
               <a:spcBef>
                 <a:spcPts val="0"/>
               </a:spcBef>
@@ -5735,15 +5882,19 @@
               <a:defRPr/>
             </a:lvl9pPr>
           </a:lstStyle>
-          <a:p/>
+          <a:p>
+            <a:endParaRPr/>
+          </a:p>
         </p:txBody>
       </p:sp>
       <p:sp>
         <p:nvSpPr>
           <p:cNvPr id="49" name="Google Shape;49;p9"/>
-          <p:cNvSpPr txBox="1"/>
+          <p:cNvSpPr txBox="1">
+            <a:spLocks noGrp="1"/>
+          </p:cNvSpPr>
           <p:nvPr>
-            <p:ph idx="12" type="sldNum"/>
+            <p:ph type="sldNum" idx="12"/>
           </p:nvPr>
         </p:nvSpPr>
         <p:spPr>
@@ -5756,7 +5907,7 @@
           </a:prstGeom>
         </p:spPr>
         <p:txBody>
-          <a:bodyPr anchorCtr="0" anchor="ctr" bIns="91425" lIns="91425" spcFirstLastPara="1" rIns="91425" wrap="square" tIns="91425">
+          <a:bodyPr spcFirstLastPara="1" wrap="square" lIns="91425" tIns="91425" rIns="91425" bIns="91425" anchor="ctr" anchorCtr="0">
             <a:normAutofit/>
           </a:bodyPr>
           <a:lstStyle>
@@ -5798,7 +5949,7 @@
             </a:lvl9pPr>
           </a:lstStyle>
           <a:p>
-            <a:pPr indent="0" lvl="0" marL="0" rtl="0" algn="r">
+            <a:pPr marL="0" lvl="0" indent="0" algn="r" rtl="0">
               <a:spcBef>
                 <a:spcPts val="0"/>
               </a:spcBef>
@@ -5809,7 +5960,7 @@
             </a:pPr>
             <a:fld id="{00000000-1234-1234-1234-123412341234}" type="slidenum">
               <a:rPr lang="es"/>
-              <a:t>‹#›</a:t>
+              <a:t>‹Nº›</a:t>
             </a:fld>
             <a:endParaRPr/>
           </a:p>
@@ -5824,11 +5975,11 @@
 </file>
 
 <file path=ppt/slideLayouts/slideLayout9.xml><?xml version="1.0" encoding="utf-8"?>
-<p:sldLayout xmlns:a="http://schemas.openxmlformats.org/drawingml/2006/main" xmlns:r="http://schemas.openxmlformats.org/officeDocument/2006/relationships" xmlns:mc="http://schemas.openxmlformats.org/markup-compatibility/2006" xmlns:mv="urn:schemas-microsoft-com:mac:vml" xmlns:p="http://schemas.openxmlformats.org/presentationml/2006/main" xmlns:c="http://schemas.openxmlformats.org/drawingml/2006/chart" xmlns:dgm="http://schemas.openxmlformats.org/drawingml/2006/diagram" xmlns:o="urn:schemas-microsoft-com:office:office" xmlns:v="urn:schemas-microsoft-com:vml" xmlns:pvml="urn:schemas-microsoft-com:office:powerpoint" xmlns:com="http://schemas.openxmlformats.org/drawingml/2006/compatibility" xmlns:p14="http://schemas.microsoft.com/office/powerpoint/2010/main" xmlns:p15="http://schemas.microsoft.com/office/powerpoint/2012/main" xmlns:ahyp="http://schemas.microsoft.com/office/drawing/2018/hyperlinkcolor" matchingName="Caption">
+<p:sldLayout xmlns:a="http://schemas.openxmlformats.org/drawingml/2006/main" xmlns:r="http://schemas.openxmlformats.org/officeDocument/2006/relationships" xmlns:p="http://schemas.openxmlformats.org/presentationml/2006/main" matchingName="Caption">
   <p:cSld name="CAPTION_ONLY">
     <p:spTree>
       <p:nvGrpSpPr>
-        <p:cNvPr id="50" name="Shape 50"/>
+        <p:cNvPr id="1" name="Shape 50"/>
         <p:cNvGrpSpPr/>
         <p:nvPr/>
       </p:nvGrpSpPr>
@@ -5862,12 +6013,12 @@
           </a:ln>
         </p:spPr>
         <p:txBody>
-          <a:bodyPr anchorCtr="0" anchor="ctr" bIns="91425" lIns="91425" spcFirstLastPara="1" rIns="91425" wrap="square" tIns="91425">
+          <a:bodyPr spcFirstLastPara="1" wrap="square" lIns="91425" tIns="91425" rIns="91425" bIns="91425" anchor="ctr" anchorCtr="0">
             <a:noAutofit/>
           </a:bodyPr>
           <a:lstStyle/>
           <a:p>
-            <a:pPr indent="0" lvl="0" marL="0" rtl="0" algn="l">
+            <a:pPr marL="0" lvl="0" indent="0" algn="l" rtl="0">
               <a:spcBef>
                 <a:spcPts val="0"/>
               </a:spcBef>
@@ -5876,9 +6027,6 @@
               </a:spcAft>
               <a:buNone/>
             </a:pPr>
-            <a:r>
-              <a:t/>
-            </a:r>
             <a:endParaRPr/>
           </a:p>
         </p:txBody>
@@ -5886,9 +6034,11 @@
       <p:sp>
         <p:nvSpPr>
           <p:cNvPr id="52" name="Google Shape;52;p10"/>
-          <p:cNvSpPr txBox="1"/>
+          <p:cNvSpPr txBox="1">
+            <a:spLocks noGrp="1"/>
+          </p:cNvSpPr>
           <p:nvPr>
-            <p:ph idx="1" type="body"/>
+            <p:ph type="body" idx="1"/>
           </p:nvPr>
         </p:nvSpPr>
         <p:spPr>
@@ -5901,11 +6051,11 @@
           </a:prstGeom>
         </p:spPr>
         <p:txBody>
-          <a:bodyPr anchorCtr="0" anchor="ctr" bIns="91425" lIns="91425" spcFirstLastPara="1" rIns="91425" wrap="square" tIns="91425">
+          <a:bodyPr spcFirstLastPara="1" wrap="square" lIns="91425" tIns="91425" rIns="91425" bIns="91425" anchor="ctr" anchorCtr="0">
             <a:normAutofit/>
           </a:bodyPr>
           <a:lstStyle>
-            <a:lvl1pPr indent="-228600" lvl="0" marL="457200">
+            <a:lvl1pPr marL="457200" lvl="0" indent="-228600">
               <a:lnSpc>
                 <a:spcPct val="100000"/>
               </a:lnSpc>
@@ -5932,15 +6082,19 @@
               </a:defRPr>
             </a:lvl1pPr>
           </a:lstStyle>
-          <a:p/>
+          <a:p>
+            <a:endParaRPr/>
+          </a:p>
         </p:txBody>
       </p:sp>
       <p:sp>
         <p:nvSpPr>
           <p:cNvPr id="53" name="Google Shape;53;p10"/>
-          <p:cNvSpPr txBox="1"/>
+          <p:cNvSpPr txBox="1">
+            <a:spLocks noGrp="1"/>
+          </p:cNvSpPr>
           <p:nvPr>
-            <p:ph idx="12" type="sldNum"/>
+            <p:ph type="sldNum" idx="12"/>
           </p:nvPr>
         </p:nvSpPr>
         <p:spPr>
@@ -5953,7 +6107,7 @@
           </a:prstGeom>
         </p:spPr>
         <p:txBody>
-          <a:bodyPr anchorCtr="0" anchor="ctr" bIns="91425" lIns="91425" spcFirstLastPara="1" rIns="91425" wrap="square" tIns="91425">
+          <a:bodyPr spcFirstLastPara="1" wrap="square" lIns="91425" tIns="91425" rIns="91425" bIns="91425" anchor="ctr" anchorCtr="0">
             <a:normAutofit/>
           </a:bodyPr>
           <a:lstStyle>
@@ -6031,7 +6185,7 @@
             </a:lvl9pPr>
           </a:lstStyle>
           <a:p>
-            <a:pPr indent="0" lvl="0" marL="0" rtl="0" algn="r">
+            <a:pPr marL="0" lvl="0" indent="0" algn="r" rtl="0">
               <a:spcBef>
                 <a:spcPts val="0"/>
               </a:spcBef>
@@ -6042,7 +6196,7 @@
             </a:pPr>
             <a:fld id="{00000000-1234-1234-1234-123412341234}" type="slidenum">
               <a:rPr lang="es"/>
-              <a:t>‹#›</a:t>
+              <a:t>‹Nº›</a:t>
             </a:fld>
             <a:endParaRPr/>
           </a:p>
@@ -6057,18 +6211,19 @@
 </file>
 
 <file path=ppt/slideMasters/slideMaster1.xml><?xml version="1.0" encoding="utf-8"?>
-<p:sldMaster xmlns:a="http://schemas.openxmlformats.org/drawingml/2006/main" xmlns:r="http://schemas.openxmlformats.org/officeDocument/2006/relationships" xmlns:mc="http://schemas.openxmlformats.org/markup-compatibility/2006" xmlns:mv="urn:schemas-microsoft-com:mac:vml" xmlns:p="http://schemas.openxmlformats.org/presentationml/2006/main" xmlns:c="http://schemas.openxmlformats.org/drawingml/2006/chart" xmlns:dgm="http://schemas.openxmlformats.org/drawingml/2006/diagram" xmlns:o="urn:schemas-microsoft-com:office:office" xmlns:v="urn:schemas-microsoft-com:vml" xmlns:pvml="urn:schemas-microsoft-com:office:powerpoint" xmlns:com="http://schemas.openxmlformats.org/drawingml/2006/compatibility" xmlns:p14="http://schemas.microsoft.com/office/powerpoint/2010/main" xmlns:p15="http://schemas.microsoft.com/office/powerpoint/2012/main" xmlns:ahyp="http://schemas.microsoft.com/office/drawing/2018/hyperlinkcolor">
+<p:sldMaster xmlns:a="http://schemas.openxmlformats.org/drawingml/2006/main" xmlns:r="http://schemas.openxmlformats.org/officeDocument/2006/relationships" xmlns:p="http://schemas.openxmlformats.org/presentationml/2006/main">
   <p:cSld name="paradigm">
     <p:bg>
       <p:bgPr>
         <a:solidFill>
           <a:schemeClr val="lt1"/>
         </a:solidFill>
+        <a:effectLst/>
       </p:bgPr>
     </p:bg>
     <p:spTree>
       <p:nvGrpSpPr>
-        <p:cNvPr id="5" name="Shape 5"/>
+        <p:cNvPr id="1" name="Shape 5"/>
         <p:cNvGrpSpPr/>
         <p:nvPr/>
       </p:nvGrpSpPr>
@@ -6083,7 +6238,9 @@
       <p:sp>
         <p:nvSpPr>
           <p:cNvPr id="6" name="Google Shape;6;p1"/>
-          <p:cNvSpPr txBox="1"/>
+          <p:cNvSpPr txBox="1">
+            <a:spLocks noGrp="1"/>
+          </p:cNvSpPr>
           <p:nvPr>
             <p:ph type="title"/>
           </p:nvPr>
@@ -6102,7 +6259,7 @@
           </a:ln>
         </p:spPr>
         <p:txBody>
-          <a:bodyPr anchorCtr="0" anchor="t" bIns="91425" lIns="91425" spcFirstLastPara="1" rIns="91425" wrap="square" tIns="91425">
+          <a:bodyPr spcFirstLastPara="1" wrap="square" lIns="91425" tIns="91425" rIns="91425" bIns="91425" anchor="t" anchorCtr="0">
             <a:normAutofit/>
           </a:bodyPr>
           <a:lstStyle>
@@ -6314,15 +6471,19 @@
               </a:defRPr>
             </a:lvl9pPr>
           </a:lstStyle>
-          <a:p/>
+          <a:p>
+            <a:endParaRPr/>
+          </a:p>
         </p:txBody>
       </p:sp>
       <p:sp>
         <p:nvSpPr>
           <p:cNvPr id="7" name="Google Shape;7;p1"/>
-          <p:cNvSpPr txBox="1"/>
+          <p:cNvSpPr txBox="1">
+            <a:spLocks noGrp="1"/>
+          </p:cNvSpPr>
           <p:nvPr>
-            <p:ph idx="1" type="body"/>
+            <p:ph type="body" idx="1"/>
           </p:nvPr>
         </p:nvSpPr>
         <p:spPr>
@@ -6339,11 +6500,11 @@
           </a:ln>
         </p:spPr>
         <p:txBody>
-          <a:bodyPr anchorCtr="0" anchor="t" bIns="91425" lIns="91425" spcFirstLastPara="1" rIns="91425" wrap="square" tIns="91425">
+          <a:bodyPr spcFirstLastPara="1" wrap="square" lIns="91425" tIns="91425" rIns="91425" bIns="91425" anchor="t" anchorCtr="0">
             <a:normAutofit/>
           </a:bodyPr>
           <a:lstStyle>
-            <a:lvl1pPr indent="-311150" lvl="0" marL="457200">
+            <a:lvl1pPr marL="457200" lvl="0" indent="-311150">
               <a:lnSpc>
                 <a:spcPct val="115000"/>
               </a:lnSpc>
@@ -6369,7 +6530,7 @@
                 <a:sym typeface="Roboto"/>
               </a:defRPr>
             </a:lvl1pPr>
-            <a:lvl2pPr indent="-298450" lvl="1" marL="914400">
+            <a:lvl2pPr marL="914400" lvl="1" indent="-298450">
               <a:lnSpc>
                 <a:spcPct val="115000"/>
               </a:lnSpc>
@@ -6395,7 +6556,7 @@
                 <a:sym typeface="Roboto"/>
               </a:defRPr>
             </a:lvl2pPr>
-            <a:lvl3pPr indent="-298450" lvl="2" marL="1371600">
+            <a:lvl3pPr marL="1371600" lvl="2" indent="-298450">
               <a:lnSpc>
                 <a:spcPct val="115000"/>
               </a:lnSpc>
@@ -6421,7 +6582,7 @@
                 <a:sym typeface="Roboto"/>
               </a:defRPr>
             </a:lvl3pPr>
-            <a:lvl4pPr indent="-298450" lvl="3" marL="1828800">
+            <a:lvl4pPr marL="1828800" lvl="3" indent="-298450">
               <a:lnSpc>
                 <a:spcPct val="115000"/>
               </a:lnSpc>
@@ -6447,7 +6608,7 @@
                 <a:sym typeface="Roboto"/>
               </a:defRPr>
             </a:lvl4pPr>
-            <a:lvl5pPr indent="-298450" lvl="4" marL="2286000">
+            <a:lvl5pPr marL="2286000" lvl="4" indent="-298450">
               <a:lnSpc>
                 <a:spcPct val="115000"/>
               </a:lnSpc>
@@ -6473,7 +6634,7 @@
                 <a:sym typeface="Roboto"/>
               </a:defRPr>
             </a:lvl5pPr>
-            <a:lvl6pPr indent="-298450" lvl="5" marL="2743200">
+            <a:lvl6pPr marL="2743200" lvl="5" indent="-298450">
               <a:lnSpc>
                 <a:spcPct val="115000"/>
               </a:lnSpc>
@@ -6499,7 +6660,7 @@
                 <a:sym typeface="Roboto"/>
               </a:defRPr>
             </a:lvl6pPr>
-            <a:lvl7pPr indent="-298450" lvl="6" marL="3200400">
+            <a:lvl7pPr marL="3200400" lvl="6" indent="-298450">
               <a:lnSpc>
                 <a:spcPct val="115000"/>
               </a:lnSpc>
@@ -6525,7 +6686,7 @@
                 <a:sym typeface="Roboto"/>
               </a:defRPr>
             </a:lvl7pPr>
-            <a:lvl8pPr indent="-298450" lvl="7" marL="3657600">
+            <a:lvl8pPr marL="3657600" lvl="7" indent="-298450">
               <a:lnSpc>
                 <a:spcPct val="115000"/>
               </a:lnSpc>
@@ -6551,7 +6712,7 @@
                 <a:sym typeface="Roboto"/>
               </a:defRPr>
             </a:lvl8pPr>
-            <a:lvl9pPr indent="-298450" lvl="8" marL="4114800">
+            <a:lvl9pPr marL="4114800" lvl="8" indent="-298450">
               <a:lnSpc>
                 <a:spcPct val="115000"/>
               </a:lnSpc>
@@ -6578,15 +6739,19 @@
               </a:defRPr>
             </a:lvl9pPr>
           </a:lstStyle>
-          <a:p/>
+          <a:p>
+            <a:endParaRPr/>
+          </a:p>
         </p:txBody>
       </p:sp>
       <p:sp>
         <p:nvSpPr>
           <p:cNvPr id="8" name="Google Shape;8;p1"/>
-          <p:cNvSpPr txBox="1"/>
+          <p:cNvSpPr txBox="1">
+            <a:spLocks noGrp="1"/>
+          </p:cNvSpPr>
           <p:nvPr>
-            <p:ph idx="12" type="sldNum"/>
+            <p:ph type="sldNum" idx="12"/>
           </p:nvPr>
         </p:nvSpPr>
         <p:spPr>
@@ -6603,7 +6768,7 @@
           </a:ln>
         </p:spPr>
         <p:txBody>
-          <a:bodyPr anchorCtr="0" anchor="ctr" bIns="91425" lIns="91425" spcFirstLastPara="1" rIns="91425" wrap="square" tIns="91425">
+          <a:bodyPr spcFirstLastPara="1" wrap="square" lIns="91425" tIns="91425" rIns="91425" bIns="91425" anchor="ctr" anchorCtr="0">
             <a:normAutofit/>
           </a:bodyPr>
           <a:lstStyle>
@@ -6717,7 +6882,7 @@
             </a:lvl9pPr>
           </a:lstStyle>
           <a:p>
-            <a:pPr indent="0" lvl="0" marL="0" rtl="0" algn="r">
+            <a:pPr marL="0" lvl="0" indent="0" algn="r" rtl="0">
               <a:spcBef>
                 <a:spcPts val="0"/>
               </a:spcBef>
@@ -6728,7 +6893,7 @@
             </a:pPr>
             <a:fld id="{00000000-1234-1234-1234-123412341234}" type="slidenum">
               <a:rPr lang="es"/>
-              <a:t>‹#›</a:t>
+              <a:t>‹Nº›</a:t>
             </a:fld>
             <a:endParaRPr/>
           </a:p>
@@ -6736,7 +6901,7 @@
       </p:sp>
     </p:spTree>
   </p:cSld>
-  <p:clrMap accent1="accent1" accent2="accent2" accent3="accent3" accent4="accent4" accent5="accent5" accent6="accent6" bg1="lt1" bg2="dk2" tx1="dk1" tx2="lt2" folHlink="folHlink" hlink="hlink"/>
+  <p:clrMap bg1="lt1" tx1="dk1" bg2="dk2" tx2="lt2" accent1="accent1" accent2="accent2" accent3="accent3" accent4="accent4" accent5="accent5" accent6="accent6" hlink="hlink" folHlink="folHlink"/>
   <p:sldLayoutIdLst>
     <p:sldLayoutId id="2147483648" r:id="rId1"/>
     <p:sldLayoutId id="2147483649" r:id="rId2"/>
@@ -6750,10 +6915,10 @@
     <p:sldLayoutId id="2147483657" r:id="rId10"/>
     <p:sldLayoutId id="2147483658" r:id="rId11"/>
   </p:sldLayoutIdLst>
-  <p:hf dt="0" ftr="0" hdr="0" sldNum="0"/>
+  <p:hf sldNum="0" hdr="0" ftr="0" dt="0"/>
   <p:txStyles>
     <p:titleStyle>
-      <a:defPPr lvl="0" marR="0" rtl="0" algn="l">
+      <a:defPPr marR="0" lvl="0" algn="l" rtl="0">
         <a:lnSpc>
           <a:spcPct val="100000"/>
         </a:lnSpc>
@@ -6764,7 +6929,7 @@
           <a:spcPts val="0"/>
         </a:spcAft>
       </a:defPPr>
-      <a:lvl1pPr lvl="0" marR="0" rtl="0" algn="l">
+      <a:lvl1pPr marR="0" lvl="0" algn="l" rtl="0">
         <a:lnSpc>
           <a:spcPct val="100000"/>
         </a:lnSpc>
@@ -6778,7 +6943,7 @@
           <a:srgbClr val="000000"/>
         </a:buClr>
         <a:buFont typeface="Arial"/>
-        <a:defRPr b="0" i="0" sz="1400" u="none" cap="none" strike="noStrike">
+        <a:defRPr sz="1400" b="0" i="0" u="none" strike="noStrike" cap="none">
           <a:solidFill>
             <a:srgbClr val="000000"/>
           </a:solidFill>
@@ -6788,7 +6953,7 @@
           <a:sym typeface="Arial"/>
         </a:defRPr>
       </a:lvl1pPr>
-      <a:lvl2pPr lvl="1" marR="0" rtl="0" algn="l">
+      <a:lvl2pPr marR="0" lvl="1" algn="l" rtl="0">
         <a:lnSpc>
           <a:spcPct val="100000"/>
         </a:lnSpc>
@@ -6802,7 +6967,7 @@
           <a:srgbClr val="000000"/>
         </a:buClr>
         <a:buFont typeface="Arial"/>
-        <a:defRPr b="0" i="0" sz="1400" u="none" cap="none" strike="noStrike">
+        <a:defRPr sz="1400" b="0" i="0" u="none" strike="noStrike" cap="none">
           <a:solidFill>
             <a:srgbClr val="000000"/>
           </a:solidFill>
@@ -6812,7 +6977,7 @@
           <a:sym typeface="Arial"/>
         </a:defRPr>
       </a:lvl2pPr>
-      <a:lvl3pPr lvl="2" marR="0" rtl="0" algn="l">
+      <a:lvl3pPr marR="0" lvl="2" algn="l" rtl="0">
         <a:lnSpc>
           <a:spcPct val="100000"/>
         </a:lnSpc>
@@ -6826,7 +6991,7 @@
           <a:srgbClr val="000000"/>
         </a:buClr>
         <a:buFont typeface="Arial"/>
-        <a:defRPr b="0" i="0" sz="1400" u="none" cap="none" strike="noStrike">
+        <a:defRPr sz="1400" b="0" i="0" u="none" strike="noStrike" cap="none">
           <a:solidFill>
             <a:srgbClr val="000000"/>
           </a:solidFill>
@@ -6836,7 +7001,7 @@
           <a:sym typeface="Arial"/>
         </a:defRPr>
       </a:lvl3pPr>
-      <a:lvl4pPr lvl="3" marR="0" rtl="0" algn="l">
+      <a:lvl4pPr marR="0" lvl="3" algn="l" rtl="0">
         <a:lnSpc>
           <a:spcPct val="100000"/>
         </a:lnSpc>
@@ -6850,7 +7015,7 @@
           <a:srgbClr val="000000"/>
         </a:buClr>
         <a:buFont typeface="Arial"/>
-        <a:defRPr b="0" i="0" sz="1400" u="none" cap="none" strike="noStrike">
+        <a:defRPr sz="1400" b="0" i="0" u="none" strike="noStrike" cap="none">
           <a:solidFill>
             <a:srgbClr val="000000"/>
           </a:solidFill>
@@ -6860,7 +7025,7 @@
           <a:sym typeface="Arial"/>
         </a:defRPr>
       </a:lvl4pPr>
-      <a:lvl5pPr lvl="4" marR="0" rtl="0" algn="l">
+      <a:lvl5pPr marR="0" lvl="4" algn="l" rtl="0">
         <a:lnSpc>
           <a:spcPct val="100000"/>
         </a:lnSpc>
@@ -6874,7 +7039,7 @@
           <a:srgbClr val="000000"/>
         </a:buClr>
         <a:buFont typeface="Arial"/>
-        <a:defRPr b="0" i="0" sz="1400" u="none" cap="none" strike="noStrike">
+        <a:defRPr sz="1400" b="0" i="0" u="none" strike="noStrike" cap="none">
           <a:solidFill>
             <a:srgbClr val="000000"/>
           </a:solidFill>
@@ -6884,7 +7049,7 @@
           <a:sym typeface="Arial"/>
         </a:defRPr>
       </a:lvl5pPr>
-      <a:lvl6pPr lvl="5" marR="0" rtl="0" algn="l">
+      <a:lvl6pPr marR="0" lvl="5" algn="l" rtl="0">
         <a:lnSpc>
           <a:spcPct val="100000"/>
         </a:lnSpc>
@@ -6898,7 +7063,7 @@
           <a:srgbClr val="000000"/>
         </a:buClr>
         <a:buFont typeface="Arial"/>
-        <a:defRPr b="0" i="0" sz="1400" u="none" cap="none" strike="noStrike">
+        <a:defRPr sz="1400" b="0" i="0" u="none" strike="noStrike" cap="none">
           <a:solidFill>
             <a:srgbClr val="000000"/>
           </a:solidFill>
@@ -6908,7 +7073,7 @@
           <a:sym typeface="Arial"/>
         </a:defRPr>
       </a:lvl6pPr>
-      <a:lvl7pPr lvl="6" marR="0" rtl="0" algn="l">
+      <a:lvl7pPr marR="0" lvl="6" algn="l" rtl="0">
         <a:lnSpc>
           <a:spcPct val="100000"/>
         </a:lnSpc>
@@ -6922,7 +7087,7 @@
           <a:srgbClr val="000000"/>
         </a:buClr>
         <a:buFont typeface="Arial"/>
-        <a:defRPr b="0" i="0" sz="1400" u="none" cap="none" strike="noStrike">
+        <a:defRPr sz="1400" b="0" i="0" u="none" strike="noStrike" cap="none">
           <a:solidFill>
             <a:srgbClr val="000000"/>
           </a:solidFill>
@@ -6932,7 +7097,7 @@
           <a:sym typeface="Arial"/>
         </a:defRPr>
       </a:lvl7pPr>
-      <a:lvl8pPr lvl="7" marR="0" rtl="0" algn="l">
+      <a:lvl8pPr marR="0" lvl="7" algn="l" rtl="0">
         <a:lnSpc>
           <a:spcPct val="100000"/>
         </a:lnSpc>
@@ -6946,7 +7111,7 @@
           <a:srgbClr val="000000"/>
         </a:buClr>
         <a:buFont typeface="Arial"/>
-        <a:defRPr b="0" i="0" sz="1400" u="none" cap="none" strike="noStrike">
+        <a:defRPr sz="1400" b="0" i="0" u="none" strike="noStrike" cap="none">
           <a:solidFill>
             <a:srgbClr val="000000"/>
           </a:solidFill>
@@ -6956,7 +7121,7 @@
           <a:sym typeface="Arial"/>
         </a:defRPr>
       </a:lvl8pPr>
-      <a:lvl9pPr lvl="8" marR="0" rtl="0" algn="l">
+      <a:lvl9pPr marR="0" lvl="8" algn="l" rtl="0">
         <a:lnSpc>
           <a:spcPct val="100000"/>
         </a:lnSpc>
@@ -6970,7 +7135,7 @@
           <a:srgbClr val="000000"/>
         </a:buClr>
         <a:buFont typeface="Arial"/>
-        <a:defRPr b="0" i="0" sz="1400" u="none" cap="none" strike="noStrike">
+        <a:defRPr sz="1400" b="0" i="0" u="none" strike="noStrike" cap="none">
           <a:solidFill>
             <a:srgbClr val="000000"/>
           </a:solidFill>
@@ -6982,7 +7147,7 @@
       </a:lvl9pPr>
     </p:titleStyle>
     <p:bodyStyle>
-      <a:defPPr lvl="0" marR="0" rtl="0" algn="l">
+      <a:defPPr marR="0" lvl="0" algn="l" rtl="0">
         <a:lnSpc>
           <a:spcPct val="100000"/>
         </a:lnSpc>
@@ -6993,7 +7158,7 @@
           <a:spcPts val="0"/>
         </a:spcAft>
       </a:defPPr>
-      <a:lvl1pPr lvl="0" marR="0" rtl="0" algn="l">
+      <a:lvl1pPr marR="0" lvl="0" algn="l" rtl="0">
         <a:lnSpc>
           <a:spcPct val="100000"/>
         </a:lnSpc>
@@ -7007,7 +7172,7 @@
           <a:srgbClr val="000000"/>
         </a:buClr>
         <a:buFont typeface="Arial"/>
-        <a:defRPr b="0" i="0" sz="1400" u="none" cap="none" strike="noStrike">
+        <a:defRPr sz="1400" b="0" i="0" u="none" strike="noStrike" cap="none">
           <a:solidFill>
             <a:srgbClr val="000000"/>
           </a:solidFill>
@@ -7017,7 +7182,7 @@
           <a:sym typeface="Arial"/>
         </a:defRPr>
       </a:lvl1pPr>
-      <a:lvl2pPr lvl="1" marR="0" rtl="0" algn="l">
+      <a:lvl2pPr marR="0" lvl="1" algn="l" rtl="0">
         <a:lnSpc>
           <a:spcPct val="100000"/>
         </a:lnSpc>
@@ -7031,7 +7196,7 @@
           <a:srgbClr val="000000"/>
         </a:buClr>
         <a:buFont typeface="Arial"/>
-        <a:defRPr b="0" i="0" sz="1400" u="none" cap="none" strike="noStrike">
+        <a:defRPr sz="1400" b="0" i="0" u="none" strike="noStrike" cap="none">
           <a:solidFill>
             <a:srgbClr val="000000"/>
           </a:solidFill>
@@ -7041,7 +7206,7 @@
           <a:sym typeface="Arial"/>
         </a:defRPr>
       </a:lvl2pPr>
-      <a:lvl3pPr lvl="2" marR="0" rtl="0" algn="l">
+      <a:lvl3pPr marR="0" lvl="2" algn="l" rtl="0">
         <a:lnSpc>
           <a:spcPct val="100000"/>
         </a:lnSpc>
@@ -7055,7 +7220,7 @@
           <a:srgbClr val="000000"/>
         </a:buClr>
         <a:buFont typeface="Arial"/>
-        <a:defRPr b="0" i="0" sz="1400" u="none" cap="none" strike="noStrike">
+        <a:defRPr sz="1400" b="0" i="0" u="none" strike="noStrike" cap="none">
           <a:solidFill>
             <a:srgbClr val="000000"/>
           </a:solidFill>
@@ -7065,7 +7230,7 @@
           <a:sym typeface="Arial"/>
         </a:defRPr>
       </a:lvl3pPr>
-      <a:lvl4pPr lvl="3" marR="0" rtl="0" algn="l">
+      <a:lvl4pPr marR="0" lvl="3" algn="l" rtl="0">
         <a:lnSpc>
           <a:spcPct val="100000"/>
         </a:lnSpc>
@@ -7079,7 +7244,7 @@
           <a:srgbClr val="000000"/>
         </a:buClr>
         <a:buFont typeface="Arial"/>
-        <a:defRPr b="0" i="0" sz="1400" u="none" cap="none" strike="noStrike">
+        <a:defRPr sz="1400" b="0" i="0" u="none" strike="noStrike" cap="none">
           <a:solidFill>
             <a:srgbClr val="000000"/>
           </a:solidFill>
@@ -7089,7 +7254,7 @@
           <a:sym typeface="Arial"/>
         </a:defRPr>
       </a:lvl4pPr>
-      <a:lvl5pPr lvl="4" marR="0" rtl="0" algn="l">
+      <a:lvl5pPr marR="0" lvl="4" algn="l" rtl="0">
         <a:lnSpc>
           <a:spcPct val="100000"/>
         </a:lnSpc>
@@ -7103,7 +7268,7 @@
           <a:srgbClr val="000000"/>
         </a:buClr>
         <a:buFont typeface="Arial"/>
-        <a:defRPr b="0" i="0" sz="1400" u="none" cap="none" strike="noStrike">
+        <a:defRPr sz="1400" b="0" i="0" u="none" strike="noStrike" cap="none">
           <a:solidFill>
             <a:srgbClr val="000000"/>
           </a:solidFill>
@@ -7113,7 +7278,7 @@
           <a:sym typeface="Arial"/>
         </a:defRPr>
       </a:lvl5pPr>
-      <a:lvl6pPr lvl="5" marR="0" rtl="0" algn="l">
+      <a:lvl6pPr marR="0" lvl="5" algn="l" rtl="0">
         <a:lnSpc>
           <a:spcPct val="100000"/>
         </a:lnSpc>
@@ -7127,7 +7292,7 @@
           <a:srgbClr val="000000"/>
         </a:buClr>
         <a:buFont typeface="Arial"/>
-        <a:defRPr b="0" i="0" sz="1400" u="none" cap="none" strike="noStrike">
+        <a:defRPr sz="1400" b="0" i="0" u="none" strike="noStrike" cap="none">
           <a:solidFill>
             <a:srgbClr val="000000"/>
           </a:solidFill>
@@ -7137,7 +7302,7 @@
           <a:sym typeface="Arial"/>
         </a:defRPr>
       </a:lvl6pPr>
-      <a:lvl7pPr lvl="6" marR="0" rtl="0" algn="l">
+      <a:lvl7pPr marR="0" lvl="6" algn="l" rtl="0">
         <a:lnSpc>
           <a:spcPct val="100000"/>
         </a:lnSpc>
@@ -7151,7 +7316,7 @@
           <a:srgbClr val="000000"/>
         </a:buClr>
         <a:buFont typeface="Arial"/>
-        <a:defRPr b="0" i="0" sz="1400" u="none" cap="none" strike="noStrike">
+        <a:defRPr sz="1400" b="0" i="0" u="none" strike="noStrike" cap="none">
           <a:solidFill>
             <a:srgbClr val="000000"/>
           </a:solidFill>
@@ -7161,7 +7326,7 @@
           <a:sym typeface="Arial"/>
         </a:defRPr>
       </a:lvl7pPr>
-      <a:lvl8pPr lvl="7" marR="0" rtl="0" algn="l">
+      <a:lvl8pPr marR="0" lvl="7" algn="l" rtl="0">
         <a:lnSpc>
           <a:spcPct val="100000"/>
         </a:lnSpc>
@@ -7175,7 +7340,7 @@
           <a:srgbClr val="000000"/>
         </a:buClr>
         <a:buFont typeface="Arial"/>
-        <a:defRPr b="0" i="0" sz="1400" u="none" cap="none" strike="noStrike">
+        <a:defRPr sz="1400" b="0" i="0" u="none" strike="noStrike" cap="none">
           <a:solidFill>
             <a:srgbClr val="000000"/>
           </a:solidFill>
@@ -7185,7 +7350,7 @@
           <a:sym typeface="Arial"/>
         </a:defRPr>
       </a:lvl8pPr>
-      <a:lvl9pPr lvl="8" marR="0" rtl="0" algn="l">
+      <a:lvl9pPr marR="0" lvl="8" algn="l" rtl="0">
         <a:lnSpc>
           <a:spcPct val="100000"/>
         </a:lnSpc>
@@ -7199,7 +7364,7 @@
           <a:srgbClr val="000000"/>
         </a:buClr>
         <a:buFont typeface="Arial"/>
-        <a:defRPr b="0" i="0" sz="1400" u="none" cap="none" strike="noStrike">
+        <a:defRPr sz="1400" b="0" i="0" u="none" strike="noStrike" cap="none">
           <a:solidFill>
             <a:srgbClr val="000000"/>
           </a:solidFill>
@@ -7211,7 +7376,7 @@
       </a:lvl9pPr>
     </p:bodyStyle>
     <p:otherStyle>
-      <a:defPPr lvl="0" marR="0" rtl="0" algn="l">
+      <a:defPPr marR="0" lvl="0" algn="l" rtl="0">
         <a:lnSpc>
           <a:spcPct val="100000"/>
         </a:lnSpc>
@@ -7222,7 +7387,7 @@
           <a:spcPts val="0"/>
         </a:spcAft>
       </a:defPPr>
-      <a:lvl1pPr lvl="0" marR="0" rtl="0" algn="l">
+      <a:lvl1pPr marR="0" lvl="0" algn="l" rtl="0">
         <a:lnSpc>
           <a:spcPct val="100000"/>
         </a:lnSpc>
@@ -7236,7 +7401,7 @@
           <a:srgbClr val="000000"/>
         </a:buClr>
         <a:buFont typeface="Arial"/>
-        <a:defRPr b="0" i="0" sz="1400" u="none" cap="none" strike="noStrike">
+        <a:defRPr sz="1400" b="0" i="0" u="none" strike="noStrike" cap="none">
           <a:solidFill>
             <a:srgbClr val="000000"/>
           </a:solidFill>
@@ -7246,7 +7411,7 @@
           <a:sym typeface="Arial"/>
         </a:defRPr>
       </a:lvl1pPr>
-      <a:lvl2pPr lvl="1" marR="0" rtl="0" algn="l">
+      <a:lvl2pPr marR="0" lvl="1" algn="l" rtl="0">
         <a:lnSpc>
           <a:spcPct val="100000"/>
         </a:lnSpc>
@@ -7260,7 +7425,7 @@
           <a:srgbClr val="000000"/>
         </a:buClr>
         <a:buFont typeface="Arial"/>
-        <a:defRPr b="0" i="0" sz="1400" u="none" cap="none" strike="noStrike">
+        <a:defRPr sz="1400" b="0" i="0" u="none" strike="noStrike" cap="none">
           <a:solidFill>
             <a:srgbClr val="000000"/>
           </a:solidFill>
@@ -7270,7 +7435,7 @@
           <a:sym typeface="Arial"/>
         </a:defRPr>
       </a:lvl2pPr>
-      <a:lvl3pPr lvl="2" marR="0" rtl="0" algn="l">
+      <a:lvl3pPr marR="0" lvl="2" algn="l" rtl="0">
         <a:lnSpc>
           <a:spcPct val="100000"/>
         </a:lnSpc>
@@ -7284,7 +7449,7 @@
           <a:srgbClr val="000000"/>
         </a:buClr>
         <a:buFont typeface="Arial"/>
-        <a:defRPr b="0" i="0" sz="1400" u="none" cap="none" strike="noStrike">
+        <a:defRPr sz="1400" b="0" i="0" u="none" strike="noStrike" cap="none">
           <a:solidFill>
             <a:srgbClr val="000000"/>
           </a:solidFill>
@@ -7294,7 +7459,7 @@
           <a:sym typeface="Arial"/>
         </a:defRPr>
       </a:lvl3pPr>
-      <a:lvl4pPr lvl="3" marR="0" rtl="0" algn="l">
+      <a:lvl4pPr marR="0" lvl="3" algn="l" rtl="0">
         <a:lnSpc>
           <a:spcPct val="100000"/>
         </a:lnSpc>
@@ -7308,7 +7473,7 @@
           <a:srgbClr val="000000"/>
         </a:buClr>
         <a:buFont typeface="Arial"/>
-        <a:defRPr b="0" i="0" sz="1400" u="none" cap="none" strike="noStrike">
+        <a:defRPr sz="1400" b="0" i="0" u="none" strike="noStrike" cap="none">
           <a:solidFill>
             <a:srgbClr val="000000"/>
           </a:solidFill>
@@ -7318,7 +7483,7 @@
           <a:sym typeface="Arial"/>
         </a:defRPr>
       </a:lvl4pPr>
-      <a:lvl5pPr lvl="4" marR="0" rtl="0" algn="l">
+      <a:lvl5pPr marR="0" lvl="4" algn="l" rtl="0">
         <a:lnSpc>
           <a:spcPct val="100000"/>
         </a:lnSpc>
@@ -7332,7 +7497,7 @@
           <a:srgbClr val="000000"/>
         </a:buClr>
         <a:buFont typeface="Arial"/>
-        <a:defRPr b="0" i="0" sz="1400" u="none" cap="none" strike="noStrike">
+        <a:defRPr sz="1400" b="0" i="0" u="none" strike="noStrike" cap="none">
           <a:solidFill>
             <a:srgbClr val="000000"/>
           </a:solidFill>
@@ -7342,7 +7507,7 @@
           <a:sym typeface="Arial"/>
         </a:defRPr>
       </a:lvl5pPr>
-      <a:lvl6pPr lvl="5" marR="0" rtl="0" algn="l">
+      <a:lvl6pPr marR="0" lvl="5" algn="l" rtl="0">
         <a:lnSpc>
           <a:spcPct val="100000"/>
         </a:lnSpc>
@@ -7356,7 +7521,7 @@
           <a:srgbClr val="000000"/>
         </a:buClr>
         <a:buFont typeface="Arial"/>
-        <a:defRPr b="0" i="0" sz="1400" u="none" cap="none" strike="noStrike">
+        <a:defRPr sz="1400" b="0" i="0" u="none" strike="noStrike" cap="none">
           <a:solidFill>
             <a:srgbClr val="000000"/>
           </a:solidFill>
@@ -7366,7 +7531,7 @@
           <a:sym typeface="Arial"/>
         </a:defRPr>
       </a:lvl6pPr>
-      <a:lvl7pPr lvl="6" marR="0" rtl="0" algn="l">
+      <a:lvl7pPr marR="0" lvl="6" algn="l" rtl="0">
         <a:lnSpc>
           <a:spcPct val="100000"/>
         </a:lnSpc>
@@ -7380,7 +7545,7 @@
           <a:srgbClr val="000000"/>
         </a:buClr>
         <a:buFont typeface="Arial"/>
-        <a:defRPr b="0" i="0" sz="1400" u="none" cap="none" strike="noStrike">
+        <a:defRPr sz="1400" b="0" i="0" u="none" strike="noStrike" cap="none">
           <a:solidFill>
             <a:srgbClr val="000000"/>
           </a:solidFill>
@@ -7390,7 +7555,7 @@
           <a:sym typeface="Arial"/>
         </a:defRPr>
       </a:lvl7pPr>
-      <a:lvl8pPr lvl="7" marR="0" rtl="0" algn="l">
+      <a:lvl8pPr marR="0" lvl="7" algn="l" rtl="0">
         <a:lnSpc>
           <a:spcPct val="100000"/>
         </a:lnSpc>
@@ -7404,7 +7569,7 @@
           <a:srgbClr val="000000"/>
         </a:buClr>
         <a:buFont typeface="Arial"/>
-        <a:defRPr b="0" i="0" sz="1400" u="none" cap="none" strike="noStrike">
+        <a:defRPr sz="1400" b="0" i="0" u="none" strike="noStrike" cap="none">
           <a:solidFill>
             <a:srgbClr val="000000"/>
           </a:solidFill>
@@ -7414,7 +7579,7 @@
           <a:sym typeface="Arial"/>
         </a:defRPr>
       </a:lvl8pPr>
-      <a:lvl9pPr lvl="8" marR="0" rtl="0" algn="l">
+      <a:lvl9pPr marR="0" lvl="8" algn="l" rtl="0">
         <a:lnSpc>
           <a:spcPct val="100000"/>
         </a:lnSpc>
@@ -7428,7 +7593,7 @@
           <a:srgbClr val="000000"/>
         </a:buClr>
         <a:buFont typeface="Arial"/>
-        <a:defRPr b="0" i="0" sz="1400" u="none" cap="none" strike="noStrike">
+        <a:defRPr sz="1400" b="0" i="0" u="none" strike="noStrike" cap="none">
           <a:solidFill>
             <a:srgbClr val="000000"/>
           </a:solidFill>
@@ -7444,11 +7609,11 @@
 </file>
 
 <file path=ppt/slides/slide1.xml><?xml version="1.0" encoding="utf-8"?>
-<p:sld xmlns:a="http://schemas.openxmlformats.org/drawingml/2006/main" xmlns:r="http://schemas.openxmlformats.org/officeDocument/2006/relationships" xmlns:mc="http://schemas.openxmlformats.org/markup-compatibility/2006" xmlns:mv="urn:schemas-microsoft-com:mac:vml" xmlns:p="http://schemas.openxmlformats.org/presentationml/2006/main" xmlns:c="http://schemas.openxmlformats.org/drawingml/2006/chart" xmlns:dgm="http://schemas.openxmlformats.org/drawingml/2006/diagram" xmlns:o="urn:schemas-microsoft-com:office:office" xmlns:v="urn:schemas-microsoft-com:vml" xmlns:pvml="urn:schemas-microsoft-com:office:powerpoint" xmlns:com="http://schemas.openxmlformats.org/drawingml/2006/compatibility" xmlns:p14="http://schemas.microsoft.com/office/powerpoint/2010/main" xmlns:p15="http://schemas.microsoft.com/office/powerpoint/2012/main" xmlns:ahyp="http://schemas.microsoft.com/office/drawing/2018/hyperlinkcolor">
+<p:sld xmlns:a="http://schemas.openxmlformats.org/drawingml/2006/main" xmlns:r="http://schemas.openxmlformats.org/officeDocument/2006/relationships" xmlns:p="http://schemas.openxmlformats.org/presentationml/2006/main">
   <p:cSld>
     <p:spTree>
       <p:nvGrpSpPr>
-        <p:cNvPr id="63" name="Shape 63"/>
+        <p:cNvPr id="1" name="Shape 63"/>
         <p:cNvGrpSpPr/>
         <p:nvPr/>
       </p:nvGrpSpPr>
@@ -7490,7 +7655,7 @@
       </p:pic>
       <p:pic>
         <p:nvPicPr>
-          <p:cNvPr descr="C:\Users\techartivity\AppData\Local\Microsoft\Windows\INetCache\Content.Word\20210205_emu061_logo_v0.03.png" id="65" name="Google Shape;65;p13"/>
+          <p:cNvPr id="65" name="Google Shape;65;p13" descr="C:\Users\techartivity\AppData\Local\Microsoft\Windows\INetCache\Content.Word\20210205_emu061_logo_v0.03.png"/>
           <p:cNvPicPr preferRelativeResize="0"/>
           <p:nvPr/>
         </p:nvPicPr>
@@ -7536,12 +7701,12 @@
           </a:ln>
         </p:spPr>
         <p:txBody>
-          <a:bodyPr anchorCtr="0" anchor="t" bIns="91425" lIns="91425" spcFirstLastPara="1" rIns="91425" wrap="square" tIns="91425">
+          <a:bodyPr spcFirstLastPara="1" wrap="square" lIns="91425" tIns="91425" rIns="91425" bIns="91425" anchor="t" anchorCtr="0">
             <a:spAutoFit/>
           </a:bodyPr>
           <a:lstStyle/>
           <a:p>
-            <a:pPr indent="0" lvl="0" marL="0" rtl="0" algn="l">
+            <a:pPr marL="0" lvl="0" indent="0" algn="l" rtl="0">
               <a:spcBef>
                 <a:spcPts val="0"/>
               </a:spcBef>
@@ -7551,33 +7716,15 @@
               <a:buNone/>
             </a:pPr>
             <a:r>
-              <a:rPr b="1" lang="es" sz="2500">
+              <a:rPr lang="es" sz="2500" b="1">
                 <a:latin typeface="Roboto"/>
                 <a:ea typeface="Roboto"/>
                 <a:cs typeface="Roboto"/>
                 <a:sym typeface="Roboto"/>
               </a:rPr>
-              <a:t>PRESENTACIÓN</a:t>
+              <a:t>PRESENTACIÓN TÉCNICA</a:t>
             </a:r>
-            <a:r>
-              <a:rPr b="1" lang="es" sz="2500">
-                <a:latin typeface="Roboto"/>
-                <a:ea typeface="Roboto"/>
-                <a:cs typeface="Roboto"/>
-                <a:sym typeface="Roboto"/>
-              </a:rPr>
-              <a:t> </a:t>
-            </a:r>
-            <a:r>
-              <a:rPr b="1" lang="es" sz="2500">
-                <a:latin typeface="Roboto"/>
-                <a:ea typeface="Roboto"/>
-                <a:cs typeface="Roboto"/>
-                <a:sym typeface="Roboto"/>
-              </a:rPr>
-              <a:t>TÉCNICA</a:t>
-            </a:r>
-            <a:endParaRPr b="1" sz="2500">
+            <a:endParaRPr sz="2500" b="1">
               <a:latin typeface="Roboto"/>
               <a:ea typeface="Roboto"/>
               <a:cs typeface="Roboto"/>
@@ -7606,12 +7753,12 @@
           </a:ln>
         </p:spPr>
         <p:txBody>
-          <a:bodyPr anchorCtr="0" anchor="t" bIns="91425" lIns="91425" spcFirstLastPara="1" rIns="91425" wrap="square" tIns="91425">
+          <a:bodyPr spcFirstLastPara="1" wrap="square" lIns="91425" tIns="91425" rIns="91425" bIns="91425" anchor="t" anchorCtr="0">
             <a:spAutoFit/>
           </a:bodyPr>
           <a:lstStyle/>
           <a:p>
-            <a:pPr indent="0" lvl="0" marL="0" rtl="0" algn="l">
+            <a:pPr marL="0" lvl="0" indent="0" algn="l" rtl="0">
               <a:spcBef>
                 <a:spcPts val="0"/>
               </a:spcBef>
@@ -7647,11 +7794,11 @@
 </file>
 
 <file path=ppt/slides/slide2.xml><?xml version="1.0" encoding="utf-8"?>
-<p:sld xmlns:a="http://schemas.openxmlformats.org/drawingml/2006/main" xmlns:r="http://schemas.openxmlformats.org/officeDocument/2006/relationships" xmlns:mc="http://schemas.openxmlformats.org/markup-compatibility/2006" xmlns:mv="urn:schemas-microsoft-com:mac:vml" xmlns:p="http://schemas.openxmlformats.org/presentationml/2006/main" xmlns:c="http://schemas.openxmlformats.org/drawingml/2006/chart" xmlns:dgm="http://schemas.openxmlformats.org/drawingml/2006/diagram" xmlns:o="urn:schemas-microsoft-com:office:office" xmlns:v="urn:schemas-microsoft-com:vml" xmlns:pvml="urn:schemas-microsoft-com:office:powerpoint" xmlns:com="http://schemas.openxmlformats.org/drawingml/2006/compatibility" xmlns:p14="http://schemas.microsoft.com/office/powerpoint/2010/main" xmlns:p15="http://schemas.microsoft.com/office/powerpoint/2012/main" xmlns:ahyp="http://schemas.microsoft.com/office/drawing/2018/hyperlinkcolor">
+<p:sld xmlns:a="http://schemas.openxmlformats.org/drawingml/2006/main" xmlns:r="http://schemas.openxmlformats.org/officeDocument/2006/relationships" xmlns:p="http://schemas.openxmlformats.org/presentationml/2006/main">
   <p:cSld>
     <p:spTree>
       <p:nvGrpSpPr>
-        <p:cNvPr id="71" name="Shape 71"/>
+        <p:cNvPr id="1" name="Shape 71"/>
         <p:cNvGrpSpPr/>
         <p:nvPr/>
       </p:nvGrpSpPr>
@@ -7666,7 +7813,9 @@
       <p:sp>
         <p:nvSpPr>
           <p:cNvPr id="72" name="Google Shape;72;p14"/>
-          <p:cNvSpPr txBox="1"/>
+          <p:cNvSpPr txBox="1">
+            <a:spLocks noGrp="1"/>
+          </p:cNvSpPr>
           <p:nvPr>
             <p:ph type="title"/>
           </p:nvPr>
@@ -7681,12 +7830,12 @@
           </a:prstGeom>
         </p:spPr>
         <p:txBody>
-          <a:bodyPr anchorCtr="0" anchor="t" bIns="91425" lIns="91425" spcFirstLastPara="1" rIns="91425" wrap="square" tIns="91425">
+          <a:bodyPr spcFirstLastPara="1" wrap="square" lIns="91425" tIns="91425" rIns="91425" bIns="91425" anchor="t" anchorCtr="0">
             <a:normAutofit/>
           </a:bodyPr>
           <a:lstStyle/>
           <a:p>
-            <a:pPr indent="0" lvl="0" marL="0" rtl="0" algn="l">
+            <a:pPr marL="0" lvl="0" indent="0" algn="l" rtl="0">
               <a:spcBef>
                 <a:spcPts val="0"/>
               </a:spcBef>
@@ -7702,16 +7851,7 @@
                 <a:cs typeface="Nunito"/>
                 <a:sym typeface="Nunito"/>
               </a:rPr>
-              <a:t>PRESENTACIÓN</a:t>
-            </a:r>
-            <a:r>
-              <a:rPr lang="es">
-                <a:latin typeface="Nunito"/>
-                <a:ea typeface="Nunito"/>
-                <a:cs typeface="Nunito"/>
-                <a:sym typeface="Nunito"/>
-              </a:rPr>
-              <a:t> DEL PROYECTO</a:t>
+              <a:t>PRESENTACIÓN DEL PROYECTO</a:t>
             </a:r>
             <a:endParaRPr>
               <a:latin typeface="Nunito"/>
@@ -7815,11 +7955,11 @@
 </file>
 
 <file path=ppt/slides/slide3.xml><?xml version="1.0" encoding="utf-8"?>
-<p:sld xmlns:a="http://schemas.openxmlformats.org/drawingml/2006/main" xmlns:r="http://schemas.openxmlformats.org/officeDocument/2006/relationships" xmlns:mc="http://schemas.openxmlformats.org/markup-compatibility/2006" xmlns:mv="urn:schemas-microsoft-com:mac:vml" xmlns:p="http://schemas.openxmlformats.org/presentationml/2006/main" xmlns:c="http://schemas.openxmlformats.org/drawingml/2006/chart" xmlns:dgm="http://schemas.openxmlformats.org/drawingml/2006/diagram" xmlns:o="urn:schemas-microsoft-com:office:office" xmlns:v="urn:schemas-microsoft-com:vml" xmlns:pvml="urn:schemas-microsoft-com:office:powerpoint" xmlns:com="http://schemas.openxmlformats.org/drawingml/2006/compatibility" xmlns:p14="http://schemas.microsoft.com/office/powerpoint/2010/main" xmlns:p15="http://schemas.microsoft.com/office/powerpoint/2012/main" xmlns:ahyp="http://schemas.microsoft.com/office/drawing/2018/hyperlinkcolor">
+<p:sld xmlns:a="http://schemas.openxmlformats.org/drawingml/2006/main" xmlns:r="http://schemas.openxmlformats.org/officeDocument/2006/relationships" xmlns:p="http://schemas.openxmlformats.org/presentationml/2006/main">
   <p:cSld>
     <p:spTree>
       <p:nvGrpSpPr>
-        <p:cNvPr id="79" name="Shape 79"/>
+        <p:cNvPr id="1" name="Shape 79"/>
         <p:cNvGrpSpPr/>
         <p:nvPr/>
       </p:nvGrpSpPr>
@@ -7834,7 +7974,9 @@
       <p:sp>
         <p:nvSpPr>
           <p:cNvPr id="80" name="Google Shape;80;p15"/>
-          <p:cNvSpPr txBox="1"/>
+          <p:cNvSpPr txBox="1">
+            <a:spLocks noGrp="1"/>
+          </p:cNvSpPr>
           <p:nvPr>
             <p:ph type="title"/>
           </p:nvPr>
@@ -7849,12 +7991,12 @@
           </a:prstGeom>
         </p:spPr>
         <p:txBody>
-          <a:bodyPr anchorCtr="0" anchor="t" bIns="91425" lIns="91425" spcFirstLastPara="1" rIns="91425" wrap="square" tIns="91425">
+          <a:bodyPr spcFirstLastPara="1" wrap="square" lIns="91425" tIns="91425" rIns="91425" bIns="91425" anchor="t" anchorCtr="0">
             <a:normAutofit/>
           </a:bodyPr>
           <a:lstStyle/>
           <a:p>
-            <a:pPr indent="0" lvl="0" marL="0" rtl="0" algn="l">
+            <a:pPr marL="0" lvl="0" indent="0" algn="l" rtl="0">
               <a:spcBef>
                 <a:spcPts val="0"/>
               </a:spcBef>
@@ -8114,11 +8256,11 @@
 </file>
 
 <file path=ppt/slides/slide4.xml><?xml version="1.0" encoding="utf-8"?>
-<p:sld xmlns:a="http://schemas.openxmlformats.org/drawingml/2006/main" xmlns:r="http://schemas.openxmlformats.org/officeDocument/2006/relationships" xmlns:mc="http://schemas.openxmlformats.org/markup-compatibility/2006" xmlns:mv="urn:schemas-microsoft-com:mac:vml" xmlns:p="http://schemas.openxmlformats.org/presentationml/2006/main" xmlns:c="http://schemas.openxmlformats.org/drawingml/2006/chart" xmlns:dgm="http://schemas.openxmlformats.org/drawingml/2006/diagram" xmlns:o="urn:schemas-microsoft-com:office:office" xmlns:v="urn:schemas-microsoft-com:vml" xmlns:pvml="urn:schemas-microsoft-com:office:powerpoint" xmlns:com="http://schemas.openxmlformats.org/drawingml/2006/compatibility" xmlns:p14="http://schemas.microsoft.com/office/powerpoint/2010/main" xmlns:p15="http://schemas.microsoft.com/office/powerpoint/2012/main" xmlns:ahyp="http://schemas.microsoft.com/office/drawing/2018/hyperlinkcolor">
+<p:sld xmlns:a="http://schemas.openxmlformats.org/drawingml/2006/main" xmlns:r="http://schemas.openxmlformats.org/officeDocument/2006/relationships" xmlns:p="http://schemas.openxmlformats.org/presentationml/2006/main">
   <p:cSld>
     <p:spTree>
       <p:nvGrpSpPr>
-        <p:cNvPr id="92" name="Shape 92"/>
+        <p:cNvPr id="1" name="Shape 92"/>
         <p:cNvGrpSpPr/>
         <p:nvPr/>
       </p:nvGrpSpPr>
@@ -8133,7 +8275,9 @@
       <p:sp>
         <p:nvSpPr>
           <p:cNvPr id="93" name="Google Shape;93;p16"/>
-          <p:cNvSpPr txBox="1"/>
+          <p:cNvSpPr txBox="1">
+            <a:spLocks noGrp="1"/>
+          </p:cNvSpPr>
           <p:nvPr>
             <p:ph type="title"/>
           </p:nvPr>
@@ -8148,12 +8292,12 @@
           </a:prstGeom>
         </p:spPr>
         <p:txBody>
-          <a:bodyPr anchorCtr="0" anchor="t" bIns="91425" lIns="91425" spcFirstLastPara="1" rIns="91425" wrap="square" tIns="91425">
+          <a:bodyPr spcFirstLastPara="1" wrap="square" lIns="91425" tIns="91425" rIns="91425" bIns="91425" anchor="t" anchorCtr="0">
             <a:normAutofit/>
           </a:bodyPr>
           <a:lstStyle/>
           <a:p>
-            <a:pPr indent="0" lvl="0" marL="0" rtl="0" algn="l">
+            <a:pPr marL="0" lvl="0" indent="0" algn="l" rtl="0">
               <a:spcBef>
                 <a:spcPts val="0"/>
               </a:spcBef>
@@ -8245,11 +8389,11 @@
 </file>
 
 <file path=ppt/slides/slide5.xml><?xml version="1.0" encoding="utf-8"?>
-<p:sld xmlns:a="http://schemas.openxmlformats.org/drawingml/2006/main" xmlns:r="http://schemas.openxmlformats.org/officeDocument/2006/relationships" xmlns:mc="http://schemas.openxmlformats.org/markup-compatibility/2006" xmlns:mv="urn:schemas-microsoft-com:mac:vml" xmlns:p="http://schemas.openxmlformats.org/presentationml/2006/main" xmlns:c="http://schemas.openxmlformats.org/drawingml/2006/chart" xmlns:dgm="http://schemas.openxmlformats.org/drawingml/2006/diagram" xmlns:o="urn:schemas-microsoft-com:office:office" xmlns:v="urn:schemas-microsoft-com:vml" xmlns:pvml="urn:schemas-microsoft-com:office:powerpoint" xmlns:com="http://schemas.openxmlformats.org/drawingml/2006/compatibility" xmlns:p14="http://schemas.microsoft.com/office/powerpoint/2010/main" xmlns:p15="http://schemas.microsoft.com/office/powerpoint/2012/main" xmlns:ahyp="http://schemas.microsoft.com/office/drawing/2018/hyperlinkcolor">
+<p:sld xmlns:a="http://schemas.openxmlformats.org/drawingml/2006/main" xmlns:r="http://schemas.openxmlformats.org/officeDocument/2006/relationships" xmlns:p="http://schemas.openxmlformats.org/presentationml/2006/main">
   <p:cSld>
     <p:spTree>
       <p:nvGrpSpPr>
-        <p:cNvPr id="99" name="Shape 99"/>
+        <p:cNvPr id="1" name="Shape 99"/>
         <p:cNvGrpSpPr/>
         <p:nvPr/>
       </p:nvGrpSpPr>
@@ -8264,7 +8408,9 @@
       <p:sp>
         <p:nvSpPr>
           <p:cNvPr id="100" name="Google Shape;100;p17"/>
-          <p:cNvSpPr txBox="1"/>
+          <p:cNvSpPr txBox="1">
+            <a:spLocks noGrp="1"/>
+          </p:cNvSpPr>
           <p:nvPr>
             <p:ph type="title"/>
           </p:nvPr>
@@ -8279,12 +8425,12 @@
           </a:prstGeom>
         </p:spPr>
         <p:txBody>
-          <a:bodyPr anchorCtr="0" anchor="t" bIns="91425" lIns="91425" spcFirstLastPara="1" rIns="91425" wrap="square" tIns="91425">
+          <a:bodyPr spcFirstLastPara="1" wrap="square" lIns="91425" tIns="91425" rIns="91425" bIns="91425" anchor="t" anchorCtr="0">
             <a:normAutofit/>
           </a:bodyPr>
           <a:lstStyle/>
           <a:p>
-            <a:pPr indent="0" lvl="0" marL="0" rtl="0" algn="l">
+            <a:pPr marL="0" lvl="0" indent="0" algn="l" rtl="0">
               <a:spcBef>
                 <a:spcPts val="0"/>
               </a:spcBef>
@@ -8294,7 +8440,7 @@
               <a:buNone/>
             </a:pPr>
             <a:r>
-              <a:rPr lang="es">
+              <a:rPr lang="es" dirty="0">
                 <a:latin typeface="Nunito"/>
                 <a:ea typeface="Nunito"/>
                 <a:cs typeface="Nunito"/>
@@ -8302,7 +8448,7 @@
               </a:rPr>
               <a:t>TIPOGRAFÍA</a:t>
             </a:r>
-            <a:endParaRPr>
+            <a:endParaRPr dirty="0">
               <a:latin typeface="Nunito"/>
               <a:ea typeface="Nunito"/>
               <a:cs typeface="Nunito"/>
@@ -8376,11 +8522,11 @@
 </file>
 
 <file path=ppt/slides/slide6.xml><?xml version="1.0" encoding="utf-8"?>
-<p:sld xmlns:a="http://schemas.openxmlformats.org/drawingml/2006/main" xmlns:r="http://schemas.openxmlformats.org/officeDocument/2006/relationships" xmlns:mc="http://schemas.openxmlformats.org/markup-compatibility/2006" xmlns:mv="urn:schemas-microsoft-com:mac:vml" xmlns:p="http://schemas.openxmlformats.org/presentationml/2006/main" xmlns:c="http://schemas.openxmlformats.org/drawingml/2006/chart" xmlns:dgm="http://schemas.openxmlformats.org/drawingml/2006/diagram" xmlns:o="urn:schemas-microsoft-com:office:office" xmlns:v="urn:schemas-microsoft-com:vml" xmlns:pvml="urn:schemas-microsoft-com:office:powerpoint" xmlns:com="http://schemas.openxmlformats.org/drawingml/2006/compatibility" xmlns:p14="http://schemas.microsoft.com/office/powerpoint/2010/main" xmlns:p15="http://schemas.microsoft.com/office/powerpoint/2012/main" xmlns:ahyp="http://schemas.microsoft.com/office/drawing/2018/hyperlinkcolor">
+<p:sld xmlns:a="http://schemas.openxmlformats.org/drawingml/2006/main" xmlns:r="http://schemas.openxmlformats.org/officeDocument/2006/relationships" xmlns:p="http://schemas.openxmlformats.org/presentationml/2006/main">
   <p:cSld>
     <p:spTree>
       <p:nvGrpSpPr>
-        <p:cNvPr id="106" name="Shape 106"/>
+        <p:cNvPr id="1" name="Shape 106"/>
         <p:cNvGrpSpPr/>
         <p:nvPr/>
       </p:nvGrpSpPr>
@@ -8395,7 +8541,9 @@
       <p:sp>
         <p:nvSpPr>
           <p:cNvPr id="107" name="Google Shape;107;p18"/>
-          <p:cNvSpPr txBox="1"/>
+          <p:cNvSpPr txBox="1">
+            <a:spLocks noGrp="1"/>
+          </p:cNvSpPr>
           <p:nvPr>
             <p:ph type="title"/>
           </p:nvPr>
@@ -8410,12 +8558,12 @@
           </a:prstGeom>
         </p:spPr>
         <p:txBody>
-          <a:bodyPr anchorCtr="0" anchor="b" bIns="91425" lIns="91425" spcFirstLastPara="1" rIns="91425" wrap="square" tIns="91425">
+          <a:bodyPr spcFirstLastPara="1" wrap="square" lIns="91425" tIns="91425" rIns="91425" bIns="91425" anchor="b" anchorCtr="0">
             <a:normAutofit fontScale="90000"/>
           </a:bodyPr>
           <a:lstStyle/>
           <a:p>
-            <a:pPr indent="0" lvl="0" marL="0" rtl="0" algn="l">
+            <a:pPr marL="0" lvl="0" indent="0" algn="l" rtl="0">
               <a:spcBef>
                 <a:spcPts val="0"/>
               </a:spcBef>
@@ -8507,11 +8655,412 @@
 </file>
 
 <file path=ppt/slides/slide7.xml><?xml version="1.0" encoding="utf-8"?>
-<p:sld xmlns:a="http://schemas.openxmlformats.org/drawingml/2006/main" xmlns:r="http://schemas.openxmlformats.org/officeDocument/2006/relationships" xmlns:mc="http://schemas.openxmlformats.org/markup-compatibility/2006" xmlns:mv="urn:schemas-microsoft-com:mac:vml" xmlns:p="http://schemas.openxmlformats.org/presentationml/2006/main" xmlns:c="http://schemas.openxmlformats.org/drawingml/2006/chart" xmlns:dgm="http://schemas.openxmlformats.org/drawingml/2006/diagram" xmlns:o="urn:schemas-microsoft-com:office:office" xmlns:v="urn:schemas-microsoft-com:vml" xmlns:pvml="urn:schemas-microsoft-com:office:powerpoint" xmlns:com="http://schemas.openxmlformats.org/drawingml/2006/compatibility" xmlns:p14="http://schemas.microsoft.com/office/powerpoint/2010/main" xmlns:p15="http://schemas.microsoft.com/office/powerpoint/2012/main" xmlns:ahyp="http://schemas.microsoft.com/office/drawing/2018/hyperlinkcolor">
+<p:sld xmlns:a="http://schemas.openxmlformats.org/drawingml/2006/main" xmlns:r="http://schemas.openxmlformats.org/officeDocument/2006/relationships" xmlns:p="http://schemas.openxmlformats.org/presentationml/2006/main">
   <p:cSld>
     <p:spTree>
       <p:nvGrpSpPr>
-        <p:cNvPr id="113" name="Shape 113"/>
+        <p:cNvPr id="1" name=""/>
+        <p:cNvGrpSpPr/>
+        <p:nvPr/>
+      </p:nvGrpSpPr>
+      <p:grpSpPr>
+        <a:xfrm>
+          <a:off x="0" y="0"/>
+          <a:ext cx="0" cy="0"/>
+          <a:chOff x="0" y="0"/>
+          <a:chExt cx="0" cy="0"/>
+        </a:xfrm>
+      </p:grpSpPr>
+      <p:pic>
+        <p:nvPicPr>
+          <p:cNvPr id="1026" name="Picture 2"/>
+          <p:cNvPicPr>
+            <a:picLocks noChangeAspect="1" noChangeArrowheads="1"/>
+          </p:cNvPicPr>
+          <p:nvPr/>
+        </p:nvPicPr>
+        <p:blipFill>
+          <a:blip r:embed="rId2">
+            <a:extLst>
+              <a:ext uri="{28A0092B-C50C-407E-A947-70E740481C1C}">
+                <a14:useLocalDpi xmlns:a14="http://schemas.microsoft.com/office/drawing/2010/main" val="0"/>
+              </a:ext>
+            </a:extLst>
+          </a:blip>
+          <a:srcRect/>
+          <a:stretch>
+            <a:fillRect/>
+          </a:stretch>
+        </p:blipFill>
+        <p:spPr bwMode="auto">
+          <a:xfrm>
+            <a:off x="1600200" y="93957"/>
+            <a:ext cx="7449416" cy="4945634"/>
+          </a:xfrm>
+          <a:prstGeom prst="rect">
+            <a:avLst/>
+          </a:prstGeom>
+          <a:noFill/>
+          <a:ln>
+            <a:noFill/>
+          </a:ln>
+          <a:effectLst/>
+          <a:extLst>
+            <a:ext uri="{909E8E84-426E-40DD-AFC4-6F175D3DCCD1}">
+              <a14:hiddenFill xmlns:a14="http://schemas.microsoft.com/office/drawing/2010/main">
+                <a:solidFill>
+                  <a:schemeClr val="accent1"/>
+                </a:solidFill>
+              </a14:hiddenFill>
+            </a:ext>
+            <a:ext uri="{91240B29-F687-4F45-9708-019B960494DF}">
+              <a14:hiddenLine xmlns:a14="http://schemas.microsoft.com/office/drawing/2010/main" w="9525">
+                <a:solidFill>
+                  <a:schemeClr val="tx1"/>
+                </a:solidFill>
+                <a:miter lim="800000"/>
+                <a:headEnd/>
+                <a:tailEnd/>
+              </a14:hiddenLine>
+            </a:ext>
+            <a:ext uri="{AF507438-7753-43E0-B8FC-AC1667EBCBE1}">
+              <a14:hiddenEffects xmlns:a14="http://schemas.microsoft.com/office/drawing/2010/main">
+                <a:effectLst>
+                  <a:outerShdw dist="35921" dir="2700000" algn="ctr" rotWithShape="0">
+                    <a:schemeClr val="bg2"/>
+                  </a:outerShdw>
+                </a:effectLst>
+              </a14:hiddenEffects>
+            </a:ext>
+          </a:extLst>
+        </p:spPr>
+      </p:pic>
+      <p:sp>
+        <p:nvSpPr>
+          <p:cNvPr id="5" name="Google Shape;100;p17"/>
+          <p:cNvSpPr txBox="1">
+            <a:spLocks/>
+          </p:cNvSpPr>
+          <p:nvPr/>
+        </p:nvSpPr>
+        <p:spPr>
+          <a:xfrm>
+            <a:off x="93881" y="121546"/>
+            <a:ext cx="1452529" cy="2508900"/>
+          </a:xfrm>
+          <a:prstGeom prst="rect">
+            <a:avLst/>
+          </a:prstGeom>
+          <a:noFill/>
+          <a:ln>
+            <a:noFill/>
+          </a:ln>
+        </p:spPr>
+        <p:txBody>
+          <a:bodyPr spcFirstLastPara="1" wrap="square" lIns="91425" tIns="91425" rIns="91425" bIns="91425" anchor="t" anchorCtr="0">
+            <a:normAutofit/>
+          </a:bodyPr>
+          <a:lstStyle>
+            <a:defPPr marR="0" lvl="0" algn="l" rtl="0">
+              <a:lnSpc>
+                <a:spcPct val="100000"/>
+              </a:lnSpc>
+              <a:spcBef>
+                <a:spcPts val="0"/>
+              </a:spcBef>
+              <a:spcAft>
+                <a:spcPts val="0"/>
+              </a:spcAft>
+            </a:defPPr>
+            <a:lvl1pPr marR="0" lvl="0" algn="l" rtl="0">
+              <a:lnSpc>
+                <a:spcPct val="100000"/>
+              </a:lnSpc>
+              <a:spcBef>
+                <a:spcPts val="0"/>
+              </a:spcBef>
+              <a:spcAft>
+                <a:spcPts val="0"/>
+              </a:spcAft>
+              <a:buClr>
+                <a:schemeClr val="lt1"/>
+              </a:buClr>
+              <a:buSzPts val="10000"/>
+              <a:buFont typeface="Merriweather"/>
+              <a:buNone/>
+              <a:defRPr sz="10000" b="0" i="0" u="none" strike="noStrike" cap="none">
+                <a:solidFill>
+                  <a:schemeClr val="lt1"/>
+                </a:solidFill>
+                <a:latin typeface="Merriweather"/>
+                <a:ea typeface="Merriweather"/>
+                <a:cs typeface="Merriweather"/>
+                <a:sym typeface="Merriweather"/>
+              </a:defRPr>
+            </a:lvl1pPr>
+            <a:lvl2pPr marR="0" lvl="1" algn="l" rtl="0">
+              <a:lnSpc>
+                <a:spcPct val="100000"/>
+              </a:lnSpc>
+              <a:spcBef>
+                <a:spcPts val="0"/>
+              </a:spcBef>
+              <a:spcAft>
+                <a:spcPts val="0"/>
+              </a:spcAft>
+              <a:buClr>
+                <a:schemeClr val="lt1"/>
+              </a:buClr>
+              <a:buSzPts val="10000"/>
+              <a:buFont typeface="Merriweather"/>
+              <a:buNone/>
+              <a:defRPr sz="10000" b="0" i="0" u="none" strike="noStrike" cap="none">
+                <a:solidFill>
+                  <a:schemeClr val="lt1"/>
+                </a:solidFill>
+                <a:latin typeface="Merriweather"/>
+                <a:ea typeface="Merriweather"/>
+                <a:cs typeface="Merriweather"/>
+                <a:sym typeface="Merriweather"/>
+              </a:defRPr>
+            </a:lvl2pPr>
+            <a:lvl3pPr marR="0" lvl="2" algn="l" rtl="0">
+              <a:lnSpc>
+                <a:spcPct val="100000"/>
+              </a:lnSpc>
+              <a:spcBef>
+                <a:spcPts val="0"/>
+              </a:spcBef>
+              <a:spcAft>
+                <a:spcPts val="0"/>
+              </a:spcAft>
+              <a:buClr>
+                <a:schemeClr val="lt1"/>
+              </a:buClr>
+              <a:buSzPts val="10000"/>
+              <a:buFont typeface="Merriweather"/>
+              <a:buNone/>
+              <a:defRPr sz="10000" b="0" i="0" u="none" strike="noStrike" cap="none">
+                <a:solidFill>
+                  <a:schemeClr val="lt1"/>
+                </a:solidFill>
+                <a:latin typeface="Merriweather"/>
+                <a:ea typeface="Merriweather"/>
+                <a:cs typeface="Merriweather"/>
+                <a:sym typeface="Merriweather"/>
+              </a:defRPr>
+            </a:lvl3pPr>
+            <a:lvl4pPr marR="0" lvl="3" algn="l" rtl="0">
+              <a:lnSpc>
+                <a:spcPct val="100000"/>
+              </a:lnSpc>
+              <a:spcBef>
+                <a:spcPts val="0"/>
+              </a:spcBef>
+              <a:spcAft>
+                <a:spcPts val="0"/>
+              </a:spcAft>
+              <a:buClr>
+                <a:schemeClr val="lt1"/>
+              </a:buClr>
+              <a:buSzPts val="10000"/>
+              <a:buFont typeface="Merriweather"/>
+              <a:buNone/>
+              <a:defRPr sz="10000" b="0" i="0" u="none" strike="noStrike" cap="none">
+                <a:solidFill>
+                  <a:schemeClr val="lt1"/>
+                </a:solidFill>
+                <a:latin typeface="Merriweather"/>
+                <a:ea typeface="Merriweather"/>
+                <a:cs typeface="Merriweather"/>
+                <a:sym typeface="Merriweather"/>
+              </a:defRPr>
+            </a:lvl4pPr>
+            <a:lvl5pPr marR="0" lvl="4" algn="l" rtl="0">
+              <a:lnSpc>
+                <a:spcPct val="100000"/>
+              </a:lnSpc>
+              <a:spcBef>
+                <a:spcPts val="0"/>
+              </a:spcBef>
+              <a:spcAft>
+                <a:spcPts val="0"/>
+              </a:spcAft>
+              <a:buClr>
+                <a:schemeClr val="lt1"/>
+              </a:buClr>
+              <a:buSzPts val="10000"/>
+              <a:buFont typeface="Merriweather"/>
+              <a:buNone/>
+              <a:defRPr sz="10000" b="0" i="0" u="none" strike="noStrike" cap="none">
+                <a:solidFill>
+                  <a:schemeClr val="lt1"/>
+                </a:solidFill>
+                <a:latin typeface="Merriweather"/>
+                <a:ea typeface="Merriweather"/>
+                <a:cs typeface="Merriweather"/>
+                <a:sym typeface="Merriweather"/>
+              </a:defRPr>
+            </a:lvl5pPr>
+            <a:lvl6pPr marR="0" lvl="5" algn="l" rtl="0">
+              <a:lnSpc>
+                <a:spcPct val="100000"/>
+              </a:lnSpc>
+              <a:spcBef>
+                <a:spcPts val="0"/>
+              </a:spcBef>
+              <a:spcAft>
+                <a:spcPts val="0"/>
+              </a:spcAft>
+              <a:buClr>
+                <a:schemeClr val="lt1"/>
+              </a:buClr>
+              <a:buSzPts val="10000"/>
+              <a:buFont typeface="Merriweather"/>
+              <a:buNone/>
+              <a:defRPr sz="10000" b="0" i="0" u="none" strike="noStrike" cap="none">
+                <a:solidFill>
+                  <a:schemeClr val="lt1"/>
+                </a:solidFill>
+                <a:latin typeface="Merriweather"/>
+                <a:ea typeface="Merriweather"/>
+                <a:cs typeface="Merriweather"/>
+                <a:sym typeface="Merriweather"/>
+              </a:defRPr>
+            </a:lvl6pPr>
+            <a:lvl7pPr marR="0" lvl="6" algn="l" rtl="0">
+              <a:lnSpc>
+                <a:spcPct val="100000"/>
+              </a:lnSpc>
+              <a:spcBef>
+                <a:spcPts val="0"/>
+              </a:spcBef>
+              <a:spcAft>
+                <a:spcPts val="0"/>
+              </a:spcAft>
+              <a:buClr>
+                <a:schemeClr val="lt1"/>
+              </a:buClr>
+              <a:buSzPts val="10000"/>
+              <a:buFont typeface="Merriweather"/>
+              <a:buNone/>
+              <a:defRPr sz="10000" b="0" i="0" u="none" strike="noStrike" cap="none">
+                <a:solidFill>
+                  <a:schemeClr val="lt1"/>
+                </a:solidFill>
+                <a:latin typeface="Merriweather"/>
+                <a:ea typeface="Merriweather"/>
+                <a:cs typeface="Merriweather"/>
+                <a:sym typeface="Merriweather"/>
+              </a:defRPr>
+            </a:lvl7pPr>
+            <a:lvl8pPr marR="0" lvl="7" algn="l" rtl="0">
+              <a:lnSpc>
+                <a:spcPct val="100000"/>
+              </a:lnSpc>
+              <a:spcBef>
+                <a:spcPts val="0"/>
+              </a:spcBef>
+              <a:spcAft>
+                <a:spcPts val="0"/>
+              </a:spcAft>
+              <a:buClr>
+                <a:schemeClr val="lt1"/>
+              </a:buClr>
+              <a:buSzPts val="10000"/>
+              <a:buFont typeface="Merriweather"/>
+              <a:buNone/>
+              <a:defRPr sz="10000" b="0" i="0" u="none" strike="noStrike" cap="none">
+                <a:solidFill>
+                  <a:schemeClr val="lt1"/>
+                </a:solidFill>
+                <a:latin typeface="Merriweather"/>
+                <a:ea typeface="Merriweather"/>
+                <a:cs typeface="Merriweather"/>
+                <a:sym typeface="Merriweather"/>
+              </a:defRPr>
+            </a:lvl8pPr>
+            <a:lvl9pPr marR="0" lvl="8" algn="l" rtl="0">
+              <a:lnSpc>
+                <a:spcPct val="100000"/>
+              </a:lnSpc>
+              <a:spcBef>
+                <a:spcPts val="0"/>
+              </a:spcBef>
+              <a:spcAft>
+                <a:spcPts val="0"/>
+              </a:spcAft>
+              <a:buClr>
+                <a:schemeClr val="lt1"/>
+              </a:buClr>
+              <a:buSzPts val="10000"/>
+              <a:buFont typeface="Merriweather"/>
+              <a:buNone/>
+              <a:defRPr sz="10000" b="0" i="0" u="none" strike="noStrike" cap="none">
+                <a:solidFill>
+                  <a:schemeClr val="lt1"/>
+                </a:solidFill>
+                <a:latin typeface="Merriweather"/>
+                <a:ea typeface="Merriweather"/>
+                <a:cs typeface="Merriweather"/>
+                <a:sym typeface="Merriweather"/>
+              </a:defRPr>
+            </a:lvl9pPr>
+          </a:lstStyle>
+          <a:p>
+            <a:r>
+              <a:rPr lang="es-ES" sz="2800" dirty="0" smtClean="0">
+                <a:latin typeface="Nunito"/>
+                <a:ea typeface="Nunito"/>
+                <a:cs typeface="Nunito"/>
+                <a:sym typeface="Nunito"/>
+              </a:rPr>
+              <a:t>BASE</a:t>
+            </a:r>
+          </a:p>
+          <a:p>
+            <a:r>
+              <a:rPr lang="es-ES" sz="2800" dirty="0" smtClean="0">
+                <a:latin typeface="Nunito"/>
+                <a:ea typeface="Nunito"/>
+                <a:cs typeface="Nunito"/>
+                <a:sym typeface="Nunito"/>
+              </a:rPr>
+              <a:t>DE</a:t>
+            </a:r>
+          </a:p>
+          <a:p>
+            <a:r>
+              <a:rPr lang="es-ES" sz="2800" dirty="0" smtClean="0">
+                <a:latin typeface="Nunito"/>
+                <a:ea typeface="Nunito"/>
+                <a:cs typeface="Nunito"/>
+                <a:sym typeface="Nunito"/>
+              </a:rPr>
+              <a:t>DATOS</a:t>
+            </a:r>
+          </a:p>
+        </p:txBody>
+      </p:sp>
+    </p:spTree>
+    <p:extLst>
+      <p:ext uri="{BB962C8B-B14F-4D97-AF65-F5344CB8AC3E}">
+        <p14:creationId xmlns:p14="http://schemas.microsoft.com/office/powerpoint/2010/main" val="754389321"/>
+      </p:ext>
+    </p:extLst>
+  </p:cSld>
+  <p:clrMapOvr>
+    <a:masterClrMapping/>
+  </p:clrMapOvr>
+</p:sld>
+</file>
+
+<file path=ppt/slides/slide8.xml><?xml version="1.0" encoding="utf-8"?>
+<p:sld xmlns:a="http://schemas.openxmlformats.org/drawingml/2006/main" xmlns:r="http://schemas.openxmlformats.org/officeDocument/2006/relationships" xmlns:p="http://schemas.openxmlformats.org/presentationml/2006/main">
+  <p:cSld>
+    <p:spTree>
+      <p:nvGrpSpPr>
+        <p:cNvPr id="1" name="Shape 113"/>
         <p:cNvGrpSpPr/>
         <p:nvPr/>
       </p:nvGrpSpPr>
@@ -8526,7 +9075,9 @@
       <p:sp>
         <p:nvSpPr>
           <p:cNvPr id="114" name="Google Shape;114;p19"/>
-          <p:cNvSpPr txBox="1"/>
+          <p:cNvSpPr txBox="1">
+            <a:spLocks noGrp="1"/>
+          </p:cNvSpPr>
           <p:nvPr>
             <p:ph type="title"/>
           </p:nvPr>
@@ -8541,12 +9092,12 @@
           </a:prstGeom>
         </p:spPr>
         <p:txBody>
-          <a:bodyPr anchorCtr="0" anchor="b" bIns="91425" lIns="91425" spcFirstLastPara="1" rIns="91425" wrap="square" tIns="91425">
+          <a:bodyPr spcFirstLastPara="1" wrap="square" lIns="91425" tIns="91425" rIns="91425" bIns="91425" anchor="b" anchorCtr="0">
             <a:normAutofit fontScale="90000"/>
           </a:bodyPr>
           <a:lstStyle/>
           <a:p>
-            <a:pPr indent="0" lvl="0" marL="0" rtl="0" algn="ctr">
+            <a:pPr marL="0" lvl="0" indent="0" algn="ctr" rtl="0">
               <a:spcBef>
                 <a:spcPts val="0"/>
               </a:spcBef>
@@ -8576,9 +9127,11 @@
       <p:sp>
         <p:nvSpPr>
           <p:cNvPr id="115" name="Google Shape;115;p19"/>
-          <p:cNvSpPr txBox="1"/>
+          <p:cNvSpPr txBox="1">
+            <a:spLocks noGrp="1"/>
+          </p:cNvSpPr>
           <p:nvPr>
-            <p:ph idx="1" type="body"/>
+            <p:ph type="body" idx="1"/>
           </p:nvPr>
         </p:nvSpPr>
         <p:spPr>
@@ -8591,12 +9144,12 @@
           </a:prstGeom>
         </p:spPr>
         <p:txBody>
-          <a:bodyPr anchorCtr="0" anchor="t" bIns="91425" lIns="91425" spcFirstLastPara="1" rIns="91425" wrap="square" tIns="91425">
+          <a:bodyPr spcFirstLastPara="1" wrap="square" lIns="91425" tIns="91425" rIns="91425" bIns="91425" anchor="t" anchorCtr="0">
             <a:normAutofit/>
           </a:bodyPr>
           <a:lstStyle/>
           <a:p>
-            <a:pPr indent="0" lvl="0" marL="0" rtl="0" algn="ctr">
+            <a:pPr marL="0" lvl="0" indent="0" algn="ctr" rtl="0">
               <a:spcBef>
                 <a:spcPts val="0"/>
               </a:spcBef>
@@ -8688,7 +9241,7 @@
 </file>
 
 <file path=ppt/theme/theme1.xml><?xml version="1.0" encoding="utf-8"?>
-<a:theme xmlns:a="http://schemas.openxmlformats.org/drawingml/2006/main" xmlns:r="http://schemas.openxmlformats.org/officeDocument/2006/relationships" name="Paradigm">
+<a:theme xmlns:a="http://schemas.openxmlformats.org/drawingml/2006/main" name="Paradigm">
   <a:themeElements>
     <a:clrScheme name="Paradigm">
       <a:dk1>
@@ -8963,11 +9516,13 @@
       </a:bgFillStyleLst>
     </a:fmtScheme>
   </a:themeElements>
+  <a:objectDefaults/>
+  <a:extraClrSchemeLst/>
 </a:theme>
 </file>
 
 <file path=ppt/theme/theme2.xml><?xml version="1.0" encoding="utf-8"?>
-<a:theme xmlns:a="http://schemas.openxmlformats.org/drawingml/2006/main" xmlns:r="http://schemas.openxmlformats.org/officeDocument/2006/relationships">
+<a:theme xmlns:a="http://schemas.openxmlformats.org/drawingml/2006/main">
   <a:themeElements>
     <a:clrScheme name="Default">
       <a:dk1>
@@ -9242,5 +9797,7 @@
       </a:bgFillStyleLst>
     </a:fmtScheme>
   </a:themeElements>
+  <a:objectDefaults/>
+  <a:extraClrSchemeLst/>
 </a:theme>
 </file>
</xml_diff>